<commit_message>
adaption on notes and pptx
</commit_message>
<xml_diff>
--- a/CAS NLP Module 4_jd_bb.pptx
+++ b/CAS NLP Module 4_jd_bb.pptx
@@ -4,6 +4,9 @@
   <p:sldMasterIdLst>
     <p:sldMasterId id="2147483660" r:id="rId1"/>
   </p:sldMasterIdLst>
+  <p:notesMasterIdLst>
+    <p:notesMasterId r:id="rId15"/>
+  </p:notesMasterIdLst>
   <p:sldIdLst>
     <p:sldId id="256" r:id="rId2"/>
     <p:sldId id="258" r:id="rId3"/>
@@ -116,7 +119,1971 @@
       </a:defRPr>
     </a:lvl9pPr>
   </p:defaultTextStyle>
+  <p:extLst>
+    <p:ext uri="{EFAFB233-063F-42B5-8137-9DF3F51BA10A}">
+      <p15:sldGuideLst xmlns:p15="http://schemas.microsoft.com/office/powerpoint/2012/main"/>
+    </p:ext>
+  </p:extLst>
 </p:presentation>
+</file>
+
+<file path=ppt/notesMasters/notesMaster1.xml><?xml version="1.0" encoding="utf-8"?>
+<p:notesMaster xmlns:a="http://schemas.openxmlformats.org/drawingml/2006/main" xmlns:r="http://schemas.openxmlformats.org/officeDocument/2006/relationships" xmlns:p="http://schemas.openxmlformats.org/presentationml/2006/main">
+  <p:cSld>
+    <p:bg>
+      <p:bgRef idx="1001">
+        <a:schemeClr val="bg1"/>
+      </p:bgRef>
+    </p:bg>
+    <p:spTree>
+      <p:nvGrpSpPr>
+        <p:cNvPr id="1" name=""/>
+        <p:cNvGrpSpPr/>
+        <p:nvPr/>
+      </p:nvGrpSpPr>
+      <p:grpSpPr>
+        <a:xfrm>
+          <a:off x="0" y="0"/>
+          <a:ext cx="0" cy="0"/>
+          <a:chOff x="0" y="0"/>
+          <a:chExt cx="0" cy="0"/>
+        </a:xfrm>
+      </p:grpSpPr>
+      <p:sp>
+        <p:nvSpPr>
+          <p:cNvPr id="2" name="Header Placeholder 1"/>
+          <p:cNvSpPr>
+            <a:spLocks noGrp="1"/>
+          </p:cNvSpPr>
+          <p:nvPr>
+            <p:ph type="hdr" sz="quarter"/>
+          </p:nvPr>
+        </p:nvSpPr>
+        <p:spPr>
+          <a:xfrm>
+            <a:off x="0" y="0"/>
+            <a:ext cx="2971800" cy="458788"/>
+          </a:xfrm>
+          <a:prstGeom prst="rect">
+            <a:avLst/>
+          </a:prstGeom>
+        </p:spPr>
+        <p:txBody>
+          <a:bodyPr vert="horz" lIns="91440" tIns="45720" rIns="91440" bIns="45720" rtlCol="0"/>
+          <a:lstStyle>
+            <a:lvl1pPr algn="l">
+              <a:defRPr sz="1200"/>
+            </a:lvl1pPr>
+          </a:lstStyle>
+          <a:p>
+            <a:endParaRPr lang="en-US"/>
+          </a:p>
+        </p:txBody>
+      </p:sp>
+      <p:sp>
+        <p:nvSpPr>
+          <p:cNvPr id="3" name="Date Placeholder 2"/>
+          <p:cNvSpPr>
+            <a:spLocks noGrp="1"/>
+          </p:cNvSpPr>
+          <p:nvPr>
+            <p:ph type="dt" idx="1"/>
+          </p:nvPr>
+        </p:nvSpPr>
+        <p:spPr>
+          <a:xfrm>
+            <a:off x="3884613" y="0"/>
+            <a:ext cx="2971800" cy="458788"/>
+          </a:xfrm>
+          <a:prstGeom prst="rect">
+            <a:avLst/>
+          </a:prstGeom>
+        </p:spPr>
+        <p:txBody>
+          <a:bodyPr vert="horz" lIns="91440" tIns="45720" rIns="91440" bIns="45720" rtlCol="0"/>
+          <a:lstStyle>
+            <a:lvl1pPr algn="r">
+              <a:defRPr sz="1200"/>
+            </a:lvl1pPr>
+          </a:lstStyle>
+          <a:p>
+            <a:fld id="{E51474CE-351A-4402-BD16-5C3CE3808280}" type="datetimeFigureOut">
+              <a:rPr lang="en-US" smtClean="0"/>
+              <a:t>1/18/2025</a:t>
+            </a:fld>
+            <a:endParaRPr lang="en-US"/>
+          </a:p>
+        </p:txBody>
+      </p:sp>
+      <p:sp>
+        <p:nvSpPr>
+          <p:cNvPr id="4" name="Slide Image Placeholder 3"/>
+          <p:cNvSpPr>
+            <a:spLocks noGrp="1" noRot="1" noChangeAspect="1"/>
+          </p:cNvSpPr>
+          <p:nvPr>
+            <p:ph type="sldImg" idx="2"/>
+          </p:nvPr>
+        </p:nvSpPr>
+        <p:spPr>
+          <a:xfrm>
+            <a:off x="685800" y="1143000"/>
+            <a:ext cx="5486400" cy="3086100"/>
+          </a:xfrm>
+          <a:prstGeom prst="rect">
+            <a:avLst/>
+          </a:prstGeom>
+          <a:noFill/>
+          <a:ln w="12700">
+            <a:solidFill>
+              <a:prstClr val="black"/>
+            </a:solidFill>
+          </a:ln>
+        </p:spPr>
+        <p:txBody>
+          <a:bodyPr vert="horz" lIns="91440" tIns="45720" rIns="91440" bIns="45720" rtlCol="0" anchor="ctr"/>
+          <a:lstStyle/>
+          <a:p>
+            <a:endParaRPr lang="en-US"/>
+          </a:p>
+        </p:txBody>
+      </p:sp>
+      <p:sp>
+        <p:nvSpPr>
+          <p:cNvPr id="5" name="Notes Placeholder 4"/>
+          <p:cNvSpPr>
+            <a:spLocks noGrp="1"/>
+          </p:cNvSpPr>
+          <p:nvPr>
+            <p:ph type="body" sz="quarter" idx="3"/>
+          </p:nvPr>
+        </p:nvSpPr>
+        <p:spPr>
+          <a:xfrm>
+            <a:off x="685800" y="4400550"/>
+            <a:ext cx="5486400" cy="3600450"/>
+          </a:xfrm>
+          <a:prstGeom prst="rect">
+            <a:avLst/>
+          </a:prstGeom>
+        </p:spPr>
+        <p:txBody>
+          <a:bodyPr vert="horz" lIns="91440" tIns="45720" rIns="91440" bIns="45720" rtlCol="0"/>
+          <a:lstStyle/>
+          <a:p>
+            <a:pPr lvl="0"/>
+            <a:r>
+              <a:rPr lang="en-US"/>
+              <a:t>Click to edit Master text styles</a:t>
+            </a:r>
+          </a:p>
+          <a:p>
+            <a:pPr lvl="1"/>
+            <a:r>
+              <a:rPr lang="en-US"/>
+              <a:t>Second level</a:t>
+            </a:r>
+          </a:p>
+          <a:p>
+            <a:pPr lvl="2"/>
+            <a:r>
+              <a:rPr lang="en-US"/>
+              <a:t>Third level</a:t>
+            </a:r>
+          </a:p>
+          <a:p>
+            <a:pPr lvl="3"/>
+            <a:r>
+              <a:rPr lang="en-US"/>
+              <a:t>Fourth level</a:t>
+            </a:r>
+          </a:p>
+          <a:p>
+            <a:pPr lvl="4"/>
+            <a:r>
+              <a:rPr lang="en-US"/>
+              <a:t>Fifth level</a:t>
+            </a:r>
+          </a:p>
+        </p:txBody>
+      </p:sp>
+      <p:sp>
+        <p:nvSpPr>
+          <p:cNvPr id="6" name="Footer Placeholder 5"/>
+          <p:cNvSpPr>
+            <a:spLocks noGrp="1"/>
+          </p:cNvSpPr>
+          <p:nvPr>
+            <p:ph type="ftr" sz="quarter" idx="4"/>
+          </p:nvPr>
+        </p:nvSpPr>
+        <p:spPr>
+          <a:xfrm>
+            <a:off x="0" y="8685213"/>
+            <a:ext cx="2971800" cy="458787"/>
+          </a:xfrm>
+          <a:prstGeom prst="rect">
+            <a:avLst/>
+          </a:prstGeom>
+        </p:spPr>
+        <p:txBody>
+          <a:bodyPr vert="horz" lIns="91440" tIns="45720" rIns="91440" bIns="45720" rtlCol="0" anchor="b"/>
+          <a:lstStyle>
+            <a:lvl1pPr algn="l">
+              <a:defRPr sz="1200"/>
+            </a:lvl1pPr>
+          </a:lstStyle>
+          <a:p>
+            <a:endParaRPr lang="en-US"/>
+          </a:p>
+        </p:txBody>
+      </p:sp>
+      <p:sp>
+        <p:nvSpPr>
+          <p:cNvPr id="7" name="Slide Number Placeholder 6"/>
+          <p:cNvSpPr>
+            <a:spLocks noGrp="1"/>
+          </p:cNvSpPr>
+          <p:nvPr>
+            <p:ph type="sldNum" sz="quarter" idx="5"/>
+          </p:nvPr>
+        </p:nvSpPr>
+        <p:spPr>
+          <a:xfrm>
+            <a:off x="3884613" y="8685213"/>
+            <a:ext cx="2971800" cy="458787"/>
+          </a:xfrm>
+          <a:prstGeom prst="rect">
+            <a:avLst/>
+          </a:prstGeom>
+        </p:spPr>
+        <p:txBody>
+          <a:bodyPr vert="horz" lIns="91440" tIns="45720" rIns="91440" bIns="45720" rtlCol="0" anchor="b"/>
+          <a:lstStyle>
+            <a:lvl1pPr algn="r">
+              <a:defRPr sz="1200"/>
+            </a:lvl1pPr>
+          </a:lstStyle>
+          <a:p>
+            <a:fld id="{2DA66685-3D22-47BB-B74E-10995D7F8271}" type="slidenum">
+              <a:rPr lang="en-US" smtClean="0"/>
+              <a:t>‹#›</a:t>
+            </a:fld>
+            <a:endParaRPr lang="en-US"/>
+          </a:p>
+        </p:txBody>
+      </p:sp>
+    </p:spTree>
+    <p:extLst>
+      <p:ext uri="{BB962C8B-B14F-4D97-AF65-F5344CB8AC3E}">
+        <p14:creationId xmlns:p14="http://schemas.microsoft.com/office/powerpoint/2010/main" val="2337606197"/>
+      </p:ext>
+    </p:extLst>
+  </p:cSld>
+  <p:clrMap bg1="lt1" tx1="dk1" bg2="lt2" tx2="dk2" accent1="accent1" accent2="accent2" accent3="accent3" accent4="accent4" accent5="accent5" accent6="accent6" hlink="hlink" folHlink="folHlink"/>
+  <p:notesStyle>
+    <a:lvl1pPr marL="0" algn="l" defTabSz="914400" rtl="0" eaLnBrk="1" latinLnBrk="0" hangingPunct="1">
+      <a:defRPr sz="1200" kern="1200">
+        <a:solidFill>
+          <a:schemeClr val="tx1"/>
+        </a:solidFill>
+        <a:latin typeface="+mn-lt"/>
+        <a:ea typeface="+mn-ea"/>
+        <a:cs typeface="+mn-cs"/>
+      </a:defRPr>
+    </a:lvl1pPr>
+    <a:lvl2pPr marL="457200" algn="l" defTabSz="914400" rtl="0" eaLnBrk="1" latinLnBrk="0" hangingPunct="1">
+      <a:defRPr sz="1200" kern="1200">
+        <a:solidFill>
+          <a:schemeClr val="tx1"/>
+        </a:solidFill>
+        <a:latin typeface="+mn-lt"/>
+        <a:ea typeface="+mn-ea"/>
+        <a:cs typeface="+mn-cs"/>
+      </a:defRPr>
+    </a:lvl2pPr>
+    <a:lvl3pPr marL="914400" algn="l" defTabSz="914400" rtl="0" eaLnBrk="1" latinLnBrk="0" hangingPunct="1">
+      <a:defRPr sz="1200" kern="1200">
+        <a:solidFill>
+          <a:schemeClr val="tx1"/>
+        </a:solidFill>
+        <a:latin typeface="+mn-lt"/>
+        <a:ea typeface="+mn-ea"/>
+        <a:cs typeface="+mn-cs"/>
+      </a:defRPr>
+    </a:lvl3pPr>
+    <a:lvl4pPr marL="1371600" algn="l" defTabSz="914400" rtl="0" eaLnBrk="1" latinLnBrk="0" hangingPunct="1">
+      <a:defRPr sz="1200" kern="1200">
+        <a:solidFill>
+          <a:schemeClr val="tx1"/>
+        </a:solidFill>
+        <a:latin typeface="+mn-lt"/>
+        <a:ea typeface="+mn-ea"/>
+        <a:cs typeface="+mn-cs"/>
+      </a:defRPr>
+    </a:lvl4pPr>
+    <a:lvl5pPr marL="1828800" algn="l" defTabSz="914400" rtl="0" eaLnBrk="1" latinLnBrk="0" hangingPunct="1">
+      <a:defRPr sz="1200" kern="1200">
+        <a:solidFill>
+          <a:schemeClr val="tx1"/>
+        </a:solidFill>
+        <a:latin typeface="+mn-lt"/>
+        <a:ea typeface="+mn-ea"/>
+        <a:cs typeface="+mn-cs"/>
+      </a:defRPr>
+    </a:lvl5pPr>
+    <a:lvl6pPr marL="2286000" algn="l" defTabSz="914400" rtl="0" eaLnBrk="1" latinLnBrk="0" hangingPunct="1">
+      <a:defRPr sz="1200" kern="1200">
+        <a:solidFill>
+          <a:schemeClr val="tx1"/>
+        </a:solidFill>
+        <a:latin typeface="+mn-lt"/>
+        <a:ea typeface="+mn-ea"/>
+        <a:cs typeface="+mn-cs"/>
+      </a:defRPr>
+    </a:lvl6pPr>
+    <a:lvl7pPr marL="2743200" algn="l" defTabSz="914400" rtl="0" eaLnBrk="1" latinLnBrk="0" hangingPunct="1">
+      <a:defRPr sz="1200" kern="1200">
+        <a:solidFill>
+          <a:schemeClr val="tx1"/>
+        </a:solidFill>
+        <a:latin typeface="+mn-lt"/>
+        <a:ea typeface="+mn-ea"/>
+        <a:cs typeface="+mn-cs"/>
+      </a:defRPr>
+    </a:lvl7pPr>
+    <a:lvl8pPr marL="3200400" algn="l" defTabSz="914400" rtl="0" eaLnBrk="1" latinLnBrk="0" hangingPunct="1">
+      <a:defRPr sz="1200" kern="1200">
+        <a:solidFill>
+          <a:schemeClr val="tx1"/>
+        </a:solidFill>
+        <a:latin typeface="+mn-lt"/>
+        <a:ea typeface="+mn-ea"/>
+        <a:cs typeface="+mn-cs"/>
+      </a:defRPr>
+    </a:lvl8pPr>
+    <a:lvl9pPr marL="3657600" algn="l" defTabSz="914400" rtl="0" eaLnBrk="1" latinLnBrk="0" hangingPunct="1">
+      <a:defRPr sz="1200" kern="1200">
+        <a:solidFill>
+          <a:schemeClr val="tx1"/>
+        </a:solidFill>
+        <a:latin typeface="+mn-lt"/>
+        <a:ea typeface="+mn-ea"/>
+        <a:cs typeface="+mn-cs"/>
+      </a:defRPr>
+    </a:lvl9pPr>
+  </p:notesStyle>
+</p:notesMaster>
+</file>
+
+<file path=ppt/notesSlides/notesSlide1.xml><?xml version="1.0" encoding="utf-8"?>
+<p:notes xmlns:a="http://schemas.openxmlformats.org/drawingml/2006/main" xmlns:r="http://schemas.openxmlformats.org/officeDocument/2006/relationships" xmlns:p="http://schemas.openxmlformats.org/presentationml/2006/main">
+  <p:cSld>
+    <p:spTree>
+      <p:nvGrpSpPr>
+        <p:cNvPr id="1" name=""/>
+        <p:cNvGrpSpPr/>
+        <p:nvPr/>
+      </p:nvGrpSpPr>
+      <p:grpSpPr>
+        <a:xfrm>
+          <a:off x="0" y="0"/>
+          <a:ext cx="0" cy="0"/>
+          <a:chOff x="0" y="0"/>
+          <a:chExt cx="0" cy="0"/>
+        </a:xfrm>
+      </p:grpSpPr>
+      <p:sp>
+        <p:nvSpPr>
+          <p:cNvPr id="2" name="Slide Image Placeholder 1"/>
+          <p:cNvSpPr>
+            <a:spLocks noGrp="1" noRot="1" noChangeAspect="1"/>
+          </p:cNvSpPr>
+          <p:nvPr>
+            <p:ph type="sldImg"/>
+          </p:nvPr>
+        </p:nvSpPr>
+        <p:spPr/>
+      </p:sp>
+      <p:sp>
+        <p:nvSpPr>
+          <p:cNvPr id="3" name="Notes Placeholder 2"/>
+          <p:cNvSpPr>
+            <a:spLocks noGrp="1"/>
+          </p:cNvSpPr>
+          <p:nvPr>
+            <p:ph type="body" idx="1"/>
+          </p:nvPr>
+        </p:nvSpPr>
+        <p:spPr/>
+        <p:txBody>
+          <a:bodyPr/>
+          <a:lstStyle/>
+          <a:p>
+            <a:r>
+              <a:rPr lang="de-CH" b="1" dirty="0"/>
+              <a:t>Model:</a:t>
+            </a:r>
+          </a:p>
+          <a:p>
+            <a:r>
+              <a:rPr lang="de-CH" dirty="0" err="1"/>
+              <a:t>According</a:t>
+            </a:r>
+            <a:r>
+              <a:rPr lang="de-CH" dirty="0"/>
+              <a:t> </a:t>
+            </a:r>
+            <a:r>
+              <a:rPr lang="de-CH" dirty="0" err="1"/>
+              <a:t>to</a:t>
+            </a:r>
+            <a:r>
+              <a:rPr lang="de-CH" dirty="0"/>
+              <a:t> </a:t>
+            </a:r>
+            <a:r>
+              <a:rPr lang="de-CH" dirty="0" err="1"/>
+              <a:t>Perplexity</a:t>
+            </a:r>
+            <a:r>
+              <a:rPr lang="de-CH" dirty="0"/>
+              <a:t>:</a:t>
+            </a:r>
+          </a:p>
+          <a:p>
+            <a:pPr marL="0" marR="0" lvl="0" indent="0" algn="l" defTabSz="914400" rtl="0" eaLnBrk="1" fontAlgn="auto" latinLnBrk="0" hangingPunct="1">
+              <a:lnSpc>
+                <a:spcPct val="100000"/>
+              </a:lnSpc>
+              <a:spcBef>
+                <a:spcPts val="0"/>
+              </a:spcBef>
+              <a:spcAft>
+                <a:spcPts val="0"/>
+              </a:spcAft>
+              <a:buClrTx/>
+              <a:buSzTx/>
+              <a:buFontTx/>
+              <a:buNone/>
+              <a:tabLst/>
+              <a:defRPr/>
+            </a:pPr>
+            <a:r>
+              <a:rPr lang="de-CH" sz="1800" dirty="0" err="1">
+                <a:effectLst/>
+                <a:latin typeface="__fkGroteskNeue_598ab8"/>
+              </a:rPr>
+              <a:t>While</a:t>
+            </a:r>
+            <a:r>
+              <a:rPr lang="de-CH" sz="1800" dirty="0">
+                <a:effectLst/>
+                <a:latin typeface="__fkGroteskNeue_598ab8"/>
+              </a:rPr>
+              <a:t> </a:t>
+            </a:r>
+            <a:r>
+              <a:rPr lang="de-CH" sz="1800" dirty="0" err="1">
+                <a:effectLst/>
+                <a:latin typeface="__fkGroteskNeue_598ab8"/>
+              </a:rPr>
+              <a:t>the</a:t>
+            </a:r>
+            <a:r>
+              <a:rPr lang="de-CH" sz="1800" dirty="0">
+                <a:effectLst/>
+                <a:latin typeface="__fkGroteskNeue_598ab8"/>
+              </a:rPr>
+              <a:t> </a:t>
+            </a:r>
+            <a:r>
+              <a:rPr lang="de-CH" sz="1800" dirty="0" err="1">
+                <a:effectLst/>
+                <a:latin typeface="__fkGroteskNeue_598ab8"/>
+              </a:rPr>
+              <a:t>other</a:t>
+            </a:r>
+            <a:r>
+              <a:rPr lang="de-CH" sz="1800" dirty="0">
+                <a:effectLst/>
+                <a:latin typeface="__fkGroteskNeue_598ab8"/>
+              </a:rPr>
+              <a:t> </a:t>
+            </a:r>
+            <a:r>
+              <a:rPr lang="de-CH" sz="1800" dirty="0" err="1">
+                <a:effectLst/>
+                <a:latin typeface="__fkGroteskNeue_598ab8"/>
+              </a:rPr>
+              <a:t>models</a:t>
+            </a:r>
+            <a:r>
+              <a:rPr lang="de-CH" sz="1800" dirty="0">
+                <a:effectLst/>
+                <a:latin typeface="__fkGroteskNeue_598ab8"/>
+              </a:rPr>
+              <a:t> (</a:t>
+            </a:r>
+            <a:r>
+              <a:rPr lang="de-CH" sz="1800" dirty="0" err="1">
+                <a:effectLst/>
+                <a:latin typeface="__fkGroteskNeue_598ab8"/>
+              </a:rPr>
+              <a:t>google-bert</a:t>
+            </a:r>
+            <a:r>
+              <a:rPr lang="de-CH" sz="1800" dirty="0">
+                <a:effectLst/>
+                <a:latin typeface="__fkGroteskNeue_598ab8"/>
+              </a:rPr>
+              <a:t>/</a:t>
+            </a:r>
+            <a:r>
+              <a:rPr lang="de-CH" sz="1800" dirty="0" err="1">
+                <a:effectLst/>
+                <a:latin typeface="__fkGroteskNeue_598ab8"/>
+              </a:rPr>
+              <a:t>bert</a:t>
+            </a:r>
+            <a:r>
+              <a:rPr lang="de-CH" sz="1800" dirty="0">
+                <a:effectLst/>
+                <a:latin typeface="__fkGroteskNeue_598ab8"/>
+              </a:rPr>
+              <a:t>-base-multilingual-</a:t>
+            </a:r>
+            <a:r>
+              <a:rPr lang="de-CH" sz="1800" dirty="0" err="1">
+                <a:effectLst/>
+                <a:latin typeface="__fkGroteskNeue_598ab8"/>
+              </a:rPr>
+              <a:t>cased</a:t>
+            </a:r>
+            <a:r>
+              <a:rPr lang="de-CH" sz="1800" dirty="0">
+                <a:effectLst/>
+                <a:latin typeface="__fkGroteskNeue_598ab8"/>
+              </a:rPr>
+              <a:t> and </a:t>
+            </a:r>
+            <a:r>
+              <a:rPr lang="de-CH" sz="1800" dirty="0" err="1">
+                <a:effectLst/>
+                <a:latin typeface="__fkGroteskNeue_598ab8"/>
+              </a:rPr>
+              <a:t>FacebookAI</a:t>
+            </a:r>
+            <a:r>
+              <a:rPr lang="de-CH" sz="1800" dirty="0">
+                <a:effectLst/>
+                <a:latin typeface="__fkGroteskNeue_598ab8"/>
+              </a:rPr>
+              <a:t>/</a:t>
+            </a:r>
+            <a:r>
+              <a:rPr lang="de-CH" sz="1800" dirty="0" err="1">
+                <a:effectLst/>
+                <a:latin typeface="__fkGroteskNeue_598ab8"/>
+              </a:rPr>
+              <a:t>xlm</a:t>
+            </a:r>
+            <a:r>
+              <a:rPr lang="de-CH" sz="1800" dirty="0">
+                <a:effectLst/>
+                <a:latin typeface="__fkGroteskNeue_598ab8"/>
+              </a:rPr>
+              <a:t>-</a:t>
+            </a:r>
+            <a:r>
+              <a:rPr lang="de-CH" sz="1800" dirty="0" err="1">
+                <a:effectLst/>
+                <a:latin typeface="__fkGroteskNeue_598ab8"/>
+              </a:rPr>
+              <a:t>roberta</a:t>
+            </a:r>
+            <a:r>
+              <a:rPr lang="de-CH" sz="1800" dirty="0">
+                <a:effectLst/>
+                <a:latin typeface="__fkGroteskNeue_598ab8"/>
+              </a:rPr>
+              <a:t>-base) </a:t>
+            </a:r>
+            <a:r>
+              <a:rPr lang="de-CH" sz="1800" dirty="0" err="1">
+                <a:effectLst/>
+                <a:latin typeface="__fkGroteskNeue_598ab8"/>
+              </a:rPr>
+              <a:t>are</a:t>
+            </a:r>
+            <a:r>
+              <a:rPr lang="de-CH" sz="1800" dirty="0">
+                <a:effectLst/>
+                <a:latin typeface="__fkGroteskNeue_598ab8"/>
+              </a:rPr>
+              <a:t> also multilingual, </a:t>
+            </a:r>
+            <a:r>
+              <a:rPr lang="de-CH" sz="1800" dirty="0" err="1">
+                <a:effectLst/>
+                <a:latin typeface="__fkGroteskNeue_598ab8"/>
+              </a:rPr>
+              <a:t>they</a:t>
+            </a:r>
+            <a:r>
+              <a:rPr lang="de-CH" sz="1800" dirty="0">
+                <a:effectLst/>
+                <a:latin typeface="__fkGroteskNeue_598ab8"/>
+              </a:rPr>
+              <a:t> </a:t>
+            </a:r>
+            <a:r>
+              <a:rPr lang="de-CH" sz="1800" dirty="0" err="1">
+                <a:effectLst/>
+                <a:latin typeface="__fkGroteskNeue_598ab8"/>
+              </a:rPr>
+              <a:t>are</a:t>
+            </a:r>
+            <a:r>
+              <a:rPr lang="de-CH" sz="1800" dirty="0">
+                <a:effectLst/>
+                <a:latin typeface="__fkGroteskNeue_598ab8"/>
+              </a:rPr>
+              <a:t> not </a:t>
+            </a:r>
+            <a:r>
+              <a:rPr lang="de-CH" sz="1800" dirty="0" err="1">
+                <a:effectLst/>
+                <a:latin typeface="__fkGroteskNeue_598ab8"/>
+              </a:rPr>
+              <a:t>specifically</a:t>
+            </a:r>
+            <a:r>
+              <a:rPr lang="de-CH" sz="1800" dirty="0">
+                <a:effectLst/>
+                <a:latin typeface="__fkGroteskNeue_598ab8"/>
+              </a:rPr>
+              <a:t> </a:t>
+            </a:r>
+            <a:r>
+              <a:rPr lang="de-CH" sz="1800" dirty="0" err="1">
+                <a:effectLst/>
+                <a:latin typeface="__fkGroteskNeue_598ab8"/>
+              </a:rPr>
+              <a:t>fine-tuned</a:t>
+            </a:r>
+            <a:r>
+              <a:rPr lang="de-CH" sz="1800" dirty="0">
+                <a:effectLst/>
+                <a:latin typeface="__fkGroteskNeue_598ab8"/>
+              </a:rPr>
+              <a:t> </a:t>
+            </a:r>
+            <a:r>
+              <a:rPr lang="de-CH" sz="1800" dirty="0" err="1">
+                <a:effectLst/>
+                <a:latin typeface="__fkGroteskNeue_598ab8"/>
+              </a:rPr>
+              <a:t>for</a:t>
+            </a:r>
+            <a:r>
+              <a:rPr lang="de-CH" sz="1800" dirty="0">
+                <a:effectLst/>
+                <a:latin typeface="__fkGroteskNeue_598ab8"/>
+              </a:rPr>
+              <a:t> NER </a:t>
+            </a:r>
+            <a:r>
+              <a:rPr lang="de-CH" sz="1800" dirty="0" err="1">
+                <a:effectLst/>
+                <a:latin typeface="__fkGroteskNeue_598ab8"/>
+              </a:rPr>
+              <a:t>tasks</a:t>
+            </a:r>
+            <a:r>
+              <a:rPr lang="de-CH" sz="1800" dirty="0">
+                <a:effectLst/>
+                <a:latin typeface="__fkGroteskNeue_598ab8"/>
+              </a:rPr>
+              <a:t>. The </a:t>
+            </a:r>
+            <a:r>
+              <a:rPr lang="de-CH" sz="1800" dirty="0" err="1">
+                <a:effectLst/>
+                <a:latin typeface="__fkGroteskNeue_598ab8"/>
+              </a:rPr>
+              <a:t>wikineural</a:t>
+            </a:r>
+            <a:r>
+              <a:rPr lang="de-CH" sz="1800" dirty="0">
+                <a:effectLst/>
+                <a:latin typeface="__fkGroteskNeue_598ab8"/>
+              </a:rPr>
+              <a:t>-multilingual-</a:t>
+            </a:r>
+            <a:r>
+              <a:rPr lang="de-CH" sz="1800" dirty="0" err="1">
+                <a:effectLst/>
+                <a:latin typeface="__fkGroteskNeue_598ab8"/>
+              </a:rPr>
+              <a:t>ner</a:t>
+            </a:r>
+            <a:r>
+              <a:rPr lang="de-CH" sz="1800" dirty="0">
+                <a:effectLst/>
+                <a:latin typeface="__fkGroteskNeue_598ab8"/>
+              </a:rPr>
+              <a:t> </a:t>
+            </a:r>
+            <a:r>
+              <a:rPr lang="de-CH" sz="1800" dirty="0" err="1">
+                <a:effectLst/>
+                <a:latin typeface="__fkGroteskNeue_598ab8"/>
+              </a:rPr>
+              <a:t>model's</a:t>
+            </a:r>
+            <a:r>
+              <a:rPr lang="de-CH" sz="1800" dirty="0">
+                <a:effectLst/>
+                <a:latin typeface="__fkGroteskNeue_598ab8"/>
+              </a:rPr>
+              <a:t> </a:t>
+            </a:r>
+            <a:r>
+              <a:rPr lang="de-CH" sz="1800" dirty="0" err="1">
+                <a:effectLst/>
+                <a:latin typeface="__fkGroteskNeue_598ab8"/>
+              </a:rPr>
+              <a:t>specialized</a:t>
+            </a:r>
+            <a:r>
+              <a:rPr lang="de-CH" sz="1800" dirty="0">
+                <a:effectLst/>
+                <a:latin typeface="__fkGroteskNeue_598ab8"/>
+              </a:rPr>
+              <a:t> </a:t>
+            </a:r>
+            <a:r>
+              <a:rPr lang="de-CH" sz="1800" dirty="0" err="1">
+                <a:effectLst/>
+                <a:latin typeface="__fkGroteskNeue_598ab8"/>
+              </a:rPr>
+              <a:t>training</a:t>
+            </a:r>
+            <a:r>
+              <a:rPr lang="de-CH" sz="1800" dirty="0">
+                <a:effectLst/>
+                <a:latin typeface="__fkGroteskNeue_598ab8"/>
+              </a:rPr>
+              <a:t> on NER </a:t>
+            </a:r>
+            <a:r>
+              <a:rPr lang="de-CH" sz="1800" dirty="0" err="1">
+                <a:effectLst/>
+                <a:latin typeface="__fkGroteskNeue_598ab8"/>
+              </a:rPr>
+              <a:t>tasks</a:t>
+            </a:r>
+            <a:r>
+              <a:rPr lang="de-CH" sz="1800" dirty="0">
+                <a:effectLst/>
+                <a:latin typeface="__fkGroteskNeue_598ab8"/>
+              </a:rPr>
+              <a:t> </a:t>
+            </a:r>
+            <a:r>
+              <a:rPr lang="de-CH" sz="1800" dirty="0" err="1">
+                <a:effectLst/>
+                <a:latin typeface="__fkGroteskNeue_598ab8"/>
+              </a:rPr>
+              <a:t>across</a:t>
+            </a:r>
+            <a:r>
+              <a:rPr lang="de-CH" sz="1800" dirty="0">
+                <a:effectLst/>
+                <a:latin typeface="__fkGroteskNeue_598ab8"/>
+              </a:rPr>
+              <a:t> multiple </a:t>
+            </a:r>
+            <a:r>
+              <a:rPr lang="de-CH" sz="1800" dirty="0" err="1">
+                <a:effectLst/>
+                <a:latin typeface="__fkGroteskNeue_598ab8"/>
+              </a:rPr>
+              <a:t>languages</a:t>
+            </a:r>
+            <a:r>
+              <a:rPr lang="de-CH" sz="1800" dirty="0">
+                <a:effectLst/>
+                <a:latin typeface="__fkGroteskNeue_598ab8"/>
+              </a:rPr>
+              <a:t> </a:t>
+            </a:r>
+            <a:r>
+              <a:rPr lang="de-CH" sz="1800" dirty="0" err="1">
+                <a:effectLst/>
+                <a:latin typeface="__fkGroteskNeue_598ab8"/>
+              </a:rPr>
+              <a:t>makes</a:t>
+            </a:r>
+            <a:r>
+              <a:rPr lang="de-CH" sz="1800" dirty="0">
+                <a:effectLst/>
+                <a:latin typeface="__fkGroteskNeue_598ab8"/>
+              </a:rPr>
+              <a:t> </a:t>
+            </a:r>
+            <a:r>
+              <a:rPr lang="de-CH" sz="1800" dirty="0" err="1">
+                <a:effectLst/>
+                <a:latin typeface="__fkGroteskNeue_598ab8"/>
+              </a:rPr>
+              <a:t>it</a:t>
+            </a:r>
+            <a:r>
+              <a:rPr lang="de-CH" sz="1800" dirty="0">
+                <a:effectLst/>
+                <a:latin typeface="__fkGroteskNeue_598ab8"/>
+              </a:rPr>
+              <a:t> </a:t>
+            </a:r>
+            <a:r>
+              <a:rPr lang="de-CH" sz="1800" dirty="0" err="1">
+                <a:effectLst/>
+                <a:latin typeface="__fkGroteskNeue_598ab8"/>
+              </a:rPr>
+              <a:t>the</a:t>
+            </a:r>
+            <a:r>
+              <a:rPr lang="de-CH" sz="1800" dirty="0">
+                <a:effectLst/>
+                <a:latin typeface="__fkGroteskNeue_598ab8"/>
+              </a:rPr>
+              <a:t> </a:t>
+            </a:r>
+            <a:r>
+              <a:rPr lang="de-CH" sz="1800" dirty="0" err="1">
+                <a:effectLst/>
+                <a:latin typeface="__fkGroteskNeue_598ab8"/>
+              </a:rPr>
+              <a:t>most</a:t>
+            </a:r>
+            <a:r>
+              <a:rPr lang="de-CH" sz="1800" dirty="0">
+                <a:effectLst/>
+                <a:latin typeface="__fkGroteskNeue_598ab8"/>
+              </a:rPr>
+              <a:t> </a:t>
+            </a:r>
+            <a:r>
+              <a:rPr lang="de-CH" sz="1800" dirty="0" err="1">
+                <a:effectLst/>
+                <a:latin typeface="__fkGroteskNeue_598ab8"/>
+              </a:rPr>
+              <a:t>suitable</a:t>
+            </a:r>
+            <a:r>
+              <a:rPr lang="de-CH" sz="1800" dirty="0">
+                <a:effectLst/>
+                <a:latin typeface="__fkGroteskNeue_598ab8"/>
+              </a:rPr>
+              <a:t> </a:t>
+            </a:r>
+            <a:r>
+              <a:rPr lang="de-CH" sz="1800" dirty="0" err="1">
+                <a:effectLst/>
+                <a:latin typeface="__fkGroteskNeue_598ab8"/>
+              </a:rPr>
+              <a:t>choice</a:t>
+            </a:r>
+            <a:r>
+              <a:rPr lang="de-CH" sz="1800" dirty="0">
+                <a:effectLst/>
+                <a:latin typeface="__fkGroteskNeue_598ab8"/>
+              </a:rPr>
+              <a:t> </a:t>
+            </a:r>
+            <a:r>
+              <a:rPr lang="de-CH" sz="1800" dirty="0" err="1">
+                <a:effectLst/>
+                <a:latin typeface="__fkGroteskNeue_598ab8"/>
+              </a:rPr>
+              <a:t>for</a:t>
+            </a:r>
+            <a:r>
+              <a:rPr lang="de-CH" sz="1800" dirty="0">
+                <a:effectLst/>
+                <a:latin typeface="__fkGroteskNeue_598ab8"/>
+              </a:rPr>
+              <a:t> </a:t>
+            </a:r>
+            <a:r>
+              <a:rPr lang="de-CH" sz="1800" dirty="0" err="1">
+                <a:effectLst/>
+                <a:latin typeface="__fkGroteskNeue_598ab8"/>
+              </a:rPr>
+              <a:t>your</a:t>
+            </a:r>
+            <a:r>
+              <a:rPr lang="de-CH" sz="1800" dirty="0">
+                <a:effectLst/>
+                <a:latin typeface="__fkGroteskNeue_598ab8"/>
+              </a:rPr>
+              <a:t> </a:t>
+            </a:r>
+            <a:r>
+              <a:rPr lang="de-CH" sz="1800" dirty="0" err="1">
+                <a:effectLst/>
+                <a:latin typeface="__fkGroteskNeue_598ab8"/>
+              </a:rPr>
+              <a:t>specific</a:t>
+            </a:r>
+            <a:r>
+              <a:rPr lang="de-CH" sz="1800" dirty="0">
+                <a:effectLst/>
+                <a:latin typeface="__fkGroteskNeue_598ab8"/>
+              </a:rPr>
+              <a:t> </a:t>
+            </a:r>
+            <a:r>
+              <a:rPr lang="de-CH" sz="1800" dirty="0" err="1">
+                <a:effectLst/>
+                <a:latin typeface="__fkGroteskNeue_598ab8"/>
+              </a:rPr>
+              <a:t>requirements</a:t>
+            </a:r>
+            <a:r>
+              <a:rPr lang="de-CH" sz="1800" dirty="0">
+                <a:effectLst/>
+                <a:latin typeface="__fkGroteskNeue_598ab8"/>
+              </a:rPr>
+              <a:t>.</a:t>
+            </a:r>
+          </a:p>
+          <a:p>
+            <a:r>
+              <a:rPr lang="en-US" dirty="0"/>
+              <a:t>Advantages with this model:</a:t>
+            </a:r>
+          </a:p>
+          <a:p>
+            <a:pPr marL="285750" indent="-285750" rtl="0" fontAlgn="ctr">
+              <a:spcBef>
+                <a:spcPts val="0"/>
+              </a:spcBef>
+              <a:spcAft>
+                <a:spcPts val="0"/>
+              </a:spcAft>
+              <a:buFont typeface="Arial" panose="020B0604020202020204" pitchFamily="34" charset="0"/>
+              <a:buChar char="•"/>
+            </a:pPr>
+            <a:r>
+              <a:rPr lang="de-CH" sz="1800" b="0" i="0" dirty="0">
+                <a:effectLst/>
+                <a:latin typeface="__fkGroteskNeue_598ab8"/>
+              </a:rPr>
+              <a:t>Language support: This </a:t>
+            </a:r>
+            <a:r>
+              <a:rPr lang="de-CH" sz="1800" b="0" i="0" dirty="0" err="1">
+                <a:effectLst/>
+                <a:latin typeface="__fkGroteskNeue_598ab8"/>
+              </a:rPr>
+              <a:t>model</a:t>
+            </a:r>
+            <a:r>
+              <a:rPr lang="de-CH" sz="1800" b="0" i="0" dirty="0">
+                <a:effectLst/>
+                <a:latin typeface="__fkGroteskNeue_598ab8"/>
+              </a:rPr>
+              <a:t> </a:t>
+            </a:r>
+            <a:r>
+              <a:rPr lang="de-CH" sz="1800" b="0" i="0" dirty="0" err="1">
+                <a:effectLst/>
+                <a:latin typeface="__fkGroteskNeue_598ab8"/>
+              </a:rPr>
+              <a:t>supports</a:t>
+            </a:r>
+            <a:r>
+              <a:rPr lang="de-CH" sz="1800" b="0" i="0" dirty="0">
+                <a:effectLst/>
+                <a:latin typeface="__fkGroteskNeue_598ab8"/>
+              </a:rPr>
+              <a:t> all </a:t>
+            </a:r>
+            <a:r>
+              <a:rPr lang="de-CH" sz="1800" b="0" i="0" dirty="0" err="1">
+                <a:effectLst/>
+                <a:latin typeface="__fkGroteskNeue_598ab8"/>
+              </a:rPr>
+              <a:t>four</a:t>
+            </a:r>
+            <a:r>
+              <a:rPr lang="de-CH" sz="1800" b="0" i="0" dirty="0">
+                <a:effectLst/>
+                <a:latin typeface="__fkGroteskNeue_598ab8"/>
+              </a:rPr>
+              <a:t> </a:t>
+            </a:r>
+            <a:r>
+              <a:rPr lang="de-CH" sz="1800" b="0" i="0" dirty="0" err="1">
+                <a:effectLst/>
+                <a:latin typeface="__fkGroteskNeue_598ab8"/>
+              </a:rPr>
+              <a:t>required</a:t>
+            </a:r>
+            <a:r>
+              <a:rPr lang="de-CH" sz="1800" b="0" i="0" dirty="0">
+                <a:effectLst/>
+                <a:latin typeface="__fkGroteskNeue_598ab8"/>
+              </a:rPr>
+              <a:t> </a:t>
+            </a:r>
+            <a:r>
+              <a:rPr lang="de-CH" sz="1800" b="0" i="0" dirty="0" err="1">
+                <a:effectLst/>
+                <a:latin typeface="__fkGroteskNeue_598ab8"/>
+              </a:rPr>
+              <a:t>languages</a:t>
+            </a:r>
+            <a:r>
+              <a:rPr lang="de-CH" sz="1800" b="0" i="0" dirty="0">
+                <a:effectLst/>
+                <a:latin typeface="__fkGroteskNeue_598ab8"/>
+              </a:rPr>
+              <a:t> (English, French, </a:t>
+            </a:r>
+            <a:r>
+              <a:rPr lang="de-CH" sz="1800" b="0" i="0" dirty="0" err="1">
+                <a:effectLst/>
+                <a:latin typeface="__fkGroteskNeue_598ab8"/>
+              </a:rPr>
+              <a:t>Italian</a:t>
+            </a:r>
+            <a:r>
+              <a:rPr lang="de-CH" sz="1800" b="0" i="0" dirty="0">
+                <a:effectLst/>
+                <a:latin typeface="__fkGroteskNeue_598ab8"/>
+              </a:rPr>
+              <a:t>, and German)</a:t>
+            </a:r>
+          </a:p>
+          <a:p>
+            <a:pPr marL="285750" indent="-285750" rtl="0" fontAlgn="ctr">
+              <a:spcBef>
+                <a:spcPts val="0"/>
+              </a:spcBef>
+              <a:spcAft>
+                <a:spcPts val="0"/>
+              </a:spcAft>
+              <a:buFont typeface="Arial" panose="020B0604020202020204" pitchFamily="34" charset="0"/>
+              <a:buChar char="•"/>
+            </a:pPr>
+            <a:r>
+              <a:rPr lang="de-CH" sz="1800" b="0" i="0" dirty="0">
+                <a:effectLst/>
+                <a:latin typeface="__fkGroteskNeue_598ab8"/>
+              </a:rPr>
+              <a:t>Multilingual NER </a:t>
+            </a:r>
+            <a:r>
+              <a:rPr lang="de-CH" sz="1800" b="0" i="0" dirty="0" err="1">
+                <a:effectLst/>
+                <a:latin typeface="__fkGroteskNeue_598ab8"/>
+              </a:rPr>
+              <a:t>capability</a:t>
+            </a:r>
+            <a:r>
+              <a:rPr lang="de-CH" sz="1800" b="0" i="0" dirty="0">
+                <a:effectLst/>
+                <a:latin typeface="__fkGroteskNeue_598ab8"/>
+              </a:rPr>
+              <a:t>: </a:t>
+            </a:r>
+            <a:r>
+              <a:rPr lang="de-CH" sz="1800" b="0" i="0" dirty="0" err="1">
+                <a:effectLst/>
+                <a:latin typeface="__fkGroteskNeue_598ab8"/>
+              </a:rPr>
+              <a:t>It</a:t>
+            </a:r>
+            <a:r>
+              <a:rPr lang="de-CH" sz="1800" b="0" i="0" dirty="0">
+                <a:effectLst/>
+                <a:latin typeface="__fkGroteskNeue_598ab8"/>
+              </a:rPr>
+              <a:t> </a:t>
+            </a:r>
+            <a:r>
+              <a:rPr lang="de-CH" sz="1800" b="0" i="0" dirty="0" err="1">
+                <a:effectLst/>
+                <a:latin typeface="__fkGroteskNeue_598ab8"/>
+              </a:rPr>
+              <a:t>is</a:t>
+            </a:r>
+            <a:r>
+              <a:rPr lang="de-CH" sz="1800" b="0" i="0" dirty="0">
+                <a:effectLst/>
+                <a:latin typeface="__fkGroteskNeue_598ab8"/>
+              </a:rPr>
+              <a:t> </a:t>
+            </a:r>
+            <a:r>
+              <a:rPr lang="de-CH" sz="1800" b="0" i="0" dirty="0" err="1">
+                <a:effectLst/>
+                <a:latin typeface="__fkGroteskNeue_598ab8"/>
+              </a:rPr>
+              <a:t>specifically</a:t>
+            </a:r>
+            <a:r>
+              <a:rPr lang="de-CH" sz="1800" b="0" i="0" dirty="0">
+                <a:effectLst/>
+                <a:latin typeface="__fkGroteskNeue_598ab8"/>
+              </a:rPr>
+              <a:t> </a:t>
+            </a:r>
+            <a:r>
+              <a:rPr lang="de-CH" sz="1800" b="0" i="0" dirty="0" err="1">
+                <a:effectLst/>
+                <a:latin typeface="__fkGroteskNeue_598ab8"/>
+              </a:rPr>
+              <a:t>designed</a:t>
+            </a:r>
+            <a:r>
+              <a:rPr lang="de-CH" sz="1800" b="0" i="0" dirty="0">
+                <a:effectLst/>
+                <a:latin typeface="__fkGroteskNeue_598ab8"/>
+              </a:rPr>
+              <a:t> </a:t>
+            </a:r>
+            <a:r>
+              <a:rPr lang="de-CH" sz="1800" b="0" i="0" dirty="0" err="1">
+                <a:effectLst/>
+                <a:latin typeface="__fkGroteskNeue_598ab8"/>
+              </a:rPr>
+              <a:t>for</a:t>
+            </a:r>
+            <a:r>
+              <a:rPr lang="de-CH" sz="1800" b="0" i="0" dirty="0">
+                <a:effectLst/>
+                <a:latin typeface="__fkGroteskNeue_598ab8"/>
+              </a:rPr>
+              <a:t> </a:t>
+            </a:r>
+            <a:r>
+              <a:rPr lang="de-CH" sz="1800" b="0" i="0" dirty="0" err="1">
+                <a:effectLst/>
+                <a:latin typeface="__fkGroteskNeue_598ab8"/>
+              </a:rPr>
+              <a:t>Named</a:t>
+            </a:r>
+            <a:r>
+              <a:rPr lang="de-CH" sz="1800" b="0" i="0" dirty="0">
+                <a:effectLst/>
+                <a:latin typeface="__fkGroteskNeue_598ab8"/>
+              </a:rPr>
+              <a:t> Entity Recognition (NER) </a:t>
+            </a:r>
+            <a:r>
+              <a:rPr lang="de-CH" sz="1800" b="0" i="0" dirty="0" err="1">
+                <a:effectLst/>
+                <a:latin typeface="__fkGroteskNeue_598ab8"/>
+              </a:rPr>
+              <a:t>tasks</a:t>
+            </a:r>
+            <a:r>
+              <a:rPr lang="de-CH" sz="1800" b="0" i="0" dirty="0">
+                <a:effectLst/>
+                <a:latin typeface="__fkGroteskNeue_598ab8"/>
+              </a:rPr>
+              <a:t> </a:t>
+            </a:r>
+            <a:r>
+              <a:rPr lang="de-CH" sz="1800" b="0" i="0" dirty="0" err="1">
+                <a:effectLst/>
+                <a:latin typeface="__fkGroteskNeue_598ab8"/>
+              </a:rPr>
+              <a:t>across</a:t>
+            </a:r>
+            <a:r>
+              <a:rPr lang="de-CH" sz="1800" b="0" i="0" dirty="0">
+                <a:effectLst/>
+                <a:latin typeface="__fkGroteskNeue_598ab8"/>
+              </a:rPr>
+              <a:t> multiple </a:t>
+            </a:r>
+            <a:r>
+              <a:rPr lang="de-CH" sz="1800" b="0" i="0" dirty="0" err="1">
+                <a:effectLst/>
+                <a:latin typeface="__fkGroteskNeue_598ab8"/>
+              </a:rPr>
+              <a:t>languages</a:t>
+            </a:r>
+            <a:endParaRPr lang="de-CH" sz="1800" b="0" i="0" dirty="0">
+              <a:effectLst/>
+              <a:latin typeface="__fkGroteskNeue_598ab8"/>
+            </a:endParaRPr>
+          </a:p>
+          <a:p>
+            <a:pPr marL="285750" indent="-285750" rtl="0" fontAlgn="ctr">
+              <a:spcBef>
+                <a:spcPts val="0"/>
+              </a:spcBef>
+              <a:spcAft>
+                <a:spcPts val="0"/>
+              </a:spcAft>
+              <a:buFont typeface="Arial" panose="020B0604020202020204" pitchFamily="34" charset="0"/>
+              <a:buChar char="•"/>
+            </a:pPr>
+            <a:r>
+              <a:rPr lang="de-CH" sz="1800" b="0" i="0" dirty="0">
+                <a:effectLst/>
+                <a:latin typeface="__fkGroteskNeue_598ab8"/>
+              </a:rPr>
+              <a:t>Transfer </a:t>
+            </a:r>
+            <a:r>
+              <a:rPr lang="de-CH" sz="1800" b="0" i="0" dirty="0" err="1">
+                <a:effectLst/>
+                <a:latin typeface="__fkGroteskNeue_598ab8"/>
+              </a:rPr>
+              <a:t>learning</a:t>
+            </a:r>
+            <a:r>
+              <a:rPr lang="de-CH" sz="1800" b="0" i="0" dirty="0">
+                <a:effectLst/>
+                <a:latin typeface="__fkGroteskNeue_598ab8"/>
+              </a:rPr>
+              <a:t> potential: The </a:t>
+            </a:r>
+            <a:r>
+              <a:rPr lang="de-CH" sz="1800" b="0" i="0" dirty="0" err="1">
+                <a:effectLst/>
+                <a:latin typeface="__fkGroteskNeue_598ab8"/>
+              </a:rPr>
+              <a:t>model</a:t>
+            </a:r>
+            <a:r>
+              <a:rPr lang="de-CH" sz="1800" b="0" i="0" dirty="0">
+                <a:effectLst/>
+                <a:latin typeface="__fkGroteskNeue_598ab8"/>
+              </a:rPr>
+              <a:t> </a:t>
+            </a:r>
+            <a:r>
+              <a:rPr lang="de-CH" sz="1800" b="0" i="0" dirty="0" err="1">
+                <a:effectLst/>
+                <a:latin typeface="__fkGroteskNeue_598ab8"/>
+              </a:rPr>
+              <a:t>is</a:t>
+            </a:r>
+            <a:r>
+              <a:rPr lang="de-CH" sz="1800" b="0" i="0" dirty="0">
+                <a:effectLst/>
+                <a:latin typeface="__fkGroteskNeue_598ab8"/>
+              </a:rPr>
+              <a:t> </a:t>
+            </a:r>
+            <a:r>
+              <a:rPr lang="de-CH" sz="1800" b="0" i="0" dirty="0" err="1">
+                <a:effectLst/>
+                <a:latin typeface="__fkGroteskNeue_598ab8"/>
+              </a:rPr>
+              <a:t>trained</a:t>
+            </a:r>
+            <a:r>
+              <a:rPr lang="de-CH" sz="1800" b="0" i="0" dirty="0">
+                <a:effectLst/>
+                <a:latin typeface="__fkGroteskNeue_598ab8"/>
+              </a:rPr>
+              <a:t> on a large </a:t>
+            </a:r>
+            <a:r>
+              <a:rPr lang="de-CH" sz="1800" b="0" i="0" dirty="0" err="1">
+                <a:effectLst/>
+                <a:latin typeface="__fkGroteskNeue_598ab8"/>
+              </a:rPr>
+              <a:t>dataset</a:t>
+            </a:r>
+            <a:r>
+              <a:rPr lang="de-CH" sz="1800" b="0" i="0" dirty="0">
+                <a:effectLst/>
+                <a:latin typeface="__fkGroteskNeue_598ab8"/>
+              </a:rPr>
+              <a:t> </a:t>
+            </a:r>
+            <a:r>
+              <a:rPr lang="de-CH" sz="1800" b="0" i="0" dirty="0" err="1">
+                <a:effectLst/>
+                <a:latin typeface="__fkGroteskNeue_598ab8"/>
+              </a:rPr>
+              <a:t>derived</a:t>
+            </a:r>
+            <a:r>
+              <a:rPr lang="de-CH" sz="1800" b="0" i="0" dirty="0">
+                <a:effectLst/>
+                <a:latin typeface="__fkGroteskNeue_598ab8"/>
+              </a:rPr>
+              <a:t> </a:t>
+            </a:r>
+            <a:r>
+              <a:rPr lang="de-CH" sz="1800" b="0" i="0" dirty="0" err="1">
+                <a:effectLst/>
+                <a:latin typeface="__fkGroteskNeue_598ab8"/>
+              </a:rPr>
+              <a:t>from</a:t>
+            </a:r>
+            <a:r>
+              <a:rPr lang="de-CH" sz="1800" b="0" i="0" dirty="0">
+                <a:effectLst/>
+                <a:latin typeface="__fkGroteskNeue_598ab8"/>
+              </a:rPr>
+              <a:t> Wikipedia, </a:t>
+            </a:r>
+            <a:r>
+              <a:rPr lang="de-CH" sz="1800" b="0" i="0" dirty="0" err="1">
+                <a:effectLst/>
+                <a:latin typeface="__fkGroteskNeue_598ab8"/>
+              </a:rPr>
+              <a:t>combining</a:t>
+            </a:r>
+            <a:r>
+              <a:rPr lang="de-CH" sz="1800" b="0" i="0" dirty="0">
+                <a:effectLst/>
+                <a:latin typeface="__fkGroteskNeue_598ab8"/>
+              </a:rPr>
+              <a:t> </a:t>
+            </a:r>
+            <a:r>
+              <a:rPr lang="de-CH" sz="1800" b="0" i="0" dirty="0" err="1">
+                <a:effectLst/>
+                <a:latin typeface="__fkGroteskNeue_598ab8"/>
+              </a:rPr>
+              <a:t>neural</a:t>
+            </a:r>
+            <a:r>
+              <a:rPr lang="de-CH" sz="1800" b="0" i="0" dirty="0">
+                <a:effectLst/>
+                <a:latin typeface="__fkGroteskNeue_598ab8"/>
+              </a:rPr>
+              <a:t> and </a:t>
+            </a:r>
+            <a:r>
+              <a:rPr lang="de-CH" sz="1800" b="0" i="0" dirty="0" err="1">
+                <a:effectLst/>
+                <a:latin typeface="__fkGroteskNeue_598ab8"/>
+              </a:rPr>
+              <a:t>knowledge-based</a:t>
+            </a:r>
+            <a:r>
+              <a:rPr lang="de-CH" sz="1800" b="0" i="0" dirty="0">
+                <a:effectLst/>
+                <a:latin typeface="__fkGroteskNeue_598ab8"/>
+              </a:rPr>
+              <a:t> </a:t>
+            </a:r>
+            <a:r>
+              <a:rPr lang="de-CH" sz="1800" b="0" i="0" dirty="0" err="1">
+                <a:effectLst/>
+                <a:latin typeface="__fkGroteskNeue_598ab8"/>
+              </a:rPr>
+              <a:t>approaches</a:t>
+            </a:r>
+            <a:r>
+              <a:rPr lang="de-CH" sz="1800" b="0" i="0" dirty="0">
+                <a:effectLst/>
+                <a:latin typeface="__fkGroteskNeue_598ab8"/>
+              </a:rPr>
+              <a:t>. This </a:t>
+            </a:r>
+            <a:r>
+              <a:rPr lang="de-CH" sz="1800" b="0" i="0" dirty="0" err="1">
+                <a:effectLst/>
+                <a:latin typeface="__fkGroteskNeue_598ab8"/>
+              </a:rPr>
+              <a:t>makes</a:t>
+            </a:r>
+            <a:r>
+              <a:rPr lang="de-CH" sz="1800" b="0" i="0" dirty="0">
+                <a:effectLst/>
+                <a:latin typeface="__fkGroteskNeue_598ab8"/>
+              </a:rPr>
+              <a:t> </a:t>
+            </a:r>
+            <a:r>
+              <a:rPr lang="de-CH" sz="1800" b="0" i="0" dirty="0" err="1">
+                <a:effectLst/>
+                <a:latin typeface="__fkGroteskNeue_598ab8"/>
+              </a:rPr>
+              <a:t>it</a:t>
+            </a:r>
+            <a:r>
+              <a:rPr lang="de-CH" sz="1800" b="0" i="0" dirty="0">
+                <a:effectLst/>
+                <a:latin typeface="__fkGroteskNeue_598ab8"/>
+              </a:rPr>
+              <a:t> </a:t>
+            </a:r>
+            <a:r>
+              <a:rPr lang="de-CH" sz="1800" b="0" i="0" dirty="0" err="1">
+                <a:effectLst/>
+                <a:latin typeface="__fkGroteskNeue_598ab8"/>
+              </a:rPr>
+              <a:t>suitable</a:t>
+            </a:r>
+            <a:r>
+              <a:rPr lang="de-CH" sz="1800" b="0" i="0" dirty="0">
+                <a:effectLst/>
+                <a:latin typeface="__fkGroteskNeue_598ab8"/>
+              </a:rPr>
+              <a:t> </a:t>
+            </a:r>
+            <a:r>
+              <a:rPr lang="de-CH" sz="1800" b="0" i="0" dirty="0" err="1">
+                <a:effectLst/>
+                <a:latin typeface="__fkGroteskNeue_598ab8"/>
+              </a:rPr>
+              <a:t>for</a:t>
+            </a:r>
+            <a:r>
+              <a:rPr lang="de-CH" sz="1800" b="0" i="0" dirty="0">
+                <a:effectLst/>
+                <a:latin typeface="__fkGroteskNeue_598ab8"/>
+              </a:rPr>
+              <a:t> </a:t>
+            </a:r>
+            <a:r>
+              <a:rPr lang="de-CH" sz="1800" b="0" i="0" dirty="0" err="1">
+                <a:effectLst/>
+                <a:latin typeface="__fkGroteskNeue_598ab8"/>
+              </a:rPr>
+              <a:t>transfer</a:t>
+            </a:r>
+            <a:r>
+              <a:rPr lang="de-CH" sz="1800" b="0" i="0" dirty="0">
+                <a:effectLst/>
+                <a:latin typeface="__fkGroteskNeue_598ab8"/>
+              </a:rPr>
+              <a:t> </a:t>
+            </a:r>
+            <a:r>
+              <a:rPr lang="de-CH" sz="1800" b="0" i="0" dirty="0" err="1">
+                <a:effectLst/>
+                <a:latin typeface="__fkGroteskNeue_598ab8"/>
+              </a:rPr>
+              <a:t>learning</a:t>
+            </a:r>
+            <a:r>
+              <a:rPr lang="de-CH" sz="1800" b="0" i="0" dirty="0">
+                <a:effectLst/>
+                <a:latin typeface="__fkGroteskNeue_598ab8"/>
+              </a:rPr>
+              <a:t> </a:t>
+            </a:r>
+            <a:r>
+              <a:rPr lang="de-CH" sz="1800" b="0" i="0" dirty="0" err="1">
+                <a:effectLst/>
+                <a:latin typeface="__fkGroteskNeue_598ab8"/>
+              </a:rPr>
+              <a:t>from</a:t>
+            </a:r>
+            <a:r>
+              <a:rPr lang="de-CH" sz="1800" b="0" i="0" dirty="0">
+                <a:effectLst/>
+                <a:latin typeface="__fkGroteskNeue_598ab8"/>
+              </a:rPr>
+              <a:t> English </a:t>
+            </a:r>
+            <a:r>
+              <a:rPr lang="de-CH" sz="1800" b="0" i="0" dirty="0" err="1">
+                <a:effectLst/>
+                <a:latin typeface="__fkGroteskNeue_598ab8"/>
+              </a:rPr>
+              <a:t>to</a:t>
+            </a:r>
+            <a:r>
+              <a:rPr lang="de-CH" sz="1800" b="0" i="0" dirty="0">
+                <a:effectLst/>
+                <a:latin typeface="__fkGroteskNeue_598ab8"/>
+              </a:rPr>
+              <a:t> </a:t>
+            </a:r>
+            <a:r>
+              <a:rPr lang="de-CH" sz="1800" b="0" i="0" dirty="0" err="1">
+                <a:effectLst/>
+                <a:latin typeface="__fkGroteskNeue_598ab8"/>
+              </a:rPr>
+              <a:t>other</a:t>
+            </a:r>
+            <a:r>
+              <a:rPr lang="de-CH" sz="1800" b="0" i="0" dirty="0">
+                <a:effectLst/>
+                <a:latin typeface="__fkGroteskNeue_598ab8"/>
+              </a:rPr>
+              <a:t> </a:t>
+            </a:r>
+            <a:r>
+              <a:rPr lang="de-CH" sz="1800" b="0" i="0" dirty="0" err="1">
+                <a:effectLst/>
+                <a:latin typeface="__fkGroteskNeue_598ab8"/>
+              </a:rPr>
+              <a:t>languages</a:t>
+            </a:r>
+            <a:endParaRPr lang="de-CH" sz="1800" b="0" i="0" dirty="0">
+              <a:effectLst/>
+              <a:latin typeface="__fkGroteskNeue_598ab8"/>
+            </a:endParaRPr>
+          </a:p>
+          <a:p>
+            <a:pPr marL="285750" indent="-285750" rtl="0" fontAlgn="ctr">
+              <a:spcBef>
+                <a:spcPts val="0"/>
+              </a:spcBef>
+              <a:spcAft>
+                <a:spcPts val="0"/>
+              </a:spcAft>
+              <a:buFont typeface="Arial" panose="020B0604020202020204" pitchFamily="34" charset="0"/>
+              <a:buChar char="•"/>
+            </a:pPr>
+            <a:r>
+              <a:rPr lang="de-CH" sz="1800" b="0" i="0" dirty="0">
+                <a:effectLst/>
+                <a:latin typeface="__fkGroteskNeue_598ab8"/>
+              </a:rPr>
+              <a:t>Performance: </a:t>
+            </a:r>
+            <a:r>
+              <a:rPr lang="de-CH" sz="1800" b="0" i="0" dirty="0" err="1">
+                <a:effectLst/>
+                <a:latin typeface="__fkGroteskNeue_598ab8"/>
+              </a:rPr>
+              <a:t>It</a:t>
+            </a:r>
+            <a:r>
+              <a:rPr lang="de-CH" sz="1800" b="0" i="0" dirty="0">
+                <a:effectLst/>
+                <a:latin typeface="__fkGroteskNeue_598ab8"/>
+              </a:rPr>
+              <a:t> </a:t>
+            </a:r>
+            <a:r>
+              <a:rPr lang="de-CH" sz="1800" b="0" i="0" dirty="0" err="1">
+                <a:effectLst/>
+                <a:latin typeface="__fkGroteskNeue_598ab8"/>
+              </a:rPr>
+              <a:t>achieves</a:t>
+            </a:r>
+            <a:r>
+              <a:rPr lang="de-CH" sz="1800" b="0" i="0" dirty="0">
+                <a:effectLst/>
+                <a:latin typeface="__fkGroteskNeue_598ab8"/>
+              </a:rPr>
+              <a:t> </a:t>
+            </a:r>
+            <a:r>
+              <a:rPr lang="de-CH" sz="1800" b="0" i="0" dirty="0" err="1">
+                <a:effectLst/>
+                <a:latin typeface="__fkGroteskNeue_598ab8"/>
+              </a:rPr>
+              <a:t>state</a:t>
+            </a:r>
+            <a:r>
+              <a:rPr lang="de-CH" sz="1800" b="0" i="0" dirty="0">
+                <a:effectLst/>
+                <a:latin typeface="__fkGroteskNeue_598ab8"/>
+              </a:rPr>
+              <a:t>-</a:t>
+            </a:r>
+            <a:r>
+              <a:rPr lang="de-CH" sz="1800" b="0" i="0" dirty="0" err="1">
+                <a:effectLst/>
+                <a:latin typeface="__fkGroteskNeue_598ab8"/>
+              </a:rPr>
+              <a:t>of</a:t>
+            </a:r>
+            <a:r>
+              <a:rPr lang="de-CH" sz="1800" b="0" i="0" dirty="0">
+                <a:effectLst/>
+                <a:latin typeface="__fkGroteskNeue_598ab8"/>
+              </a:rPr>
+              <a:t>-</a:t>
+            </a:r>
+            <a:r>
+              <a:rPr lang="de-CH" sz="1800" b="0" i="0" dirty="0" err="1">
+                <a:effectLst/>
+                <a:latin typeface="__fkGroteskNeue_598ab8"/>
+              </a:rPr>
+              <a:t>the</a:t>
+            </a:r>
+            <a:r>
+              <a:rPr lang="de-CH" sz="1800" b="0" i="0" dirty="0">
+                <a:effectLst/>
+                <a:latin typeface="__fkGroteskNeue_598ab8"/>
+              </a:rPr>
+              <a:t>-art </a:t>
+            </a:r>
+            <a:r>
+              <a:rPr lang="de-CH" sz="1800" b="0" i="0" dirty="0" err="1">
+                <a:effectLst/>
+                <a:latin typeface="__fkGroteskNeue_598ab8"/>
+              </a:rPr>
+              <a:t>results</a:t>
+            </a:r>
+            <a:r>
+              <a:rPr lang="de-CH" sz="1800" b="0" i="0" dirty="0">
+                <a:effectLst/>
+                <a:latin typeface="__fkGroteskNeue_598ab8"/>
+              </a:rPr>
+              <a:t> in multilingual NER </a:t>
+            </a:r>
+            <a:r>
+              <a:rPr lang="de-CH" sz="1800" b="0" i="0" dirty="0" err="1">
+                <a:effectLst/>
+                <a:latin typeface="__fkGroteskNeue_598ab8"/>
+              </a:rPr>
+              <a:t>tasks</a:t>
+            </a:r>
+            <a:endParaRPr lang="de-CH" sz="1800" b="0" i="0" dirty="0">
+              <a:effectLst/>
+              <a:latin typeface="__fkGroteskNeue_598ab8"/>
+            </a:endParaRPr>
+          </a:p>
+          <a:p>
+            <a:pPr marL="285750" indent="-285750" rtl="0" fontAlgn="ctr">
+              <a:spcBef>
+                <a:spcPts val="0"/>
+              </a:spcBef>
+              <a:spcAft>
+                <a:spcPts val="0"/>
+              </a:spcAft>
+              <a:buFont typeface="Arial" panose="020B0604020202020204" pitchFamily="34" charset="0"/>
+              <a:buChar char="•"/>
+            </a:pPr>
+            <a:r>
+              <a:rPr lang="de-CH" sz="1800" b="0" i="0" dirty="0">
+                <a:effectLst/>
+                <a:latin typeface="__fkGroteskNeue_598ab8"/>
+              </a:rPr>
+              <a:t>Fine-tuning </a:t>
+            </a:r>
+            <a:r>
+              <a:rPr lang="de-CH" sz="1800" b="0" i="0" dirty="0" err="1">
+                <a:effectLst/>
+                <a:latin typeface="__fkGroteskNeue_598ab8"/>
+              </a:rPr>
+              <a:t>flexibility</a:t>
+            </a:r>
+            <a:r>
+              <a:rPr lang="de-CH" sz="1800" b="0" i="0" dirty="0">
+                <a:effectLst/>
+                <a:latin typeface="__fkGroteskNeue_598ab8"/>
+              </a:rPr>
+              <a:t>: </a:t>
+            </a:r>
+            <a:r>
+              <a:rPr lang="de-CH" sz="1800" b="0" i="0" dirty="0" err="1">
+                <a:effectLst/>
+                <a:latin typeface="__fkGroteskNeue_598ab8"/>
+              </a:rPr>
+              <a:t>We</a:t>
+            </a:r>
+            <a:r>
+              <a:rPr lang="de-CH" sz="1800" b="0" i="0" dirty="0">
+                <a:effectLst/>
+                <a:latin typeface="__fkGroteskNeue_598ab8"/>
+              </a:rPr>
+              <a:t> </a:t>
+            </a:r>
+            <a:r>
+              <a:rPr lang="de-CH" sz="1800" b="0" i="0" dirty="0" err="1">
+                <a:effectLst/>
+                <a:latin typeface="__fkGroteskNeue_598ab8"/>
+              </a:rPr>
+              <a:t>can</a:t>
+            </a:r>
+            <a:r>
+              <a:rPr lang="de-CH" sz="1800" b="0" i="0" dirty="0">
+                <a:effectLst/>
+                <a:latin typeface="__fkGroteskNeue_598ab8"/>
+              </a:rPr>
+              <a:t> </a:t>
+            </a:r>
+            <a:r>
+              <a:rPr lang="de-CH" sz="1800" b="0" i="0" dirty="0" err="1">
+                <a:effectLst/>
+                <a:latin typeface="__fkGroteskNeue_598ab8"/>
+              </a:rPr>
+              <a:t>fine</a:t>
+            </a:r>
+            <a:r>
+              <a:rPr lang="de-CH" sz="1800" b="0" i="0" dirty="0">
+                <a:effectLst/>
+                <a:latin typeface="__fkGroteskNeue_598ab8"/>
+              </a:rPr>
+              <a:t>-tune </a:t>
+            </a:r>
+            <a:r>
+              <a:rPr lang="de-CH" sz="1800" b="0" i="0" dirty="0" err="1">
+                <a:effectLst/>
+                <a:latin typeface="__fkGroteskNeue_598ab8"/>
+              </a:rPr>
+              <a:t>this</a:t>
+            </a:r>
+            <a:r>
+              <a:rPr lang="de-CH" sz="1800" b="0" i="0" dirty="0">
+                <a:effectLst/>
+                <a:latin typeface="__fkGroteskNeue_598ab8"/>
+              </a:rPr>
+              <a:t> </a:t>
+            </a:r>
+            <a:r>
+              <a:rPr lang="de-CH" sz="1800" b="0" i="0" dirty="0" err="1">
+                <a:effectLst/>
+                <a:latin typeface="__fkGroteskNeue_598ab8"/>
+              </a:rPr>
+              <a:t>model</a:t>
+            </a:r>
+            <a:r>
+              <a:rPr lang="de-CH" sz="1800" b="0" i="0" dirty="0">
+                <a:effectLst/>
+                <a:latin typeface="__fkGroteskNeue_598ab8"/>
+              </a:rPr>
+              <a:t> on English </a:t>
+            </a:r>
+            <a:r>
+              <a:rPr lang="de-CH" sz="1800" b="0" i="0" dirty="0" err="1">
+                <a:effectLst/>
+                <a:latin typeface="__fkGroteskNeue_598ab8"/>
+              </a:rPr>
+              <a:t>data</a:t>
+            </a:r>
+            <a:r>
+              <a:rPr lang="de-CH" sz="1800" b="0" i="0" dirty="0">
+                <a:effectLst/>
+                <a:latin typeface="__fkGroteskNeue_598ab8"/>
+              </a:rPr>
+              <a:t> and </a:t>
+            </a:r>
+            <a:r>
+              <a:rPr lang="de-CH" sz="1800" b="0" i="0" dirty="0" err="1">
+                <a:effectLst/>
+                <a:latin typeface="__fkGroteskNeue_598ab8"/>
+              </a:rPr>
+              <a:t>then</a:t>
+            </a:r>
+            <a:r>
+              <a:rPr lang="de-CH" sz="1800" b="0" i="0" dirty="0">
+                <a:effectLst/>
+                <a:latin typeface="__fkGroteskNeue_598ab8"/>
+              </a:rPr>
+              <a:t> </a:t>
+            </a:r>
+            <a:r>
+              <a:rPr lang="de-CH" sz="1800" b="0" i="0" dirty="0" err="1">
+                <a:effectLst/>
+                <a:latin typeface="__fkGroteskNeue_598ab8"/>
+              </a:rPr>
+              <a:t>apply</a:t>
+            </a:r>
+            <a:r>
+              <a:rPr lang="de-CH" sz="1800" b="0" i="0" dirty="0">
+                <a:effectLst/>
+                <a:latin typeface="__fkGroteskNeue_598ab8"/>
+              </a:rPr>
+              <a:t> </a:t>
+            </a:r>
+            <a:r>
+              <a:rPr lang="de-CH" sz="1800" b="0" i="0" dirty="0" err="1">
+                <a:effectLst/>
+                <a:latin typeface="__fkGroteskNeue_598ab8"/>
+              </a:rPr>
+              <a:t>it</a:t>
+            </a:r>
+            <a:r>
+              <a:rPr lang="de-CH" sz="1800" b="0" i="0" dirty="0">
+                <a:effectLst/>
+                <a:latin typeface="__fkGroteskNeue_598ab8"/>
+              </a:rPr>
+              <a:t> </a:t>
+            </a:r>
+            <a:r>
+              <a:rPr lang="de-CH" sz="1800" b="0" i="0" dirty="0" err="1">
+                <a:effectLst/>
+                <a:latin typeface="__fkGroteskNeue_598ab8"/>
+              </a:rPr>
+              <a:t>to</a:t>
+            </a:r>
+            <a:r>
+              <a:rPr lang="de-CH" sz="1800" b="0" i="0" dirty="0">
+                <a:effectLst/>
+                <a:latin typeface="__fkGroteskNeue_598ab8"/>
+              </a:rPr>
+              <a:t> </a:t>
+            </a:r>
+            <a:r>
+              <a:rPr lang="de-CH" sz="1800" b="0" i="0" dirty="0" err="1">
+                <a:effectLst/>
+                <a:latin typeface="__fkGroteskNeue_598ab8"/>
+              </a:rPr>
+              <a:t>the</a:t>
+            </a:r>
+            <a:r>
+              <a:rPr lang="de-CH" sz="1800" b="0" i="0" dirty="0">
+                <a:effectLst/>
+                <a:latin typeface="__fkGroteskNeue_598ab8"/>
+              </a:rPr>
+              <a:t> </a:t>
+            </a:r>
+            <a:r>
+              <a:rPr lang="de-CH" sz="1800" b="0" i="0" dirty="0" err="1">
+                <a:effectLst/>
+                <a:latin typeface="__fkGroteskNeue_598ab8"/>
+              </a:rPr>
+              <a:t>other</a:t>
+            </a:r>
+            <a:r>
+              <a:rPr lang="de-CH" sz="1800" b="0" i="0" dirty="0">
+                <a:effectLst/>
+                <a:latin typeface="__fkGroteskNeue_598ab8"/>
+              </a:rPr>
+              <a:t> </a:t>
+            </a:r>
+            <a:r>
+              <a:rPr lang="de-CH" sz="1800" b="0" i="0" dirty="0" err="1">
+                <a:effectLst/>
+                <a:latin typeface="__fkGroteskNeue_598ab8"/>
+              </a:rPr>
+              <a:t>languages</a:t>
+            </a:r>
+            <a:r>
+              <a:rPr lang="de-CH" sz="1800" b="0" i="0" dirty="0">
+                <a:effectLst/>
+                <a:latin typeface="__fkGroteskNeue_598ab8"/>
+              </a:rPr>
+              <a:t> due </a:t>
+            </a:r>
+            <a:r>
+              <a:rPr lang="de-CH" sz="1800" b="0" i="0" dirty="0" err="1">
+                <a:effectLst/>
+                <a:latin typeface="__fkGroteskNeue_598ab8"/>
+              </a:rPr>
+              <a:t>to</a:t>
+            </a:r>
+            <a:r>
+              <a:rPr lang="de-CH" sz="1800" b="0" i="0" dirty="0">
+                <a:effectLst/>
+                <a:latin typeface="__fkGroteskNeue_598ab8"/>
+              </a:rPr>
+              <a:t> </a:t>
+            </a:r>
+            <a:r>
+              <a:rPr lang="de-CH" sz="1800" b="0" i="0" dirty="0" err="1">
+                <a:effectLst/>
+                <a:latin typeface="__fkGroteskNeue_598ab8"/>
+              </a:rPr>
+              <a:t>its</a:t>
+            </a:r>
+            <a:r>
+              <a:rPr lang="de-CH" sz="1800" b="0" i="0" dirty="0">
+                <a:effectLst/>
+                <a:latin typeface="__fkGroteskNeue_598ab8"/>
+              </a:rPr>
+              <a:t> multilingual </a:t>
+            </a:r>
+            <a:r>
+              <a:rPr lang="de-CH" sz="1800" b="0" i="0" dirty="0" err="1">
+                <a:effectLst/>
+                <a:latin typeface="__fkGroteskNeue_598ab8"/>
+              </a:rPr>
+              <a:t>nature</a:t>
+            </a:r>
+            <a:endParaRPr lang="de-CH" sz="1800" b="0" i="0" dirty="0">
+              <a:effectLst/>
+              <a:latin typeface="Calibri" panose="020F0502020204030204" pitchFamily="34" charset="0"/>
+            </a:endParaRPr>
+          </a:p>
+          <a:p>
+            <a:endParaRPr lang="en-US" dirty="0"/>
+          </a:p>
+          <a:p>
+            <a:r>
+              <a:rPr lang="en-US" b="1" dirty="0"/>
+              <a:t>Dataset:</a:t>
+            </a:r>
+          </a:p>
+          <a:p>
+            <a:r>
+              <a:rPr lang="en-US" dirty="0"/>
+              <a:t>Advantages:</a:t>
+            </a:r>
+          </a:p>
+          <a:p>
+            <a:pPr marL="171450" indent="-171450">
+              <a:buFont typeface="Arial" panose="020B0604020202020204" pitchFamily="34" charset="0"/>
+              <a:buChar char="•"/>
+            </a:pPr>
+            <a:r>
+              <a:rPr lang="en-US" dirty="0"/>
+              <a:t>Trained on Wikipedia texts</a:t>
+            </a:r>
+          </a:p>
+          <a:p>
+            <a:pPr marL="171450" indent="-171450">
+              <a:buFont typeface="Arial" panose="020B0604020202020204" pitchFamily="34" charset="0"/>
+              <a:buChar char="•"/>
+            </a:pPr>
+            <a:r>
+              <a:rPr lang="en-US" dirty="0"/>
+              <a:t>In all for us relevant language the size of the train-test-valuation set is identical</a:t>
+            </a:r>
+          </a:p>
+          <a:p>
+            <a:pPr marL="171450" indent="-171450">
+              <a:buFont typeface="Arial" panose="020B0604020202020204" pitchFamily="34" charset="0"/>
+              <a:buChar char="•"/>
+            </a:pPr>
+            <a:r>
+              <a:rPr lang="en-US" dirty="0"/>
+              <a:t>IOB2 format: many modern NLP tools support this format</a:t>
+            </a:r>
+          </a:p>
+        </p:txBody>
+      </p:sp>
+      <p:sp>
+        <p:nvSpPr>
+          <p:cNvPr id="4" name="Slide Number Placeholder 3"/>
+          <p:cNvSpPr>
+            <a:spLocks noGrp="1"/>
+          </p:cNvSpPr>
+          <p:nvPr>
+            <p:ph type="sldNum" sz="quarter" idx="5"/>
+          </p:nvPr>
+        </p:nvSpPr>
+        <p:spPr/>
+        <p:txBody>
+          <a:bodyPr/>
+          <a:lstStyle/>
+          <a:p>
+            <a:fld id="{2DA66685-3D22-47BB-B74E-10995D7F8271}" type="slidenum">
+              <a:rPr lang="en-US" smtClean="0"/>
+              <a:t>5</a:t>
+            </a:fld>
+            <a:endParaRPr lang="en-US"/>
+          </a:p>
+        </p:txBody>
+      </p:sp>
+    </p:spTree>
+    <p:extLst>
+      <p:ext uri="{BB962C8B-B14F-4D97-AF65-F5344CB8AC3E}">
+        <p14:creationId xmlns:p14="http://schemas.microsoft.com/office/powerpoint/2010/main" val="3799296381"/>
+      </p:ext>
+    </p:extLst>
+  </p:cSld>
+  <p:clrMapOvr>
+    <a:masterClrMapping/>
+  </p:clrMapOvr>
+</p:notes>
 </file>
 
 <file path=ppt/slideLayouts/slideLayout1.xml><?xml version="1.0" encoding="utf-8"?>
@@ -305,7 +2272,7 @@
           <a:p>
             <a:fld id="{69F73540-DFB5-4816-8066-5D194A0B149D}" type="datetimeFigureOut">
               <a:rPr lang="de-CH" smtClean="0"/>
-              <a:t>12.01.2025</a:t>
+              <a:t>18.01.2025</a:t>
             </a:fld>
             <a:endParaRPr lang="de-CH"/>
           </a:p>
@@ -580,7 +2547,7 @@
           <a:p>
             <a:fld id="{69F73540-DFB5-4816-8066-5D194A0B149D}" type="datetimeFigureOut">
               <a:rPr lang="de-CH" smtClean="0"/>
-              <a:t>12.01.2025</a:t>
+              <a:t>18.01.2025</a:t>
             </a:fld>
             <a:endParaRPr lang="de-CH"/>
           </a:p>
@@ -774,7 +2741,7 @@
           <a:p>
             <a:fld id="{69F73540-DFB5-4816-8066-5D194A0B149D}" type="datetimeFigureOut">
               <a:rPr lang="de-CH" smtClean="0"/>
-              <a:t>12.01.2025</a:t>
+              <a:t>18.01.2025</a:t>
             </a:fld>
             <a:endParaRPr lang="de-CH"/>
           </a:p>
@@ -1047,7 +3014,7 @@
           <a:p>
             <a:fld id="{69F73540-DFB5-4816-8066-5D194A0B149D}" type="datetimeFigureOut">
               <a:rPr lang="de-CH" smtClean="0"/>
-              <a:t>12.01.2025</a:t>
+              <a:t>18.01.2025</a:t>
             </a:fld>
             <a:endParaRPr lang="de-CH"/>
           </a:p>
@@ -1388,7 +3355,7 @@
           <a:p>
             <a:fld id="{69F73540-DFB5-4816-8066-5D194A0B149D}" type="datetimeFigureOut">
               <a:rPr lang="de-CH" smtClean="0"/>
-              <a:t>12.01.2025</a:t>
+              <a:t>18.01.2025</a:t>
             </a:fld>
             <a:endParaRPr lang="de-CH"/>
           </a:p>
@@ -2011,7 +3978,7 @@
           <a:p>
             <a:fld id="{69F73540-DFB5-4816-8066-5D194A0B149D}" type="datetimeFigureOut">
               <a:rPr lang="de-CH" smtClean="0"/>
-              <a:t>12.01.2025</a:t>
+              <a:t>18.01.2025</a:t>
             </a:fld>
             <a:endParaRPr lang="de-CH"/>
           </a:p>
@@ -2871,7 +4838,7 @@
           <a:p>
             <a:fld id="{69F73540-DFB5-4816-8066-5D194A0B149D}" type="datetimeFigureOut">
               <a:rPr lang="de-CH" smtClean="0"/>
-              <a:t>12.01.2025</a:t>
+              <a:t>18.01.2025</a:t>
             </a:fld>
             <a:endParaRPr lang="de-CH"/>
           </a:p>
@@ -3041,7 +5008,7 @@
           <a:p>
             <a:fld id="{69F73540-DFB5-4816-8066-5D194A0B149D}" type="datetimeFigureOut">
               <a:rPr lang="de-CH" smtClean="0"/>
-              <a:t>12.01.2025</a:t>
+              <a:t>18.01.2025</a:t>
             </a:fld>
             <a:endParaRPr lang="de-CH"/>
           </a:p>
@@ -3221,7 +5188,7 @@
           <a:p>
             <a:fld id="{69F73540-DFB5-4816-8066-5D194A0B149D}" type="datetimeFigureOut">
               <a:rPr lang="de-CH" smtClean="0"/>
-              <a:t>12.01.2025</a:t>
+              <a:t>18.01.2025</a:t>
             </a:fld>
             <a:endParaRPr lang="de-CH"/>
           </a:p>
@@ -3391,7 +5358,7 @@
           <a:p>
             <a:fld id="{69F73540-DFB5-4816-8066-5D194A0B149D}" type="datetimeFigureOut">
               <a:rPr lang="de-CH" smtClean="0"/>
-              <a:t>12.01.2025</a:t>
+              <a:t>18.01.2025</a:t>
             </a:fld>
             <a:endParaRPr lang="de-CH"/>
           </a:p>
@@ -3638,7 +5605,7 @@
           <a:p>
             <a:fld id="{69F73540-DFB5-4816-8066-5D194A0B149D}" type="datetimeFigureOut">
               <a:rPr lang="de-CH" smtClean="0"/>
-              <a:t>12.01.2025</a:t>
+              <a:t>18.01.2025</a:t>
             </a:fld>
             <a:endParaRPr lang="de-CH"/>
           </a:p>
@@ -3930,7 +5897,7 @@
           <a:p>
             <a:fld id="{69F73540-DFB5-4816-8066-5D194A0B149D}" type="datetimeFigureOut">
               <a:rPr lang="de-CH" smtClean="0"/>
-              <a:t>12.01.2025</a:t>
+              <a:t>18.01.2025</a:t>
             </a:fld>
             <a:endParaRPr lang="de-CH"/>
           </a:p>
@@ -4374,7 +6341,7 @@
           <a:p>
             <a:fld id="{69F73540-DFB5-4816-8066-5D194A0B149D}" type="datetimeFigureOut">
               <a:rPr lang="de-CH" smtClean="0"/>
-              <a:t>12.01.2025</a:t>
+              <a:t>18.01.2025</a:t>
             </a:fld>
             <a:endParaRPr lang="de-CH"/>
           </a:p>
@@ -4492,7 +6459,7 @@
           <a:p>
             <a:fld id="{69F73540-DFB5-4816-8066-5D194A0B149D}" type="datetimeFigureOut">
               <a:rPr lang="de-CH" smtClean="0"/>
-              <a:t>12.01.2025</a:t>
+              <a:t>18.01.2025</a:t>
             </a:fld>
             <a:endParaRPr lang="de-CH"/>
           </a:p>
@@ -4587,7 +6554,7 @@
           <a:p>
             <a:fld id="{69F73540-DFB5-4816-8066-5D194A0B149D}" type="datetimeFigureOut">
               <a:rPr lang="de-CH" smtClean="0"/>
-              <a:t>12.01.2025</a:t>
+              <a:t>18.01.2025</a:t>
             </a:fld>
             <a:endParaRPr lang="de-CH"/>
           </a:p>
@@ -4866,7 +6833,7 @@
           <a:p>
             <a:fld id="{69F73540-DFB5-4816-8066-5D194A0B149D}" type="datetimeFigureOut">
               <a:rPr lang="de-CH" smtClean="0"/>
-              <a:t>12.01.2025</a:t>
+              <a:t>18.01.2025</a:t>
             </a:fld>
             <a:endParaRPr lang="de-CH"/>
           </a:p>
@@ -5141,7 +7108,7 @@
           <a:p>
             <a:fld id="{69F73540-DFB5-4816-8066-5D194A0B149D}" type="datetimeFigureOut">
               <a:rPr lang="de-CH" smtClean="0"/>
-              <a:t>12.01.2025</a:t>
+              <a:t>18.01.2025</a:t>
             </a:fld>
             <a:endParaRPr lang="de-CH"/>
           </a:p>
@@ -5570,7 +7537,7 @@
           <a:p>
             <a:fld id="{69F73540-DFB5-4816-8066-5D194A0B149D}" type="datetimeFigureOut">
               <a:rPr lang="de-CH" smtClean="0"/>
-              <a:t>12.01.2025</a:t>
+              <a:t>18.01.2025</a:t>
             </a:fld>
             <a:endParaRPr lang="de-CH"/>
           </a:p>
@@ -6920,10 +8887,192 @@
           <a:bodyPr/>
           <a:lstStyle/>
           <a:p>
-            <a:endParaRPr lang="en-US"/>
-          </a:p>
-        </p:txBody>
-      </p:sp>
+            <a:r>
+              <a:rPr lang="de-CH" dirty="0" err="1"/>
+              <a:t>We</a:t>
+            </a:r>
+            <a:r>
+              <a:rPr lang="de-CH" dirty="0"/>
+              <a:t> </a:t>
+            </a:r>
+            <a:r>
+              <a:rPr lang="de-CH" dirty="0" err="1"/>
+              <a:t>decided</a:t>
+            </a:r>
+            <a:r>
+              <a:rPr lang="de-CH" dirty="0"/>
+              <a:t> </a:t>
+            </a:r>
+            <a:r>
+              <a:rPr lang="de-CH" dirty="0" err="1"/>
+              <a:t>to</a:t>
+            </a:r>
+            <a:r>
+              <a:rPr lang="de-CH" dirty="0"/>
+              <a:t> </a:t>
+            </a:r>
+            <a:r>
+              <a:rPr lang="de-CH" dirty="0" err="1"/>
+              <a:t>take</a:t>
+            </a:r>
+            <a:r>
+              <a:rPr lang="de-CH" dirty="0"/>
+              <a:t> </a:t>
+            </a:r>
+            <a:r>
+              <a:rPr lang="de-CH" dirty="0" err="1"/>
+              <a:t>these</a:t>
+            </a:r>
+            <a:r>
+              <a:rPr lang="de-CH" dirty="0"/>
+              <a:t> </a:t>
+            </a:r>
+            <a:r>
+              <a:rPr lang="de-CH" dirty="0" err="1"/>
+              <a:t>languages</a:t>
+            </a:r>
+            <a:r>
+              <a:rPr lang="de-CH" dirty="0"/>
+              <a:t> </a:t>
+            </a:r>
+            <a:r>
+              <a:rPr lang="de-CH" dirty="0" err="1"/>
+              <a:t>because</a:t>
+            </a:r>
+            <a:r>
+              <a:rPr lang="de-CH" dirty="0"/>
+              <a:t> </a:t>
+            </a:r>
+            <a:r>
+              <a:rPr lang="de-CH" dirty="0" err="1"/>
+              <a:t>they</a:t>
+            </a:r>
+            <a:r>
+              <a:rPr lang="de-CH" dirty="0"/>
+              <a:t> </a:t>
+            </a:r>
+            <a:r>
+              <a:rPr lang="de-CH" dirty="0" err="1"/>
+              <a:t>are</a:t>
+            </a:r>
+            <a:r>
+              <a:rPr lang="de-CH" dirty="0"/>
+              <a:t> </a:t>
+            </a:r>
+            <a:r>
+              <a:rPr lang="de-CH" dirty="0" err="1"/>
+              <a:t>the</a:t>
+            </a:r>
+            <a:r>
+              <a:rPr lang="de-CH" dirty="0"/>
+              <a:t> </a:t>
+            </a:r>
+            <a:r>
+              <a:rPr lang="de-CH" dirty="0" err="1"/>
+              <a:t>official</a:t>
+            </a:r>
+            <a:r>
+              <a:rPr lang="de-CH" dirty="0"/>
+              <a:t> </a:t>
+            </a:r>
+            <a:r>
+              <a:rPr lang="de-CH" dirty="0" err="1"/>
+              <a:t>languages</a:t>
+            </a:r>
+            <a:r>
+              <a:rPr lang="de-CH" dirty="0"/>
+              <a:t> at </a:t>
+            </a:r>
+            <a:r>
+              <a:rPr lang="de-CH" dirty="0" err="1"/>
+              <a:t>the</a:t>
+            </a:r>
+            <a:r>
+              <a:rPr lang="de-CH" dirty="0"/>
+              <a:t> FDFA and </a:t>
+            </a:r>
+            <a:r>
+              <a:rPr lang="de-CH" dirty="0" err="1"/>
+              <a:t>because</a:t>
+            </a:r>
+            <a:r>
+              <a:rPr lang="de-CH" dirty="0"/>
+              <a:t> </a:t>
+            </a:r>
+            <a:r>
+              <a:rPr lang="de-CH" dirty="0" err="1"/>
+              <a:t>we</a:t>
+            </a:r>
+            <a:r>
+              <a:rPr lang="de-CH" dirty="0"/>
+              <a:t> </a:t>
+            </a:r>
+            <a:r>
+              <a:rPr lang="de-CH" dirty="0" err="1"/>
+              <a:t>both</a:t>
+            </a:r>
+            <a:r>
+              <a:rPr lang="de-CH" dirty="0"/>
+              <a:t> </a:t>
+            </a:r>
+            <a:r>
+              <a:rPr lang="de-CH" dirty="0" err="1"/>
+              <a:t>know</a:t>
+            </a:r>
+            <a:r>
+              <a:rPr lang="de-CH" dirty="0"/>
+              <a:t> </a:t>
+            </a:r>
+            <a:r>
+              <a:rPr lang="de-CH" dirty="0" err="1"/>
+              <a:t>them</a:t>
+            </a:r>
+            <a:r>
+              <a:rPr lang="de-CH" dirty="0"/>
+              <a:t> at least a </a:t>
+            </a:r>
+            <a:r>
+              <a:rPr lang="de-CH" dirty="0" err="1"/>
+              <a:t>bit</a:t>
+            </a:r>
+            <a:r>
+              <a:rPr lang="de-CH" dirty="0"/>
+              <a:t>.</a:t>
+            </a:r>
+            <a:endParaRPr lang="en-US" dirty="0"/>
+          </a:p>
+        </p:txBody>
+      </p:sp>
+      <p:pic>
+        <p:nvPicPr>
+          <p:cNvPr id="5" name="Picture 4">
+            <a:extLst>
+              <a:ext uri="{FF2B5EF4-FFF2-40B4-BE49-F238E27FC236}">
+                <a16:creationId xmlns:a16="http://schemas.microsoft.com/office/drawing/2014/main" id="{15215FE5-25F7-4E16-8938-A79C1815D6E5}"/>
+              </a:ext>
+            </a:extLst>
+          </p:cNvPr>
+          <p:cNvPicPr>
+            <a:picLocks noChangeAspect="1"/>
+          </p:cNvPicPr>
+          <p:nvPr/>
+        </p:nvPicPr>
+        <p:blipFill>
+          <a:blip r:embed="rId2"/>
+          <a:stretch>
+            <a:fillRect/>
+          </a:stretch>
+        </p:blipFill>
+        <p:spPr>
+          <a:xfrm>
+            <a:off x="4082602" y="2957137"/>
+            <a:ext cx="4233691" cy="3145958"/>
+          </a:xfrm>
+          <a:prstGeom prst="rect">
+            <a:avLst/>
+          </a:prstGeom>
+        </p:spPr>
+      </p:pic>
     </p:spTree>
     <p:extLst>
       <p:ext uri="{BB962C8B-B14F-4D97-AF65-F5344CB8AC3E}">
@@ -7020,13 +9169,626 @@
         </p:nvSpPr>
         <p:spPr/>
         <p:txBody>
-          <a:bodyPr/>
+          <a:bodyPr>
+            <a:normAutofit/>
+          </a:bodyPr>
           <a:lstStyle/>
           <a:p>
-            <a:endParaRPr lang="en-US"/>
-          </a:p>
-        </p:txBody>
-      </p:sp>
+            <a:r>
+              <a:rPr lang="de-CH" dirty="0"/>
+              <a:t>Model: </a:t>
+            </a:r>
+            <a:r>
+              <a:rPr lang="de-CH" b="1" dirty="0" err="1"/>
+              <a:t>WikiNeural</a:t>
+            </a:r>
+            <a:r>
+              <a:rPr lang="de-CH" b="1" dirty="0"/>
+              <a:t> Multilingual NER</a:t>
+            </a:r>
+            <a:r>
+              <a:rPr lang="de-CH" dirty="0"/>
+              <a:t>: </a:t>
+            </a:r>
+            <a:r>
+              <a:rPr lang="en-US" sz="1600" dirty="0"/>
+              <a:t>a state-of-the-art named entity recognition model that supports 9 different languages. Built by </a:t>
+            </a:r>
+            <a:r>
+              <a:rPr lang="en-US" sz="1600" dirty="0" err="1"/>
+              <a:t>Babelscape</a:t>
+            </a:r>
+            <a:r>
+              <a:rPr lang="en-US" sz="1600" dirty="0"/>
+              <a:t>, it's based on </a:t>
+            </a:r>
+            <a:r>
+              <a:rPr lang="en-US" sz="1600" dirty="0" err="1"/>
+              <a:t>mBERT</a:t>
+            </a:r>
+            <a:r>
+              <a:rPr lang="en-US" sz="1600" dirty="0"/>
+              <a:t> and fine-tuned on the </a:t>
+            </a:r>
+            <a:r>
+              <a:rPr lang="en-US" sz="1600" dirty="0" err="1"/>
+              <a:t>WikiNEuRal</a:t>
+            </a:r>
+            <a:r>
+              <a:rPr lang="en-US" sz="1600" dirty="0"/>
+              <a:t> dataset, specifically designed to address the challenge of data scarcity in multilingual NER tasks.</a:t>
+            </a:r>
+          </a:p>
+          <a:p>
+            <a:pPr marL="0" indent="0">
+              <a:buNone/>
+            </a:pPr>
+            <a:r>
+              <a:rPr lang="en-US" sz="1600" dirty="0"/>
+              <a:t>	</a:t>
+            </a:r>
+            <a:r>
+              <a:rPr lang="en-US" sz="1400" dirty="0" err="1">
+                <a:hlinkClick r:id="rId3"/>
+              </a:rPr>
+              <a:t>wikineural</a:t>
+            </a:r>
+            <a:r>
+              <a:rPr lang="en-US" sz="1400" dirty="0">
+                <a:hlinkClick r:id="rId3"/>
+              </a:rPr>
+              <a:t>-multilingual-</a:t>
+            </a:r>
+            <a:r>
+              <a:rPr lang="en-US" sz="1400" dirty="0" err="1">
+                <a:hlinkClick r:id="rId3"/>
+              </a:rPr>
+              <a:t>ner</a:t>
+            </a:r>
+            <a:endParaRPr lang="en-US" sz="1600" dirty="0"/>
+          </a:p>
+          <a:p>
+            <a:pPr marL="0" indent="0">
+              <a:buNone/>
+            </a:pPr>
+            <a:endParaRPr lang="en-US" sz="1600" dirty="0"/>
+          </a:p>
+          <a:p>
+            <a:r>
+              <a:rPr lang="en-US" dirty="0"/>
+              <a:t>Dataset: </a:t>
+            </a:r>
+            <a:r>
+              <a:rPr lang="en-US" b="1" dirty="0" err="1"/>
+              <a:t>WikiANN</a:t>
+            </a:r>
+            <a:r>
+              <a:rPr lang="en-US" b="1" dirty="0"/>
+              <a:t> </a:t>
+            </a:r>
+            <a:r>
+              <a:rPr lang="en-US" dirty="0"/>
+              <a:t>from </a:t>
+            </a:r>
+            <a:r>
+              <a:rPr lang="en-US" dirty="0" err="1"/>
+              <a:t>unimelb</a:t>
+            </a:r>
+            <a:r>
+              <a:rPr lang="en-US" dirty="0"/>
+              <a:t>: </a:t>
+            </a:r>
+            <a:r>
+              <a:rPr lang="en-US" sz="1600" dirty="0"/>
+              <a:t>(sometimes called PAN-X) is a multilingual named entity recognition dataset consisting of Wikipedia articles annotated with LOC (location), PER (person), and ORG (</a:t>
+            </a:r>
+            <a:r>
+              <a:rPr lang="en-US" sz="1600" dirty="0" err="1"/>
+              <a:t>organisation</a:t>
+            </a:r>
+            <a:r>
+              <a:rPr lang="en-US" sz="1600" dirty="0"/>
+              <a:t>) tags in the IOB2 format. This version corresponds to the balanced train, dev, and test splits of Rahimi et al. (2019), which supports 176 of the 282 languages from the original </a:t>
+            </a:r>
+            <a:r>
+              <a:rPr lang="en-US" sz="1600" dirty="0" err="1"/>
+              <a:t>WikiANN</a:t>
+            </a:r>
+            <a:r>
+              <a:rPr lang="en-US" sz="1600" dirty="0"/>
+              <a:t> corpus.</a:t>
+            </a:r>
+          </a:p>
+          <a:p>
+            <a:pPr lvl="1"/>
+            <a:r>
+              <a:rPr lang="en-US" sz="1400" dirty="0"/>
+              <a:t>train-test-split for EN, FR, IT and DE </a:t>
+            </a:r>
+          </a:p>
+          <a:p>
+            <a:pPr marL="0" indent="0">
+              <a:buNone/>
+            </a:pPr>
+            <a:r>
+              <a:rPr lang="en-US" dirty="0"/>
+              <a:t>	</a:t>
+            </a:r>
+            <a:r>
+              <a:rPr lang="en-US" sz="1400" dirty="0" err="1">
+                <a:hlinkClick r:id="rId4"/>
+              </a:rPr>
+              <a:t>unimelb-nlp</a:t>
+            </a:r>
+            <a:r>
+              <a:rPr lang="en-US" sz="1400" dirty="0">
+                <a:hlinkClick r:id="rId4"/>
+              </a:rPr>
+              <a:t>/</a:t>
+            </a:r>
+            <a:r>
+              <a:rPr lang="en-US" sz="1400" dirty="0" err="1">
+                <a:hlinkClick r:id="rId4"/>
+              </a:rPr>
+              <a:t>wikiann</a:t>
+            </a:r>
+            <a:r>
+              <a:rPr lang="en-US" sz="1400" dirty="0">
+                <a:hlinkClick r:id="rId4"/>
+              </a:rPr>
+              <a:t> · Datasets at Hugging Face</a:t>
+            </a:r>
+            <a:endParaRPr lang="en-US" sz="1400" dirty="0"/>
+          </a:p>
+          <a:p>
+            <a:endParaRPr lang="en-US" sz="1400" dirty="0"/>
+          </a:p>
+          <a:p>
+            <a:endParaRPr lang="de-CH" dirty="0"/>
+          </a:p>
+          <a:p>
+            <a:pPr marL="0" indent="0">
+              <a:buNone/>
+            </a:pPr>
+            <a:endParaRPr lang="en-US" dirty="0"/>
+          </a:p>
+        </p:txBody>
+      </p:sp>
+      <p:graphicFrame>
+        <p:nvGraphicFramePr>
+          <p:cNvPr id="4" name="Table 3">
+            <a:extLst>
+              <a:ext uri="{FF2B5EF4-FFF2-40B4-BE49-F238E27FC236}">
+                <a16:creationId xmlns:a16="http://schemas.microsoft.com/office/drawing/2014/main" id="{548A283C-B4DF-475D-A429-AF5C9220961A}"/>
+              </a:ext>
+            </a:extLst>
+          </p:cNvPr>
+          <p:cNvGraphicFramePr>
+            <a:graphicFrameLocks noGrp="1"/>
+          </p:cNvGraphicFramePr>
+          <p:nvPr>
+            <p:extLst>
+              <p:ext uri="{D42A27DB-BD31-4B8C-83A1-F6EECF244321}">
+                <p14:modId xmlns:p14="http://schemas.microsoft.com/office/powerpoint/2010/main" val="1096517763"/>
+              </p:ext>
+            </p:extLst>
+          </p:nvPr>
+        </p:nvGraphicFramePr>
+        <p:xfrm>
+          <a:off x="6096000" y="5377373"/>
+          <a:ext cx="2617910" cy="871026"/>
+        </p:xfrm>
+        <a:graphic>
+          <a:graphicData uri="http://schemas.openxmlformats.org/drawingml/2006/table">
+            <a:tbl>
+              <a:tblPr/>
+              <a:tblGrid>
+                <a:gridCol w="854279">
+                  <a:extLst>
+                    <a:ext uri="{9D8B030D-6E8A-4147-A177-3AD203B41FA5}">
+                      <a16:colId xmlns:a16="http://schemas.microsoft.com/office/drawing/2014/main" val="2026688250"/>
+                    </a:ext>
+                  </a:extLst>
+                </a:gridCol>
+                <a:gridCol w="1068169">
+                  <a:extLst>
+                    <a:ext uri="{9D8B030D-6E8A-4147-A177-3AD203B41FA5}">
+                      <a16:colId xmlns:a16="http://schemas.microsoft.com/office/drawing/2014/main" val="410777728"/>
+                    </a:ext>
+                  </a:extLst>
+                </a:gridCol>
+                <a:gridCol w="695462">
+                  <a:extLst>
+                    <a:ext uri="{9D8B030D-6E8A-4147-A177-3AD203B41FA5}">
+                      <a16:colId xmlns:a16="http://schemas.microsoft.com/office/drawing/2014/main" val="1557949614"/>
+                    </a:ext>
+                  </a:extLst>
+                </a:gridCol>
+              </a:tblGrid>
+              <a:tr h="435513">
+                <a:tc>
+                  <a:txBody>
+                    <a:bodyPr/>
+                    <a:lstStyle/>
+                    <a:p>
+                      <a:pPr marL="0" marR="0" fontAlgn="t">
+                        <a:spcBef>
+                          <a:spcPts val="0"/>
+                        </a:spcBef>
+                        <a:spcAft>
+                          <a:spcPts val="0"/>
+                        </a:spcAft>
+                      </a:pPr>
+                      <a:r>
+                        <a:rPr lang="de-CH" sz="1400" b="1" dirty="0">
+                          <a:effectLst/>
+                          <a:latin typeface="Calibri" panose="020F0502020204030204" pitchFamily="34" charset="0"/>
+                        </a:rPr>
+                        <a:t>Train</a:t>
+                      </a:r>
+                    </a:p>
+                  </a:txBody>
+                  <a:tcPr marL="50800" marR="50800" marT="50800" marB="50800">
+                    <a:lnL w="12700" cap="flat" cmpd="sng" algn="ctr">
+                      <a:solidFill>
+                        <a:srgbClr val="A3A3A3"/>
+                      </a:solidFill>
+                      <a:prstDash val="solid"/>
+                      <a:round/>
+                      <a:headEnd type="none" w="med" len="med"/>
+                      <a:tailEnd type="none" w="med" len="med"/>
+                    </a:lnL>
+                    <a:lnR w="12700" cap="flat" cmpd="sng" algn="ctr">
+                      <a:solidFill>
+                        <a:srgbClr val="A3A3A3"/>
+                      </a:solidFill>
+                      <a:prstDash val="solid"/>
+                      <a:round/>
+                      <a:headEnd type="none" w="med" len="med"/>
+                      <a:tailEnd type="none" w="med" len="med"/>
+                    </a:lnR>
+                    <a:lnT w="12700" cap="flat" cmpd="sng" algn="ctr">
+                      <a:solidFill>
+                        <a:srgbClr val="A3A3A3"/>
+                      </a:solidFill>
+                      <a:prstDash val="solid"/>
+                      <a:round/>
+                      <a:headEnd type="none" w="med" len="med"/>
+                      <a:tailEnd type="none" w="med" len="med"/>
+                    </a:lnT>
+                    <a:lnB w="12700" cap="flat" cmpd="sng" algn="ctr">
+                      <a:solidFill>
+                        <a:srgbClr val="A3A3A3"/>
+                      </a:solidFill>
+                      <a:prstDash val="solid"/>
+                      <a:round/>
+                      <a:headEnd type="none" w="med" len="med"/>
+                      <a:tailEnd type="none" w="med" len="med"/>
+                    </a:lnB>
+                  </a:tcPr>
+                </a:tc>
+                <a:tc>
+                  <a:txBody>
+                    <a:bodyPr/>
+                    <a:lstStyle/>
+                    <a:p>
+                      <a:pPr marL="0" marR="0" fontAlgn="t">
+                        <a:spcBef>
+                          <a:spcPts val="0"/>
+                        </a:spcBef>
+                        <a:spcAft>
+                          <a:spcPts val="0"/>
+                        </a:spcAft>
+                      </a:pPr>
+                      <a:r>
+                        <a:rPr lang="de-CH" sz="1400" b="1">
+                          <a:effectLst/>
+                          <a:latin typeface="Calibri" panose="020F0502020204030204" pitchFamily="34" charset="0"/>
+                        </a:rPr>
+                        <a:t>Validation</a:t>
+                      </a:r>
+                    </a:p>
+                  </a:txBody>
+                  <a:tcPr marL="50800" marR="50800" marT="50800" marB="50800">
+                    <a:lnL w="12700" cap="flat" cmpd="sng" algn="ctr">
+                      <a:solidFill>
+                        <a:srgbClr val="A3A3A3"/>
+                      </a:solidFill>
+                      <a:prstDash val="solid"/>
+                      <a:round/>
+                      <a:headEnd type="none" w="med" len="med"/>
+                      <a:tailEnd type="none" w="med" len="med"/>
+                    </a:lnL>
+                    <a:lnR w="12700" cap="flat" cmpd="sng" algn="ctr">
+                      <a:solidFill>
+                        <a:srgbClr val="A3A3A3"/>
+                      </a:solidFill>
+                      <a:prstDash val="solid"/>
+                      <a:round/>
+                      <a:headEnd type="none" w="med" len="med"/>
+                      <a:tailEnd type="none" w="med" len="med"/>
+                    </a:lnR>
+                    <a:lnT w="12700" cap="flat" cmpd="sng" algn="ctr">
+                      <a:solidFill>
+                        <a:srgbClr val="A3A3A3"/>
+                      </a:solidFill>
+                      <a:prstDash val="solid"/>
+                      <a:round/>
+                      <a:headEnd type="none" w="med" len="med"/>
+                      <a:tailEnd type="none" w="med" len="med"/>
+                    </a:lnT>
+                    <a:lnB w="12700" cap="flat" cmpd="sng" algn="ctr">
+                      <a:solidFill>
+                        <a:srgbClr val="A3A3A3"/>
+                      </a:solidFill>
+                      <a:prstDash val="solid"/>
+                      <a:round/>
+                      <a:headEnd type="none" w="med" len="med"/>
+                      <a:tailEnd type="none" w="med" len="med"/>
+                    </a:lnB>
+                  </a:tcPr>
+                </a:tc>
+                <a:tc>
+                  <a:txBody>
+                    <a:bodyPr/>
+                    <a:lstStyle/>
+                    <a:p>
+                      <a:pPr marL="0" marR="0" fontAlgn="t">
+                        <a:spcBef>
+                          <a:spcPts val="0"/>
+                        </a:spcBef>
+                        <a:spcAft>
+                          <a:spcPts val="0"/>
+                        </a:spcAft>
+                      </a:pPr>
+                      <a:r>
+                        <a:rPr lang="de-CH" sz="1400" b="1" dirty="0">
+                          <a:effectLst/>
+                          <a:latin typeface="Calibri" panose="020F0502020204030204" pitchFamily="34" charset="0"/>
+                        </a:rPr>
+                        <a:t>Test</a:t>
+                      </a:r>
+                    </a:p>
+                  </a:txBody>
+                  <a:tcPr marL="50800" marR="50800" marT="50800" marB="50800">
+                    <a:lnL w="12700" cap="flat" cmpd="sng" algn="ctr">
+                      <a:solidFill>
+                        <a:srgbClr val="A3A3A3"/>
+                      </a:solidFill>
+                      <a:prstDash val="solid"/>
+                      <a:round/>
+                      <a:headEnd type="none" w="med" len="med"/>
+                      <a:tailEnd type="none" w="med" len="med"/>
+                    </a:lnL>
+                    <a:lnR w="12700" cap="flat" cmpd="sng" algn="ctr">
+                      <a:solidFill>
+                        <a:srgbClr val="A3A3A3"/>
+                      </a:solidFill>
+                      <a:prstDash val="solid"/>
+                      <a:round/>
+                      <a:headEnd type="none" w="med" len="med"/>
+                      <a:tailEnd type="none" w="med" len="med"/>
+                    </a:lnR>
+                    <a:lnT w="12700" cap="flat" cmpd="sng" algn="ctr">
+                      <a:solidFill>
+                        <a:srgbClr val="A3A3A3"/>
+                      </a:solidFill>
+                      <a:prstDash val="solid"/>
+                      <a:round/>
+                      <a:headEnd type="none" w="med" len="med"/>
+                      <a:tailEnd type="none" w="med" len="med"/>
+                    </a:lnT>
+                    <a:lnB w="12700" cap="flat" cmpd="sng" algn="ctr">
+                      <a:solidFill>
+                        <a:srgbClr val="A3A3A3"/>
+                      </a:solidFill>
+                      <a:prstDash val="solid"/>
+                      <a:round/>
+                      <a:headEnd type="none" w="med" len="med"/>
+                      <a:tailEnd type="none" w="med" len="med"/>
+                    </a:lnB>
+                  </a:tcPr>
+                </a:tc>
+                <a:extLst>
+                  <a:ext uri="{0D108BD9-81ED-4DB2-BD59-A6C34878D82A}">
+                    <a16:rowId xmlns:a16="http://schemas.microsoft.com/office/drawing/2014/main" val="1363099551"/>
+                  </a:ext>
+                </a:extLst>
+              </a:tr>
+              <a:tr h="435513">
+                <a:tc>
+                  <a:txBody>
+                    <a:bodyPr/>
+                    <a:lstStyle/>
+                    <a:p>
+                      <a:pPr marL="0" marR="0" fontAlgn="t">
+                        <a:spcBef>
+                          <a:spcPts val="0"/>
+                        </a:spcBef>
+                        <a:spcAft>
+                          <a:spcPts val="0"/>
+                        </a:spcAft>
+                      </a:pPr>
+                      <a:r>
+                        <a:rPr lang="de-CH" sz="1400" dirty="0">
+                          <a:effectLst/>
+                          <a:latin typeface="Calibri" panose="020F0502020204030204" pitchFamily="34" charset="0"/>
+                        </a:rPr>
+                        <a:t>20000</a:t>
+                      </a:r>
+                    </a:p>
+                  </a:txBody>
+                  <a:tcPr marL="50800" marR="50800" marT="50800" marB="50800">
+                    <a:lnL w="12700" cap="flat" cmpd="sng" algn="ctr">
+                      <a:solidFill>
+                        <a:srgbClr val="A3A3A3"/>
+                      </a:solidFill>
+                      <a:prstDash val="solid"/>
+                      <a:round/>
+                      <a:headEnd type="none" w="med" len="med"/>
+                      <a:tailEnd type="none" w="med" len="med"/>
+                    </a:lnL>
+                    <a:lnR w="12700" cap="flat" cmpd="sng" algn="ctr">
+                      <a:solidFill>
+                        <a:srgbClr val="A3A3A3"/>
+                      </a:solidFill>
+                      <a:prstDash val="solid"/>
+                      <a:round/>
+                      <a:headEnd type="none" w="med" len="med"/>
+                      <a:tailEnd type="none" w="med" len="med"/>
+                    </a:lnR>
+                    <a:lnT w="12700" cap="flat" cmpd="sng" algn="ctr">
+                      <a:solidFill>
+                        <a:srgbClr val="A3A3A3"/>
+                      </a:solidFill>
+                      <a:prstDash val="solid"/>
+                      <a:round/>
+                      <a:headEnd type="none" w="med" len="med"/>
+                      <a:tailEnd type="none" w="med" len="med"/>
+                    </a:lnT>
+                    <a:lnB w="12700" cap="flat" cmpd="sng" algn="ctr">
+                      <a:solidFill>
+                        <a:srgbClr val="A3A3A3"/>
+                      </a:solidFill>
+                      <a:prstDash val="solid"/>
+                      <a:round/>
+                      <a:headEnd type="none" w="med" len="med"/>
+                      <a:tailEnd type="none" w="med" len="med"/>
+                    </a:lnB>
+                  </a:tcPr>
+                </a:tc>
+                <a:tc>
+                  <a:txBody>
+                    <a:bodyPr/>
+                    <a:lstStyle/>
+                    <a:p>
+                      <a:pPr marL="0" marR="0" fontAlgn="t">
+                        <a:spcBef>
+                          <a:spcPts val="0"/>
+                        </a:spcBef>
+                        <a:spcAft>
+                          <a:spcPts val="0"/>
+                        </a:spcAft>
+                      </a:pPr>
+                      <a:r>
+                        <a:rPr lang="de-CH" sz="1400">
+                          <a:effectLst/>
+                          <a:latin typeface="Calibri" panose="020F0502020204030204" pitchFamily="34" charset="0"/>
+                        </a:rPr>
+                        <a:t>10000</a:t>
+                      </a:r>
+                    </a:p>
+                  </a:txBody>
+                  <a:tcPr marL="50800" marR="50800" marT="50800" marB="50800">
+                    <a:lnL w="12700" cap="flat" cmpd="sng" algn="ctr">
+                      <a:solidFill>
+                        <a:srgbClr val="A3A3A3"/>
+                      </a:solidFill>
+                      <a:prstDash val="solid"/>
+                      <a:round/>
+                      <a:headEnd type="none" w="med" len="med"/>
+                      <a:tailEnd type="none" w="med" len="med"/>
+                    </a:lnL>
+                    <a:lnR w="12700" cap="flat" cmpd="sng" algn="ctr">
+                      <a:solidFill>
+                        <a:srgbClr val="A3A3A3"/>
+                      </a:solidFill>
+                      <a:prstDash val="solid"/>
+                      <a:round/>
+                      <a:headEnd type="none" w="med" len="med"/>
+                      <a:tailEnd type="none" w="med" len="med"/>
+                    </a:lnR>
+                    <a:lnT w="12700" cap="flat" cmpd="sng" algn="ctr">
+                      <a:solidFill>
+                        <a:srgbClr val="A3A3A3"/>
+                      </a:solidFill>
+                      <a:prstDash val="solid"/>
+                      <a:round/>
+                      <a:headEnd type="none" w="med" len="med"/>
+                      <a:tailEnd type="none" w="med" len="med"/>
+                    </a:lnT>
+                    <a:lnB w="12700" cap="flat" cmpd="sng" algn="ctr">
+                      <a:solidFill>
+                        <a:srgbClr val="A3A3A3"/>
+                      </a:solidFill>
+                      <a:prstDash val="solid"/>
+                      <a:round/>
+                      <a:headEnd type="none" w="med" len="med"/>
+                      <a:tailEnd type="none" w="med" len="med"/>
+                    </a:lnB>
+                  </a:tcPr>
+                </a:tc>
+                <a:tc>
+                  <a:txBody>
+                    <a:bodyPr/>
+                    <a:lstStyle/>
+                    <a:p>
+                      <a:pPr marL="0" marR="0" fontAlgn="t">
+                        <a:spcBef>
+                          <a:spcPts val="0"/>
+                        </a:spcBef>
+                        <a:spcAft>
+                          <a:spcPts val="0"/>
+                        </a:spcAft>
+                      </a:pPr>
+                      <a:r>
+                        <a:rPr lang="de-CH" sz="1400" dirty="0">
+                          <a:effectLst/>
+                          <a:latin typeface="Calibri" panose="020F0502020204030204" pitchFamily="34" charset="0"/>
+                        </a:rPr>
+                        <a:t>10000</a:t>
+                      </a:r>
+                    </a:p>
+                  </a:txBody>
+                  <a:tcPr marL="50800" marR="50800" marT="50800" marB="50800">
+                    <a:lnL w="12700" cap="flat" cmpd="sng" algn="ctr">
+                      <a:solidFill>
+                        <a:srgbClr val="A3A3A3"/>
+                      </a:solidFill>
+                      <a:prstDash val="solid"/>
+                      <a:round/>
+                      <a:headEnd type="none" w="med" len="med"/>
+                      <a:tailEnd type="none" w="med" len="med"/>
+                    </a:lnL>
+                    <a:lnR w="12700" cap="flat" cmpd="sng" algn="ctr">
+                      <a:solidFill>
+                        <a:srgbClr val="A3A3A3"/>
+                      </a:solidFill>
+                      <a:prstDash val="solid"/>
+                      <a:round/>
+                      <a:headEnd type="none" w="med" len="med"/>
+                      <a:tailEnd type="none" w="med" len="med"/>
+                    </a:lnR>
+                    <a:lnT w="12700" cap="flat" cmpd="sng" algn="ctr">
+                      <a:solidFill>
+                        <a:srgbClr val="A3A3A3"/>
+                      </a:solidFill>
+                      <a:prstDash val="solid"/>
+                      <a:round/>
+                      <a:headEnd type="none" w="med" len="med"/>
+                      <a:tailEnd type="none" w="med" len="med"/>
+                    </a:lnT>
+                    <a:lnB w="12700" cap="flat" cmpd="sng" algn="ctr">
+                      <a:solidFill>
+                        <a:srgbClr val="A3A3A3"/>
+                      </a:solidFill>
+                      <a:prstDash val="solid"/>
+                      <a:round/>
+                      <a:headEnd type="none" w="med" len="med"/>
+                      <a:tailEnd type="none" w="med" len="med"/>
+                    </a:lnB>
+                  </a:tcPr>
+                </a:tc>
+                <a:extLst>
+                  <a:ext uri="{0D108BD9-81ED-4DB2-BD59-A6C34878D82A}">
+                    <a16:rowId xmlns:a16="http://schemas.microsoft.com/office/drawing/2014/main" val="3808566762"/>
+                  </a:ext>
+                </a:extLst>
+              </a:tr>
+            </a:tbl>
+          </a:graphicData>
+        </a:graphic>
+      </p:graphicFrame>
     </p:spTree>
     <p:extLst>
       <p:ext uri="{BB962C8B-B14F-4D97-AF65-F5344CB8AC3E}">
@@ -7126,7 +9888,7 @@
           <a:bodyPr/>
           <a:lstStyle/>
           <a:p>
-            <a:endParaRPr lang="en-US"/>
+            <a:endParaRPr lang="en-US" dirty="0"/>
           </a:p>
         </p:txBody>
       </p:sp>
@@ -7237,7 +9999,294 @@
           <a:bodyPr/>
           <a:lstStyle/>
           <a:p>
-            <a:endParaRPr lang="en-US"/>
+            <a:r>
+              <a:rPr lang="de-CH" dirty="0"/>
+              <a:t>Monolingual vs. multilingual </a:t>
+            </a:r>
+            <a:r>
+              <a:rPr lang="de-CH" dirty="0" err="1"/>
+              <a:t>training</a:t>
+            </a:r>
+            <a:r>
+              <a:rPr lang="de-CH" dirty="0"/>
+              <a:t>:</a:t>
+            </a:r>
+          </a:p>
+          <a:p>
+            <a:pPr lvl="1"/>
+            <a:r>
+              <a:rPr lang="de-CH" dirty="0" err="1"/>
+              <a:t>Less</a:t>
+            </a:r>
+            <a:r>
+              <a:rPr lang="de-CH" dirty="0"/>
+              <a:t> </a:t>
+            </a:r>
+            <a:r>
+              <a:rPr lang="de-CH" dirty="0" err="1"/>
+              <a:t>computational</a:t>
+            </a:r>
+            <a:r>
+              <a:rPr lang="de-CH" dirty="0"/>
+              <a:t> power </a:t>
+            </a:r>
+            <a:r>
+              <a:rPr lang="de-CH" dirty="0" err="1"/>
+              <a:t>needed</a:t>
+            </a:r>
+            <a:endParaRPr lang="de-CH" dirty="0"/>
+          </a:p>
+          <a:p>
+            <a:pPr lvl="1"/>
+            <a:r>
+              <a:rPr lang="de-CH" dirty="0"/>
+              <a:t>Simpler </a:t>
+            </a:r>
+            <a:r>
+              <a:rPr lang="de-CH" dirty="0" err="1"/>
+              <a:t>setup</a:t>
+            </a:r>
+            <a:r>
+              <a:rPr lang="de-CH" dirty="0"/>
+              <a:t>, </a:t>
+            </a:r>
+            <a:r>
+              <a:rPr lang="de-CH" dirty="0" err="1"/>
+              <a:t>faster</a:t>
+            </a:r>
+            <a:r>
+              <a:rPr lang="de-CH" dirty="0"/>
+              <a:t> </a:t>
+            </a:r>
+            <a:r>
+              <a:rPr lang="de-CH" dirty="0" err="1"/>
+              <a:t>training</a:t>
+            </a:r>
+            <a:endParaRPr lang="de-CH" dirty="0"/>
+          </a:p>
+          <a:p>
+            <a:pPr lvl="1"/>
+            <a:r>
+              <a:rPr lang="de-CH" dirty="0"/>
+              <a:t>Zero-</a:t>
+            </a:r>
+            <a:r>
+              <a:rPr lang="de-CH" dirty="0" err="1"/>
+              <a:t>shot</a:t>
+            </a:r>
+            <a:r>
+              <a:rPr lang="de-CH" dirty="0"/>
+              <a:t>-cross-lingual </a:t>
+            </a:r>
+            <a:r>
+              <a:rPr lang="de-CH" dirty="0" err="1"/>
+              <a:t>capacities</a:t>
+            </a:r>
+            <a:r>
+              <a:rPr lang="de-CH" dirty="0"/>
+              <a:t> </a:t>
+            </a:r>
+            <a:r>
+              <a:rPr lang="de-CH" dirty="0" err="1"/>
+              <a:t>of</a:t>
+            </a:r>
+            <a:r>
+              <a:rPr lang="de-CH" dirty="0"/>
+              <a:t> </a:t>
+            </a:r>
+            <a:r>
+              <a:rPr lang="de-CH" dirty="0" err="1"/>
+              <a:t>the</a:t>
+            </a:r>
+            <a:r>
+              <a:rPr lang="de-CH" dirty="0"/>
+              <a:t> </a:t>
+            </a:r>
+            <a:r>
+              <a:rPr lang="de-CH" dirty="0" err="1"/>
+              <a:t>models</a:t>
+            </a:r>
+            <a:r>
+              <a:rPr lang="de-CH" dirty="0"/>
+              <a:t> </a:t>
+            </a:r>
+            <a:r>
+              <a:rPr lang="de-CH" dirty="0" err="1"/>
+              <a:t>can</a:t>
+            </a:r>
+            <a:r>
+              <a:rPr lang="de-CH" dirty="0"/>
+              <a:t> </a:t>
+            </a:r>
+            <a:r>
+              <a:rPr lang="de-CH" dirty="0" err="1"/>
+              <a:t>be</a:t>
+            </a:r>
+            <a:r>
+              <a:rPr lang="de-CH" dirty="0"/>
+              <a:t> </a:t>
+            </a:r>
+            <a:r>
+              <a:rPr lang="de-CH" dirty="0" err="1"/>
+              <a:t>used</a:t>
+            </a:r>
+            <a:endParaRPr lang="de-CH" dirty="0"/>
+          </a:p>
+          <a:p>
+            <a:pPr lvl="1"/>
+            <a:r>
+              <a:rPr lang="de-CH" dirty="0"/>
+              <a:t>Evaluation </a:t>
+            </a:r>
+            <a:r>
+              <a:rPr lang="de-CH" dirty="0" err="1"/>
+              <a:t>of</a:t>
+            </a:r>
+            <a:r>
+              <a:rPr lang="de-CH" dirty="0"/>
+              <a:t> </a:t>
+            </a:r>
+            <a:r>
+              <a:rPr lang="de-CH" dirty="0" err="1"/>
+              <a:t>cross</a:t>
+            </a:r>
+            <a:r>
+              <a:rPr lang="de-CH" dirty="0"/>
+              <a:t>-lingual </a:t>
+            </a:r>
+            <a:r>
+              <a:rPr lang="de-CH" dirty="0" err="1"/>
+              <a:t>transfer</a:t>
+            </a:r>
+            <a:r>
+              <a:rPr lang="de-CH" dirty="0"/>
+              <a:t> </a:t>
+            </a:r>
+            <a:r>
+              <a:rPr lang="de-CH" dirty="0" err="1"/>
+              <a:t>is</a:t>
+            </a:r>
+            <a:r>
+              <a:rPr lang="de-CH" dirty="0"/>
+              <a:t> </a:t>
+            </a:r>
+            <a:r>
+              <a:rPr lang="de-CH" dirty="0" err="1"/>
+              <a:t>easier</a:t>
+            </a:r>
+            <a:endParaRPr lang="de-CH" dirty="0"/>
+          </a:p>
+          <a:p>
+            <a:pPr lvl="1"/>
+            <a:r>
+              <a:rPr lang="de-CH" dirty="0" err="1"/>
+              <a:t>Less</a:t>
+            </a:r>
+            <a:r>
+              <a:rPr lang="de-CH" dirty="0"/>
+              <a:t> </a:t>
+            </a:r>
+            <a:r>
+              <a:rPr lang="de-CH" dirty="0" err="1"/>
+              <a:t>complicated</a:t>
+            </a:r>
+            <a:r>
+              <a:rPr lang="de-CH" dirty="0"/>
+              <a:t> </a:t>
+            </a:r>
+            <a:r>
+              <a:rPr lang="de-CH" dirty="0" err="1"/>
+              <a:t>because</a:t>
+            </a:r>
+            <a:r>
+              <a:rPr lang="de-CH" dirty="0"/>
+              <a:t> </a:t>
+            </a:r>
+            <a:r>
+              <a:rPr lang="de-CH" dirty="0" err="1"/>
+              <a:t>no</a:t>
+            </a:r>
+            <a:r>
+              <a:rPr lang="de-CH" dirty="0"/>
+              <a:t> </a:t>
+            </a:r>
+            <a:r>
+              <a:rPr lang="de-CH" dirty="0" err="1"/>
+              <a:t>data</a:t>
+            </a:r>
+            <a:r>
+              <a:rPr lang="de-CH" dirty="0"/>
+              <a:t> </a:t>
+            </a:r>
+            <a:r>
+              <a:rPr lang="de-CH" dirty="0" err="1"/>
+              <a:t>fusion</a:t>
+            </a:r>
+            <a:r>
+              <a:rPr lang="de-CH" dirty="0"/>
+              <a:t> </a:t>
+            </a:r>
+            <a:r>
+              <a:rPr lang="de-CH"/>
+              <a:t>necessary</a:t>
+            </a:r>
+            <a:endParaRPr lang="de-CH" dirty="0"/>
+          </a:p>
+          <a:p>
+            <a:pPr lvl="1"/>
+            <a:r>
+              <a:rPr lang="de-CH" dirty="0" err="1"/>
+              <a:t>Easier</a:t>
+            </a:r>
+            <a:r>
+              <a:rPr lang="de-CH" dirty="0"/>
+              <a:t> </a:t>
+            </a:r>
+            <a:r>
+              <a:rPr lang="de-CH" dirty="0" err="1"/>
+              <a:t>to</a:t>
+            </a:r>
+            <a:r>
+              <a:rPr lang="de-CH" dirty="0"/>
+              <a:t> </a:t>
+            </a:r>
+            <a:r>
+              <a:rPr lang="de-CH" dirty="0" err="1"/>
+              <a:t>recognize</a:t>
+            </a:r>
+            <a:r>
+              <a:rPr lang="de-CH" dirty="0"/>
+              <a:t> </a:t>
+            </a:r>
+            <a:r>
+              <a:rPr lang="de-CH" dirty="0" err="1"/>
+              <a:t>generalization</a:t>
+            </a:r>
+            <a:r>
+              <a:rPr lang="de-CH" dirty="0"/>
+              <a:t> and </a:t>
+            </a:r>
+            <a:r>
+              <a:rPr lang="de-CH" dirty="0" err="1"/>
+              <a:t>language</a:t>
+            </a:r>
+            <a:r>
+              <a:rPr lang="de-CH" dirty="0"/>
+              <a:t> </a:t>
+            </a:r>
+            <a:r>
+              <a:rPr lang="de-CH" dirty="0" err="1"/>
+              <a:t>specific</a:t>
+            </a:r>
+            <a:r>
+              <a:rPr lang="de-CH" dirty="0"/>
+              <a:t> </a:t>
+            </a:r>
+            <a:r>
+              <a:rPr lang="de-CH" dirty="0" err="1"/>
+              <a:t>challenges</a:t>
+            </a:r>
+            <a:endParaRPr lang="en-US" dirty="0"/>
           </a:p>
         </p:txBody>
       </p:sp>
@@ -7708,4 +10757,299 @@
     </a:ext>
   </a:extLst>
 </a:theme>
+</file>
+
+<file path=ppt/theme/theme2.xml><?xml version="1.0" encoding="utf-8"?>
+<a:theme xmlns:a="http://schemas.openxmlformats.org/drawingml/2006/main" name="Office Theme">
+  <a:themeElements>
+    <a:clrScheme name="Office">
+      <a:dk1>
+        <a:sysClr val="windowText" lastClr="000000"/>
+      </a:dk1>
+      <a:lt1>
+        <a:sysClr val="window" lastClr="FFFFFF"/>
+      </a:lt1>
+      <a:dk2>
+        <a:srgbClr val="44546A"/>
+      </a:dk2>
+      <a:lt2>
+        <a:srgbClr val="E7E6E6"/>
+      </a:lt2>
+      <a:accent1>
+        <a:srgbClr val="4472C4"/>
+      </a:accent1>
+      <a:accent2>
+        <a:srgbClr val="ED7D31"/>
+      </a:accent2>
+      <a:accent3>
+        <a:srgbClr val="A5A5A5"/>
+      </a:accent3>
+      <a:accent4>
+        <a:srgbClr val="FFC000"/>
+      </a:accent4>
+      <a:accent5>
+        <a:srgbClr val="5B9BD5"/>
+      </a:accent5>
+      <a:accent6>
+        <a:srgbClr val="70AD47"/>
+      </a:accent6>
+      <a:hlink>
+        <a:srgbClr val="0563C1"/>
+      </a:hlink>
+      <a:folHlink>
+        <a:srgbClr val="954F72"/>
+      </a:folHlink>
+    </a:clrScheme>
+    <a:fontScheme name="Office">
+      <a:majorFont>
+        <a:latin typeface="Calibri Light" panose="020F0302020204030204"/>
+        <a:ea typeface=""/>
+        <a:cs typeface=""/>
+        <a:font script="Jpan" typeface="游ゴシック Light"/>
+        <a:font script="Hang" typeface="맑은 고딕"/>
+        <a:font script="Hans" typeface="等线 Light"/>
+        <a:font script="Hant" typeface="新細明體"/>
+        <a:font script="Arab" typeface="Times New Roman"/>
+        <a:font script="Hebr" typeface="Times New Roman"/>
+        <a:font script="Thai" typeface="Angsana New"/>
+        <a:font script="Ethi" typeface="Nyala"/>
+        <a:font script="Beng" typeface="Vrinda"/>
+        <a:font script="Gujr" typeface="Shruti"/>
+        <a:font script="Khmr" typeface="MoolBoran"/>
+        <a:font script="Knda" typeface="Tunga"/>
+        <a:font script="Guru" typeface="Raavi"/>
+        <a:font script="Cans" typeface="Euphemia"/>
+        <a:font script="Cher" typeface="Plantagenet Cherokee"/>
+        <a:font script="Yiii" typeface="Microsoft Yi Baiti"/>
+        <a:font script="Tibt" typeface="Microsoft Himalaya"/>
+        <a:font script="Thaa" typeface="MV Boli"/>
+        <a:font script="Deva" typeface="Mangal"/>
+        <a:font script="Telu" typeface="Gautami"/>
+        <a:font script="Taml" typeface="Latha"/>
+        <a:font script="Syrc" typeface="Estrangelo Edessa"/>
+        <a:font script="Orya" typeface="Kalinga"/>
+        <a:font script="Mlym" typeface="Kartika"/>
+        <a:font script="Laoo" typeface="DokChampa"/>
+        <a:font script="Sinh" typeface="Iskoola Pota"/>
+        <a:font script="Mong" typeface="Mongolian Baiti"/>
+        <a:font script="Viet" typeface="Times New Roman"/>
+        <a:font script="Uigh" typeface="Microsoft Uighur"/>
+        <a:font script="Geor" typeface="Sylfaen"/>
+        <a:font script="Armn" typeface="Arial"/>
+        <a:font script="Bugi" typeface="Leelawadee UI"/>
+        <a:font script="Bopo" typeface="Microsoft JhengHei"/>
+        <a:font script="Java" typeface="Javanese Text"/>
+        <a:font script="Lisu" typeface="Segoe UI"/>
+        <a:font script="Mymr" typeface="Myanmar Text"/>
+        <a:font script="Nkoo" typeface="Ebrima"/>
+        <a:font script="Olck" typeface="Nirmala UI"/>
+        <a:font script="Osma" typeface="Ebrima"/>
+        <a:font script="Phag" typeface="Phagspa"/>
+        <a:font script="Syrn" typeface="Estrangelo Edessa"/>
+        <a:font script="Syrj" typeface="Estrangelo Edessa"/>
+        <a:font script="Syre" typeface="Estrangelo Edessa"/>
+        <a:font script="Sora" typeface="Nirmala UI"/>
+        <a:font script="Tale" typeface="Microsoft Tai Le"/>
+        <a:font script="Talu" typeface="Microsoft New Tai Lue"/>
+        <a:font script="Tfng" typeface="Ebrima"/>
+      </a:majorFont>
+      <a:minorFont>
+        <a:latin typeface="Calibri" panose="020F0502020204030204"/>
+        <a:ea typeface=""/>
+        <a:cs typeface=""/>
+        <a:font script="Jpan" typeface="游ゴシック"/>
+        <a:font script="Hang" typeface="맑은 고딕"/>
+        <a:font script="Hans" typeface="等线"/>
+        <a:font script="Hant" typeface="新細明體"/>
+        <a:font script="Arab" typeface="Arial"/>
+        <a:font script="Hebr" typeface="Arial"/>
+        <a:font script="Thai" typeface="Cordia New"/>
+        <a:font script="Ethi" typeface="Nyala"/>
+        <a:font script="Beng" typeface="Vrinda"/>
+        <a:font script="Gujr" typeface="Shruti"/>
+        <a:font script="Khmr" typeface="DaunPenh"/>
+        <a:font script="Knda" typeface="Tunga"/>
+        <a:font script="Guru" typeface="Raavi"/>
+        <a:font script="Cans" typeface="Euphemia"/>
+        <a:font script="Cher" typeface="Plantagenet Cherokee"/>
+        <a:font script="Yiii" typeface="Microsoft Yi Baiti"/>
+        <a:font script="Tibt" typeface="Microsoft Himalaya"/>
+        <a:font script="Thaa" typeface="MV Boli"/>
+        <a:font script="Deva" typeface="Mangal"/>
+        <a:font script="Telu" typeface="Gautami"/>
+        <a:font script="Taml" typeface="Latha"/>
+        <a:font script="Syrc" typeface="Estrangelo Edessa"/>
+        <a:font script="Orya" typeface="Kalinga"/>
+        <a:font script="Mlym" typeface="Kartika"/>
+        <a:font script="Laoo" typeface="DokChampa"/>
+        <a:font script="Sinh" typeface="Iskoola Pota"/>
+        <a:font script="Mong" typeface="Mongolian Baiti"/>
+        <a:font script="Viet" typeface="Arial"/>
+        <a:font script="Uigh" typeface="Microsoft Uighur"/>
+        <a:font script="Geor" typeface="Sylfaen"/>
+        <a:font script="Armn" typeface="Arial"/>
+        <a:font script="Bugi" typeface="Leelawadee UI"/>
+        <a:font script="Bopo" typeface="Microsoft JhengHei"/>
+        <a:font script="Java" typeface="Javanese Text"/>
+        <a:font script="Lisu" typeface="Segoe UI"/>
+        <a:font script="Mymr" typeface="Myanmar Text"/>
+        <a:font script="Nkoo" typeface="Ebrima"/>
+        <a:font script="Olck" typeface="Nirmala UI"/>
+        <a:font script="Osma" typeface="Ebrima"/>
+        <a:font script="Phag" typeface="Phagspa"/>
+        <a:font script="Syrn" typeface="Estrangelo Edessa"/>
+        <a:font script="Syrj" typeface="Estrangelo Edessa"/>
+        <a:font script="Syre" typeface="Estrangelo Edessa"/>
+        <a:font script="Sora" typeface="Nirmala UI"/>
+        <a:font script="Tale" typeface="Microsoft Tai Le"/>
+        <a:font script="Talu" typeface="Microsoft New Tai Lue"/>
+        <a:font script="Tfng" typeface="Ebrima"/>
+      </a:minorFont>
+    </a:fontScheme>
+    <a:fmtScheme name="Office">
+      <a:fillStyleLst>
+        <a:solidFill>
+          <a:schemeClr val="phClr"/>
+        </a:solidFill>
+        <a:gradFill rotWithShape="1">
+          <a:gsLst>
+            <a:gs pos="0">
+              <a:schemeClr val="phClr">
+                <a:lumMod val="110000"/>
+                <a:satMod val="105000"/>
+                <a:tint val="67000"/>
+              </a:schemeClr>
+            </a:gs>
+            <a:gs pos="50000">
+              <a:schemeClr val="phClr">
+                <a:lumMod val="105000"/>
+                <a:satMod val="103000"/>
+                <a:tint val="73000"/>
+              </a:schemeClr>
+            </a:gs>
+            <a:gs pos="100000">
+              <a:schemeClr val="phClr">
+                <a:lumMod val="105000"/>
+                <a:satMod val="109000"/>
+                <a:tint val="81000"/>
+              </a:schemeClr>
+            </a:gs>
+          </a:gsLst>
+          <a:lin ang="5400000" scaled="0"/>
+        </a:gradFill>
+        <a:gradFill rotWithShape="1">
+          <a:gsLst>
+            <a:gs pos="0">
+              <a:schemeClr val="phClr">
+                <a:satMod val="103000"/>
+                <a:lumMod val="102000"/>
+                <a:tint val="94000"/>
+              </a:schemeClr>
+            </a:gs>
+            <a:gs pos="50000">
+              <a:schemeClr val="phClr">
+                <a:satMod val="110000"/>
+                <a:lumMod val="100000"/>
+                <a:shade val="100000"/>
+              </a:schemeClr>
+            </a:gs>
+            <a:gs pos="100000">
+              <a:schemeClr val="phClr">
+                <a:lumMod val="99000"/>
+                <a:satMod val="120000"/>
+                <a:shade val="78000"/>
+              </a:schemeClr>
+            </a:gs>
+          </a:gsLst>
+          <a:lin ang="5400000" scaled="0"/>
+        </a:gradFill>
+      </a:fillStyleLst>
+      <a:lnStyleLst>
+        <a:ln w="6350" cap="flat" cmpd="sng" algn="ctr">
+          <a:solidFill>
+            <a:schemeClr val="phClr"/>
+          </a:solidFill>
+          <a:prstDash val="solid"/>
+          <a:miter lim="800000"/>
+        </a:ln>
+        <a:ln w="12700" cap="flat" cmpd="sng" algn="ctr">
+          <a:solidFill>
+            <a:schemeClr val="phClr"/>
+          </a:solidFill>
+          <a:prstDash val="solid"/>
+          <a:miter lim="800000"/>
+        </a:ln>
+        <a:ln w="19050" cap="flat" cmpd="sng" algn="ctr">
+          <a:solidFill>
+            <a:schemeClr val="phClr"/>
+          </a:solidFill>
+          <a:prstDash val="solid"/>
+          <a:miter lim="800000"/>
+        </a:ln>
+      </a:lnStyleLst>
+      <a:effectStyleLst>
+        <a:effectStyle>
+          <a:effectLst/>
+        </a:effectStyle>
+        <a:effectStyle>
+          <a:effectLst/>
+        </a:effectStyle>
+        <a:effectStyle>
+          <a:effectLst>
+            <a:outerShdw blurRad="57150" dist="19050" dir="5400000" algn="ctr" rotWithShape="0">
+              <a:srgbClr val="000000">
+                <a:alpha val="63000"/>
+              </a:srgbClr>
+            </a:outerShdw>
+          </a:effectLst>
+        </a:effectStyle>
+      </a:effectStyleLst>
+      <a:bgFillStyleLst>
+        <a:solidFill>
+          <a:schemeClr val="phClr"/>
+        </a:solidFill>
+        <a:solidFill>
+          <a:schemeClr val="phClr">
+            <a:tint val="95000"/>
+            <a:satMod val="170000"/>
+          </a:schemeClr>
+        </a:solidFill>
+        <a:gradFill rotWithShape="1">
+          <a:gsLst>
+            <a:gs pos="0">
+              <a:schemeClr val="phClr">
+                <a:tint val="93000"/>
+                <a:satMod val="150000"/>
+                <a:shade val="98000"/>
+                <a:lumMod val="102000"/>
+              </a:schemeClr>
+            </a:gs>
+            <a:gs pos="50000">
+              <a:schemeClr val="phClr">
+                <a:tint val="98000"/>
+                <a:satMod val="130000"/>
+                <a:shade val="90000"/>
+                <a:lumMod val="103000"/>
+              </a:schemeClr>
+            </a:gs>
+            <a:gs pos="100000">
+              <a:schemeClr val="phClr">
+                <a:shade val="63000"/>
+                <a:satMod val="120000"/>
+              </a:schemeClr>
+            </a:gs>
+          </a:gsLst>
+          <a:lin ang="5400000" scaled="0"/>
+        </a:gradFill>
+      </a:bgFillStyleLst>
+    </a:fmtScheme>
+  </a:themeElements>
+  <a:objectDefaults/>
+  <a:extraClrSchemeLst/>
+  <a:extLst>
+    <a:ext uri="{05A4C25C-085E-4340-85A3-A5531E510DB2}">
+      <thm15:themeFamily xmlns:thm15="http://schemas.microsoft.com/office/thememl/2012/main" name="Office Theme" id="{62F939B6-93AF-4DB8-9C6B-D6C7DFDC589F}" vid="{4A3C46E8-61CC-4603-A589-7422A47A8E4A}"/>
+    </a:ext>
+  </a:extLst>
+</a:theme>
 </file>
</xml_diff>

<commit_message>
update ppp with plots
</commit_message>
<xml_diff>
--- a/CAS NLP Module 4_jd_bb.pptx
+++ b/CAS NLP Module 4_jd_bb.pptx
@@ -5,7 +5,7 @@
     <p:sldMasterId id="2147483660" r:id="rId1"/>
   </p:sldMasterIdLst>
   <p:notesMasterIdLst>
-    <p:notesMasterId r:id="rId15"/>
+    <p:notesMasterId r:id="rId19"/>
   </p:notesMasterIdLst>
   <p:sldIdLst>
     <p:sldId id="256" r:id="rId2"/>
@@ -14,13 +14,17 @@
     <p:sldId id="259" r:id="rId5"/>
     <p:sldId id="260" r:id="rId6"/>
     <p:sldId id="261" r:id="rId7"/>
-    <p:sldId id="262" r:id="rId8"/>
-    <p:sldId id="263" r:id="rId9"/>
-    <p:sldId id="264" r:id="rId10"/>
-    <p:sldId id="265" r:id="rId11"/>
-    <p:sldId id="266" r:id="rId12"/>
-    <p:sldId id="267" r:id="rId13"/>
-    <p:sldId id="268" r:id="rId14"/>
+    <p:sldId id="269" r:id="rId8"/>
+    <p:sldId id="270" r:id="rId9"/>
+    <p:sldId id="271" r:id="rId10"/>
+    <p:sldId id="272" r:id="rId11"/>
+    <p:sldId id="262" r:id="rId12"/>
+    <p:sldId id="263" r:id="rId13"/>
+    <p:sldId id="264" r:id="rId14"/>
+    <p:sldId id="265" r:id="rId15"/>
+    <p:sldId id="266" r:id="rId16"/>
+    <p:sldId id="267" r:id="rId17"/>
+    <p:sldId id="268" r:id="rId18"/>
   </p:sldIdLst>
   <p:sldSz cx="12192000" cy="6858000"/>
   <p:notesSz cx="6858000" cy="9144000"/>
@@ -209,7 +213,7 @@
           <a:p>
             <a:fld id="{E51474CE-351A-4402-BD16-5C3CE3808280}" type="datetimeFigureOut">
               <a:rPr lang="en-US" smtClean="0"/>
-              <a:t>1/18/2025</a:t>
+              <a:t>1/19/2025</a:t>
             </a:fld>
             <a:endParaRPr lang="en-US"/>
           </a:p>
@@ -367,7 +371,7 @@
           <a:p>
             <a:fld id="{2DA66685-3D22-47BB-B74E-10995D7F8271}" type="slidenum">
               <a:rPr lang="en-US" smtClean="0"/>
-              <a:t>‹#›</a:t>
+              <a:t>‹Nr.›</a:t>
             </a:fld>
             <a:endParaRPr lang="en-US"/>
           </a:p>
@@ -2086,6 +2090,414 @@
 </p:notes>
 </file>
 
+<file path=ppt/notesSlides/notesSlide2.xml><?xml version="1.0" encoding="utf-8"?>
+<p:notes xmlns:a="http://schemas.openxmlformats.org/drawingml/2006/main" xmlns:r="http://schemas.openxmlformats.org/officeDocument/2006/relationships" xmlns:p="http://schemas.openxmlformats.org/presentationml/2006/main">
+  <p:cSld>
+    <p:spTree>
+      <p:nvGrpSpPr>
+        <p:cNvPr id="1" name=""/>
+        <p:cNvGrpSpPr/>
+        <p:nvPr/>
+      </p:nvGrpSpPr>
+      <p:grpSpPr>
+        <a:xfrm>
+          <a:off x="0" y="0"/>
+          <a:ext cx="0" cy="0"/>
+          <a:chOff x="0" y="0"/>
+          <a:chExt cx="0" cy="0"/>
+        </a:xfrm>
+      </p:grpSpPr>
+      <p:sp>
+        <p:nvSpPr>
+          <p:cNvPr id="2" name="Folienbildplatzhalter 1"/>
+          <p:cNvSpPr>
+            <a:spLocks noGrp="1" noRot="1" noChangeAspect="1"/>
+          </p:cNvSpPr>
+          <p:nvPr>
+            <p:ph type="sldImg"/>
+          </p:nvPr>
+        </p:nvSpPr>
+        <p:spPr/>
+      </p:sp>
+      <p:sp>
+        <p:nvSpPr>
+          <p:cNvPr id="3" name="Notizenplatzhalter 2"/>
+          <p:cNvSpPr>
+            <a:spLocks noGrp="1"/>
+          </p:cNvSpPr>
+          <p:nvPr>
+            <p:ph type="body" idx="1"/>
+          </p:nvPr>
+        </p:nvSpPr>
+        <p:spPr/>
+        <p:txBody>
+          <a:bodyPr/>
+          <a:lstStyle/>
+          <a:p>
+            <a:endParaRPr lang="de-CH" dirty="0"/>
+          </a:p>
+        </p:txBody>
+      </p:sp>
+      <p:sp>
+        <p:nvSpPr>
+          <p:cNvPr id="4" name="Foliennummernplatzhalter 3"/>
+          <p:cNvSpPr>
+            <a:spLocks noGrp="1"/>
+          </p:cNvSpPr>
+          <p:nvPr>
+            <p:ph type="sldNum" sz="quarter" idx="5"/>
+          </p:nvPr>
+        </p:nvSpPr>
+        <p:spPr/>
+        <p:txBody>
+          <a:bodyPr/>
+          <a:lstStyle/>
+          <a:p>
+            <a:fld id="{2DA66685-3D22-47BB-B74E-10995D7F8271}" type="slidenum">
+              <a:rPr lang="en-US" smtClean="0"/>
+              <a:t>7</a:t>
+            </a:fld>
+            <a:endParaRPr lang="en-US"/>
+          </a:p>
+        </p:txBody>
+      </p:sp>
+    </p:spTree>
+    <p:extLst>
+      <p:ext uri="{BB962C8B-B14F-4D97-AF65-F5344CB8AC3E}">
+        <p14:creationId xmlns:p14="http://schemas.microsoft.com/office/powerpoint/2010/main" val="66036931"/>
+      </p:ext>
+    </p:extLst>
+  </p:cSld>
+  <p:clrMapOvr>
+    <a:masterClrMapping/>
+  </p:clrMapOvr>
+</p:notes>
+</file>
+
+<file path=ppt/notesSlides/notesSlide3.xml><?xml version="1.0" encoding="utf-8"?>
+<p:notes xmlns:a="http://schemas.openxmlformats.org/drawingml/2006/main" xmlns:r="http://schemas.openxmlformats.org/officeDocument/2006/relationships" xmlns:p="http://schemas.openxmlformats.org/presentationml/2006/main">
+  <p:cSld>
+    <p:spTree>
+      <p:nvGrpSpPr>
+        <p:cNvPr id="1" name="">
+          <a:extLst>
+            <a:ext uri="{FF2B5EF4-FFF2-40B4-BE49-F238E27FC236}">
+              <a16:creationId xmlns:a16="http://schemas.microsoft.com/office/drawing/2014/main" id="{F9B6E588-6C5E-7D87-945F-3204448E215F}"/>
+            </a:ext>
+          </a:extLst>
+        </p:cNvPr>
+        <p:cNvGrpSpPr/>
+        <p:nvPr/>
+      </p:nvGrpSpPr>
+      <p:grpSpPr>
+        <a:xfrm>
+          <a:off x="0" y="0"/>
+          <a:ext cx="0" cy="0"/>
+          <a:chOff x="0" y="0"/>
+          <a:chExt cx="0" cy="0"/>
+        </a:xfrm>
+      </p:grpSpPr>
+      <p:sp>
+        <p:nvSpPr>
+          <p:cNvPr id="2" name="Folienbildplatzhalter 1">
+            <a:extLst>
+              <a:ext uri="{FF2B5EF4-FFF2-40B4-BE49-F238E27FC236}">
+                <a16:creationId xmlns:a16="http://schemas.microsoft.com/office/drawing/2014/main" id="{8225E36B-ABB9-633D-6599-38BEAB667605}"/>
+              </a:ext>
+            </a:extLst>
+          </p:cNvPr>
+          <p:cNvSpPr>
+            <a:spLocks noGrp="1" noRot="1" noChangeAspect="1"/>
+          </p:cNvSpPr>
+          <p:nvPr>
+            <p:ph type="sldImg"/>
+          </p:nvPr>
+        </p:nvSpPr>
+        <p:spPr/>
+      </p:sp>
+      <p:sp>
+        <p:nvSpPr>
+          <p:cNvPr id="3" name="Notizenplatzhalter 2">
+            <a:extLst>
+              <a:ext uri="{FF2B5EF4-FFF2-40B4-BE49-F238E27FC236}">
+                <a16:creationId xmlns:a16="http://schemas.microsoft.com/office/drawing/2014/main" id="{58CDAC67-32FD-51A4-237D-77DEF0281A6A}"/>
+              </a:ext>
+            </a:extLst>
+          </p:cNvPr>
+          <p:cNvSpPr>
+            <a:spLocks noGrp="1"/>
+          </p:cNvSpPr>
+          <p:nvPr>
+            <p:ph type="body" idx="1"/>
+          </p:nvPr>
+        </p:nvSpPr>
+        <p:spPr/>
+        <p:txBody>
+          <a:bodyPr/>
+          <a:lstStyle/>
+          <a:p>
+            <a:endParaRPr lang="de-CH" dirty="0"/>
+          </a:p>
+        </p:txBody>
+      </p:sp>
+      <p:sp>
+        <p:nvSpPr>
+          <p:cNvPr id="4" name="Foliennummernplatzhalter 3">
+            <a:extLst>
+              <a:ext uri="{FF2B5EF4-FFF2-40B4-BE49-F238E27FC236}">
+                <a16:creationId xmlns:a16="http://schemas.microsoft.com/office/drawing/2014/main" id="{9FF46359-FB48-4102-51B8-60672D3DD68C}"/>
+              </a:ext>
+            </a:extLst>
+          </p:cNvPr>
+          <p:cNvSpPr>
+            <a:spLocks noGrp="1"/>
+          </p:cNvSpPr>
+          <p:nvPr>
+            <p:ph type="sldNum" sz="quarter" idx="5"/>
+          </p:nvPr>
+        </p:nvSpPr>
+        <p:spPr/>
+        <p:txBody>
+          <a:bodyPr/>
+          <a:lstStyle/>
+          <a:p>
+            <a:fld id="{2DA66685-3D22-47BB-B74E-10995D7F8271}" type="slidenum">
+              <a:rPr lang="en-US" smtClean="0"/>
+              <a:t>8</a:t>
+            </a:fld>
+            <a:endParaRPr lang="en-US"/>
+          </a:p>
+        </p:txBody>
+      </p:sp>
+    </p:spTree>
+    <p:extLst>
+      <p:ext uri="{BB962C8B-B14F-4D97-AF65-F5344CB8AC3E}">
+        <p14:creationId xmlns:p14="http://schemas.microsoft.com/office/powerpoint/2010/main" val="3367596640"/>
+      </p:ext>
+    </p:extLst>
+  </p:cSld>
+  <p:clrMapOvr>
+    <a:masterClrMapping/>
+  </p:clrMapOvr>
+</p:notes>
+</file>
+
+<file path=ppt/notesSlides/notesSlide4.xml><?xml version="1.0" encoding="utf-8"?>
+<p:notes xmlns:a="http://schemas.openxmlformats.org/drawingml/2006/main" xmlns:r="http://schemas.openxmlformats.org/officeDocument/2006/relationships" xmlns:p="http://schemas.openxmlformats.org/presentationml/2006/main">
+  <p:cSld>
+    <p:spTree>
+      <p:nvGrpSpPr>
+        <p:cNvPr id="1" name="">
+          <a:extLst>
+            <a:ext uri="{FF2B5EF4-FFF2-40B4-BE49-F238E27FC236}">
+              <a16:creationId xmlns:a16="http://schemas.microsoft.com/office/drawing/2014/main" id="{49DD89E9-A372-2996-CB7F-ED23AD9D5642}"/>
+            </a:ext>
+          </a:extLst>
+        </p:cNvPr>
+        <p:cNvGrpSpPr/>
+        <p:nvPr/>
+      </p:nvGrpSpPr>
+      <p:grpSpPr>
+        <a:xfrm>
+          <a:off x="0" y="0"/>
+          <a:ext cx="0" cy="0"/>
+          <a:chOff x="0" y="0"/>
+          <a:chExt cx="0" cy="0"/>
+        </a:xfrm>
+      </p:grpSpPr>
+      <p:sp>
+        <p:nvSpPr>
+          <p:cNvPr id="2" name="Folienbildplatzhalter 1">
+            <a:extLst>
+              <a:ext uri="{FF2B5EF4-FFF2-40B4-BE49-F238E27FC236}">
+                <a16:creationId xmlns:a16="http://schemas.microsoft.com/office/drawing/2014/main" id="{AA4ADBCF-4471-D31F-8C16-17CAA27055A0}"/>
+              </a:ext>
+            </a:extLst>
+          </p:cNvPr>
+          <p:cNvSpPr>
+            <a:spLocks noGrp="1" noRot="1" noChangeAspect="1"/>
+          </p:cNvSpPr>
+          <p:nvPr>
+            <p:ph type="sldImg"/>
+          </p:nvPr>
+        </p:nvSpPr>
+        <p:spPr/>
+      </p:sp>
+      <p:sp>
+        <p:nvSpPr>
+          <p:cNvPr id="3" name="Notizenplatzhalter 2">
+            <a:extLst>
+              <a:ext uri="{FF2B5EF4-FFF2-40B4-BE49-F238E27FC236}">
+                <a16:creationId xmlns:a16="http://schemas.microsoft.com/office/drawing/2014/main" id="{E1128C63-23D8-E812-E33A-D2FA3EFA6AF2}"/>
+              </a:ext>
+            </a:extLst>
+          </p:cNvPr>
+          <p:cNvSpPr>
+            <a:spLocks noGrp="1"/>
+          </p:cNvSpPr>
+          <p:nvPr>
+            <p:ph type="body" idx="1"/>
+          </p:nvPr>
+        </p:nvSpPr>
+        <p:spPr/>
+        <p:txBody>
+          <a:bodyPr/>
+          <a:lstStyle/>
+          <a:p>
+            <a:endParaRPr lang="de-CH" dirty="0"/>
+          </a:p>
+        </p:txBody>
+      </p:sp>
+      <p:sp>
+        <p:nvSpPr>
+          <p:cNvPr id="4" name="Foliennummernplatzhalter 3">
+            <a:extLst>
+              <a:ext uri="{FF2B5EF4-FFF2-40B4-BE49-F238E27FC236}">
+                <a16:creationId xmlns:a16="http://schemas.microsoft.com/office/drawing/2014/main" id="{56792B2E-039D-7436-4F48-049DA5AA36BD}"/>
+              </a:ext>
+            </a:extLst>
+          </p:cNvPr>
+          <p:cNvSpPr>
+            <a:spLocks noGrp="1"/>
+          </p:cNvSpPr>
+          <p:nvPr>
+            <p:ph type="sldNum" sz="quarter" idx="5"/>
+          </p:nvPr>
+        </p:nvSpPr>
+        <p:spPr/>
+        <p:txBody>
+          <a:bodyPr/>
+          <a:lstStyle/>
+          <a:p>
+            <a:fld id="{2DA66685-3D22-47BB-B74E-10995D7F8271}" type="slidenum">
+              <a:rPr lang="en-US" smtClean="0"/>
+              <a:t>9</a:t>
+            </a:fld>
+            <a:endParaRPr lang="en-US"/>
+          </a:p>
+        </p:txBody>
+      </p:sp>
+    </p:spTree>
+    <p:extLst>
+      <p:ext uri="{BB962C8B-B14F-4D97-AF65-F5344CB8AC3E}">
+        <p14:creationId xmlns:p14="http://schemas.microsoft.com/office/powerpoint/2010/main" val="3876792440"/>
+      </p:ext>
+    </p:extLst>
+  </p:cSld>
+  <p:clrMapOvr>
+    <a:masterClrMapping/>
+  </p:clrMapOvr>
+</p:notes>
+</file>
+
+<file path=ppt/notesSlides/notesSlide5.xml><?xml version="1.0" encoding="utf-8"?>
+<p:notes xmlns:a="http://schemas.openxmlformats.org/drawingml/2006/main" xmlns:r="http://schemas.openxmlformats.org/officeDocument/2006/relationships" xmlns:p="http://schemas.openxmlformats.org/presentationml/2006/main">
+  <p:cSld>
+    <p:spTree>
+      <p:nvGrpSpPr>
+        <p:cNvPr id="1" name="">
+          <a:extLst>
+            <a:ext uri="{FF2B5EF4-FFF2-40B4-BE49-F238E27FC236}">
+              <a16:creationId xmlns:a16="http://schemas.microsoft.com/office/drawing/2014/main" id="{D5B7F76D-B51F-3BCB-B314-63945A87B291}"/>
+            </a:ext>
+          </a:extLst>
+        </p:cNvPr>
+        <p:cNvGrpSpPr/>
+        <p:nvPr/>
+      </p:nvGrpSpPr>
+      <p:grpSpPr>
+        <a:xfrm>
+          <a:off x="0" y="0"/>
+          <a:ext cx="0" cy="0"/>
+          <a:chOff x="0" y="0"/>
+          <a:chExt cx="0" cy="0"/>
+        </a:xfrm>
+      </p:grpSpPr>
+      <p:sp>
+        <p:nvSpPr>
+          <p:cNvPr id="2" name="Folienbildplatzhalter 1">
+            <a:extLst>
+              <a:ext uri="{FF2B5EF4-FFF2-40B4-BE49-F238E27FC236}">
+                <a16:creationId xmlns:a16="http://schemas.microsoft.com/office/drawing/2014/main" id="{9CA26841-C491-14AC-BE5B-F04F35F61142}"/>
+              </a:ext>
+            </a:extLst>
+          </p:cNvPr>
+          <p:cNvSpPr>
+            <a:spLocks noGrp="1" noRot="1" noChangeAspect="1"/>
+          </p:cNvSpPr>
+          <p:nvPr>
+            <p:ph type="sldImg"/>
+          </p:nvPr>
+        </p:nvSpPr>
+        <p:spPr/>
+      </p:sp>
+      <p:sp>
+        <p:nvSpPr>
+          <p:cNvPr id="3" name="Notizenplatzhalter 2">
+            <a:extLst>
+              <a:ext uri="{FF2B5EF4-FFF2-40B4-BE49-F238E27FC236}">
+                <a16:creationId xmlns:a16="http://schemas.microsoft.com/office/drawing/2014/main" id="{F0D2BEC1-A3EC-9818-38D5-F46D118F0A52}"/>
+              </a:ext>
+            </a:extLst>
+          </p:cNvPr>
+          <p:cNvSpPr>
+            <a:spLocks noGrp="1"/>
+          </p:cNvSpPr>
+          <p:nvPr>
+            <p:ph type="body" idx="1"/>
+          </p:nvPr>
+        </p:nvSpPr>
+        <p:spPr/>
+        <p:txBody>
+          <a:bodyPr/>
+          <a:lstStyle/>
+          <a:p>
+            <a:endParaRPr lang="de-CH" dirty="0"/>
+          </a:p>
+        </p:txBody>
+      </p:sp>
+      <p:sp>
+        <p:nvSpPr>
+          <p:cNvPr id="4" name="Foliennummernplatzhalter 3">
+            <a:extLst>
+              <a:ext uri="{FF2B5EF4-FFF2-40B4-BE49-F238E27FC236}">
+                <a16:creationId xmlns:a16="http://schemas.microsoft.com/office/drawing/2014/main" id="{F620FBC4-C5C2-76A7-5401-E08682152C40}"/>
+              </a:ext>
+            </a:extLst>
+          </p:cNvPr>
+          <p:cNvSpPr>
+            <a:spLocks noGrp="1"/>
+          </p:cNvSpPr>
+          <p:nvPr>
+            <p:ph type="sldNum" sz="quarter" idx="5"/>
+          </p:nvPr>
+        </p:nvSpPr>
+        <p:spPr/>
+        <p:txBody>
+          <a:bodyPr/>
+          <a:lstStyle/>
+          <a:p>
+            <a:fld id="{2DA66685-3D22-47BB-B74E-10995D7F8271}" type="slidenum">
+              <a:rPr lang="en-US" smtClean="0"/>
+              <a:t>10</a:t>
+            </a:fld>
+            <a:endParaRPr lang="en-US"/>
+          </a:p>
+        </p:txBody>
+      </p:sp>
+    </p:spTree>
+    <p:extLst>
+      <p:ext uri="{BB962C8B-B14F-4D97-AF65-F5344CB8AC3E}">
+        <p14:creationId xmlns:p14="http://schemas.microsoft.com/office/powerpoint/2010/main" val="2852920451"/>
+      </p:ext>
+    </p:extLst>
+  </p:cSld>
+  <p:clrMapOvr>
+    <a:masterClrMapping/>
+  </p:clrMapOvr>
+</p:notes>
+</file>
+
 <file path=ppt/slideLayouts/slideLayout1.xml><?xml version="1.0" encoding="utf-8"?>
 <p:sldLayout xmlns:a="http://schemas.openxmlformats.org/drawingml/2006/main" xmlns:r="http://schemas.openxmlformats.org/officeDocument/2006/relationships" xmlns:p="http://schemas.openxmlformats.org/presentationml/2006/main" type="title" preserve="1">
   <p:cSld name="Title Slide">
@@ -2272,7 +2684,7 @@
           <a:p>
             <a:fld id="{69F73540-DFB5-4816-8066-5D194A0B149D}" type="datetimeFigureOut">
               <a:rPr lang="de-CH" smtClean="0"/>
-              <a:t>18.01.2025</a:t>
+              <a:t>19.01.2025</a:t>
             </a:fld>
             <a:endParaRPr lang="de-CH"/>
           </a:p>
@@ -2314,7 +2726,7 @@
           <a:p>
             <a:fld id="{AB8F96E3-2EAC-4C18-B216-7E9D85CA2F89}" type="slidenum">
               <a:rPr lang="de-CH" smtClean="0"/>
-              <a:t>‹#›</a:t>
+              <a:t>‹Nr.›</a:t>
             </a:fld>
             <a:endParaRPr lang="de-CH"/>
           </a:p>
@@ -2547,7 +2959,7 @@
           <a:p>
             <a:fld id="{69F73540-DFB5-4816-8066-5D194A0B149D}" type="datetimeFigureOut">
               <a:rPr lang="de-CH" smtClean="0"/>
-              <a:t>18.01.2025</a:t>
+              <a:t>19.01.2025</a:t>
             </a:fld>
             <a:endParaRPr lang="de-CH"/>
           </a:p>
@@ -2589,7 +3001,7 @@
           <a:p>
             <a:fld id="{AB8F96E3-2EAC-4C18-B216-7E9D85CA2F89}" type="slidenum">
               <a:rPr lang="de-CH" smtClean="0"/>
-              <a:t>‹#›</a:t>
+              <a:t>‹Nr.›</a:t>
             </a:fld>
             <a:endParaRPr lang="de-CH"/>
           </a:p>
@@ -2741,7 +3153,7 @@
           <a:p>
             <a:fld id="{69F73540-DFB5-4816-8066-5D194A0B149D}" type="datetimeFigureOut">
               <a:rPr lang="de-CH" smtClean="0"/>
-              <a:t>18.01.2025</a:t>
+              <a:t>19.01.2025</a:t>
             </a:fld>
             <a:endParaRPr lang="de-CH"/>
           </a:p>
@@ -2783,7 +3195,7 @@
           <a:p>
             <a:fld id="{AB8F96E3-2EAC-4C18-B216-7E9D85CA2F89}" type="slidenum">
               <a:rPr lang="de-CH" smtClean="0"/>
-              <a:t>‹#›</a:t>
+              <a:t>‹Nr.›</a:t>
             </a:fld>
             <a:endParaRPr lang="de-CH"/>
           </a:p>
@@ -3014,7 +3426,7 @@
           <a:p>
             <a:fld id="{69F73540-DFB5-4816-8066-5D194A0B149D}" type="datetimeFigureOut">
               <a:rPr lang="de-CH" smtClean="0"/>
-              <a:t>18.01.2025</a:t>
+              <a:t>19.01.2025</a:t>
             </a:fld>
             <a:endParaRPr lang="de-CH"/>
           </a:p>
@@ -3056,7 +3468,7 @@
           <a:p>
             <a:fld id="{AB8F96E3-2EAC-4C18-B216-7E9D85CA2F89}" type="slidenum">
               <a:rPr lang="de-CH" smtClean="0"/>
-              <a:t>‹#›</a:t>
+              <a:t>‹Nr.›</a:t>
             </a:fld>
             <a:endParaRPr lang="de-CH"/>
           </a:p>
@@ -3355,7 +3767,7 @@
           <a:p>
             <a:fld id="{69F73540-DFB5-4816-8066-5D194A0B149D}" type="datetimeFigureOut">
               <a:rPr lang="de-CH" smtClean="0"/>
-              <a:t>18.01.2025</a:t>
+              <a:t>19.01.2025</a:t>
             </a:fld>
             <a:endParaRPr lang="de-CH"/>
           </a:p>
@@ -3397,7 +3809,7 @@
           <a:p>
             <a:fld id="{AB8F96E3-2EAC-4C18-B216-7E9D85CA2F89}" type="slidenum">
               <a:rPr lang="de-CH" smtClean="0"/>
-              <a:t>‹#›</a:t>
+              <a:t>‹Nr.›</a:t>
             </a:fld>
             <a:endParaRPr lang="de-CH"/>
           </a:p>
@@ -3978,7 +4390,7 @@
           <a:p>
             <a:fld id="{69F73540-DFB5-4816-8066-5D194A0B149D}" type="datetimeFigureOut">
               <a:rPr lang="de-CH" smtClean="0"/>
-              <a:t>18.01.2025</a:t>
+              <a:t>19.01.2025</a:t>
             </a:fld>
             <a:endParaRPr lang="de-CH"/>
           </a:p>
@@ -4020,7 +4432,7 @@
           <a:p>
             <a:fld id="{AB8F96E3-2EAC-4C18-B216-7E9D85CA2F89}" type="slidenum">
               <a:rPr lang="de-CH" smtClean="0"/>
-              <a:t>‹#›</a:t>
+              <a:t>‹Nr.›</a:t>
             </a:fld>
             <a:endParaRPr lang="de-CH"/>
           </a:p>
@@ -4838,7 +5250,7 @@
           <a:p>
             <a:fld id="{69F73540-DFB5-4816-8066-5D194A0B149D}" type="datetimeFigureOut">
               <a:rPr lang="de-CH" smtClean="0"/>
-              <a:t>18.01.2025</a:t>
+              <a:t>19.01.2025</a:t>
             </a:fld>
             <a:endParaRPr lang="de-CH"/>
           </a:p>
@@ -4880,7 +5292,7 @@
           <a:p>
             <a:fld id="{AB8F96E3-2EAC-4C18-B216-7E9D85CA2F89}" type="slidenum">
               <a:rPr lang="de-CH" smtClean="0"/>
-              <a:t>‹#›</a:t>
+              <a:t>‹Nr.›</a:t>
             </a:fld>
             <a:endParaRPr lang="de-CH"/>
           </a:p>
@@ -5008,7 +5420,7 @@
           <a:p>
             <a:fld id="{69F73540-DFB5-4816-8066-5D194A0B149D}" type="datetimeFigureOut">
               <a:rPr lang="de-CH" smtClean="0"/>
-              <a:t>18.01.2025</a:t>
+              <a:t>19.01.2025</a:t>
             </a:fld>
             <a:endParaRPr lang="de-CH"/>
           </a:p>
@@ -5050,7 +5462,7 @@
           <a:p>
             <a:fld id="{AB8F96E3-2EAC-4C18-B216-7E9D85CA2F89}" type="slidenum">
               <a:rPr lang="de-CH" smtClean="0"/>
-              <a:t>‹#›</a:t>
+              <a:t>‹Nr.›</a:t>
             </a:fld>
             <a:endParaRPr lang="de-CH"/>
           </a:p>
@@ -5188,7 +5600,7 @@
           <a:p>
             <a:fld id="{69F73540-DFB5-4816-8066-5D194A0B149D}" type="datetimeFigureOut">
               <a:rPr lang="de-CH" smtClean="0"/>
-              <a:t>18.01.2025</a:t>
+              <a:t>19.01.2025</a:t>
             </a:fld>
             <a:endParaRPr lang="de-CH"/>
           </a:p>
@@ -5230,7 +5642,7 @@
           <a:p>
             <a:fld id="{AB8F96E3-2EAC-4C18-B216-7E9D85CA2F89}" type="slidenum">
               <a:rPr lang="de-CH" smtClean="0"/>
-              <a:t>‹#›</a:t>
+              <a:t>‹Nr.›</a:t>
             </a:fld>
             <a:endParaRPr lang="de-CH"/>
           </a:p>
@@ -5358,7 +5770,7 @@
           <a:p>
             <a:fld id="{69F73540-DFB5-4816-8066-5D194A0B149D}" type="datetimeFigureOut">
               <a:rPr lang="de-CH" smtClean="0"/>
-              <a:t>18.01.2025</a:t>
+              <a:t>19.01.2025</a:t>
             </a:fld>
             <a:endParaRPr lang="de-CH"/>
           </a:p>
@@ -5400,7 +5812,7 @@
           <a:p>
             <a:fld id="{AB8F96E3-2EAC-4C18-B216-7E9D85CA2F89}" type="slidenum">
               <a:rPr lang="de-CH" smtClean="0"/>
-              <a:t>‹#›</a:t>
+              <a:t>‹Nr.›</a:t>
             </a:fld>
             <a:endParaRPr lang="de-CH"/>
           </a:p>
@@ -5605,7 +6017,7 @@
           <a:p>
             <a:fld id="{69F73540-DFB5-4816-8066-5D194A0B149D}" type="datetimeFigureOut">
               <a:rPr lang="de-CH" smtClean="0"/>
-              <a:t>18.01.2025</a:t>
+              <a:t>19.01.2025</a:t>
             </a:fld>
             <a:endParaRPr lang="de-CH"/>
           </a:p>
@@ -5647,7 +6059,7 @@
           <a:p>
             <a:fld id="{AB8F96E3-2EAC-4C18-B216-7E9D85CA2F89}" type="slidenum">
               <a:rPr lang="de-CH" smtClean="0"/>
-              <a:t>‹#›</a:t>
+              <a:t>‹Nr.›</a:t>
             </a:fld>
             <a:endParaRPr lang="de-CH"/>
           </a:p>
@@ -5897,7 +6309,7 @@
           <a:p>
             <a:fld id="{69F73540-DFB5-4816-8066-5D194A0B149D}" type="datetimeFigureOut">
               <a:rPr lang="de-CH" smtClean="0"/>
-              <a:t>18.01.2025</a:t>
+              <a:t>19.01.2025</a:t>
             </a:fld>
             <a:endParaRPr lang="de-CH"/>
           </a:p>
@@ -5939,7 +6351,7 @@
           <a:p>
             <a:fld id="{AB8F96E3-2EAC-4C18-B216-7E9D85CA2F89}" type="slidenum">
               <a:rPr lang="de-CH" smtClean="0"/>
-              <a:t>‹#›</a:t>
+              <a:t>‹Nr.›</a:t>
             </a:fld>
             <a:endParaRPr lang="de-CH"/>
           </a:p>
@@ -6341,7 +6753,7 @@
           <a:p>
             <a:fld id="{69F73540-DFB5-4816-8066-5D194A0B149D}" type="datetimeFigureOut">
               <a:rPr lang="de-CH" smtClean="0"/>
-              <a:t>18.01.2025</a:t>
+              <a:t>19.01.2025</a:t>
             </a:fld>
             <a:endParaRPr lang="de-CH"/>
           </a:p>
@@ -6383,7 +6795,7 @@
           <a:p>
             <a:fld id="{AB8F96E3-2EAC-4C18-B216-7E9D85CA2F89}" type="slidenum">
               <a:rPr lang="de-CH" smtClean="0"/>
-              <a:t>‹#›</a:t>
+              <a:t>‹Nr.›</a:t>
             </a:fld>
             <a:endParaRPr lang="de-CH"/>
           </a:p>
@@ -6459,7 +6871,7 @@
           <a:p>
             <a:fld id="{69F73540-DFB5-4816-8066-5D194A0B149D}" type="datetimeFigureOut">
               <a:rPr lang="de-CH" smtClean="0"/>
-              <a:t>18.01.2025</a:t>
+              <a:t>19.01.2025</a:t>
             </a:fld>
             <a:endParaRPr lang="de-CH"/>
           </a:p>
@@ -6501,7 +6913,7 @@
           <a:p>
             <a:fld id="{AB8F96E3-2EAC-4C18-B216-7E9D85CA2F89}" type="slidenum">
               <a:rPr lang="de-CH" smtClean="0"/>
-              <a:t>‹#›</a:t>
+              <a:t>‹Nr.›</a:t>
             </a:fld>
             <a:endParaRPr lang="de-CH"/>
           </a:p>
@@ -6554,7 +6966,7 @@
           <a:p>
             <a:fld id="{69F73540-DFB5-4816-8066-5D194A0B149D}" type="datetimeFigureOut">
               <a:rPr lang="de-CH" smtClean="0"/>
-              <a:t>18.01.2025</a:t>
+              <a:t>19.01.2025</a:t>
             </a:fld>
             <a:endParaRPr lang="de-CH"/>
           </a:p>
@@ -6596,7 +7008,7 @@
           <a:p>
             <a:fld id="{AB8F96E3-2EAC-4C18-B216-7E9D85CA2F89}" type="slidenum">
               <a:rPr lang="de-CH" smtClean="0"/>
-              <a:t>‹#›</a:t>
+              <a:t>‹Nr.›</a:t>
             </a:fld>
             <a:endParaRPr lang="de-CH"/>
           </a:p>
@@ -6833,7 +7245,7 @@
           <a:p>
             <a:fld id="{69F73540-DFB5-4816-8066-5D194A0B149D}" type="datetimeFigureOut">
               <a:rPr lang="de-CH" smtClean="0"/>
-              <a:t>18.01.2025</a:t>
+              <a:t>19.01.2025</a:t>
             </a:fld>
             <a:endParaRPr lang="de-CH"/>
           </a:p>
@@ -6875,7 +7287,7 @@
           <a:p>
             <a:fld id="{AB8F96E3-2EAC-4C18-B216-7E9D85CA2F89}" type="slidenum">
               <a:rPr lang="de-CH" smtClean="0"/>
-              <a:t>‹#›</a:t>
+              <a:t>‹Nr.›</a:t>
             </a:fld>
             <a:endParaRPr lang="de-CH"/>
           </a:p>
@@ -7108,7 +7520,7 @@
           <a:p>
             <a:fld id="{69F73540-DFB5-4816-8066-5D194A0B149D}" type="datetimeFigureOut">
               <a:rPr lang="de-CH" smtClean="0"/>
-              <a:t>18.01.2025</a:t>
+              <a:t>19.01.2025</a:t>
             </a:fld>
             <a:endParaRPr lang="de-CH"/>
           </a:p>
@@ -7150,7 +7562,7 @@
           <a:p>
             <a:fld id="{AB8F96E3-2EAC-4C18-B216-7E9D85CA2F89}" type="slidenum">
               <a:rPr lang="de-CH" smtClean="0"/>
-              <a:t>‹#›</a:t>
+              <a:t>‹Nr.›</a:t>
             </a:fld>
             <a:endParaRPr lang="de-CH"/>
           </a:p>
@@ -7537,7 +7949,7 @@
           <a:p>
             <a:fld id="{69F73540-DFB5-4816-8066-5D194A0B149D}" type="datetimeFigureOut">
               <a:rPr lang="de-CH" smtClean="0"/>
-              <a:t>18.01.2025</a:t>
+              <a:t>19.01.2025</a:t>
             </a:fld>
             <a:endParaRPr lang="de-CH"/>
           </a:p>
@@ -7616,7 +8028,7 @@
           <a:p>
             <a:fld id="{AB8F96E3-2EAC-4C18-B216-7E9D85CA2F89}" type="slidenum">
               <a:rPr lang="de-CH" smtClean="0"/>
-              <a:t>‹#›</a:t>
+              <a:t>‹Nr.›</a:t>
             </a:fld>
             <a:endParaRPr lang="de-CH"/>
           </a:p>
@@ -8155,7 +8567,13 @@
   <p:cSld>
     <p:spTree>
       <p:nvGrpSpPr>
-        <p:cNvPr id="1" name=""/>
+        <p:cNvPr id="1" name="">
+          <a:extLst>
+            <a:ext uri="{FF2B5EF4-FFF2-40B4-BE49-F238E27FC236}">
+              <a16:creationId xmlns:a16="http://schemas.microsoft.com/office/drawing/2014/main" id="{D4CE6762-3CAF-A1FF-4106-C77AF63F3185}"/>
+            </a:ext>
+          </a:extLst>
+        </p:cNvPr>
         <p:cNvGrpSpPr/>
         <p:nvPr/>
       </p:nvGrpSpPr>
@@ -8169,10 +8587,10 @@
       </p:grpSpPr>
       <p:sp>
         <p:nvSpPr>
-          <p:cNvPr id="2" name="Title 1">
+          <p:cNvPr id="2" name="Titel 1">
             <a:extLst>
               <a:ext uri="{FF2B5EF4-FFF2-40B4-BE49-F238E27FC236}">
-                <a16:creationId xmlns:a16="http://schemas.microsoft.com/office/drawing/2014/main" id="{36262027-BF33-4B1C-9478-81791AD91589}"/>
+                <a16:creationId xmlns:a16="http://schemas.microsoft.com/office/drawing/2014/main" id="{41922B27-4E93-1037-DAC0-3F28B408DE1F}"/>
               </a:ext>
             </a:extLst>
           </p:cNvPr>
@@ -8189,8 +8607,12 @@
           <a:lstStyle/>
           <a:p>
             <a:r>
+              <a:rPr lang="de-CH" dirty="0"/>
+              <a:t>Distribution </a:t>
+            </a:r>
+            <a:r>
               <a:rPr lang="de-CH" dirty="0" err="1"/>
-              <a:t>Contrast</a:t>
+              <a:t>of</a:t>
             </a:r>
             <a:r>
               <a:rPr lang="de-CH" dirty="0"/>
@@ -8198,44 +8620,57 @@
             </a:r>
             <a:r>
               <a:rPr lang="de-CH" dirty="0" err="1"/>
-              <a:t>approaches</a:t>
-            </a:r>
-            <a:br>
+              <a:t>entities</a:t>
+            </a:r>
+            <a:r>
               <a:rPr lang="de-CH" dirty="0"/>
-            </a:br>
-            <a:endParaRPr lang="en-US" dirty="0"/>
-          </a:p>
-        </p:txBody>
-      </p:sp>
-      <p:sp>
-        <p:nvSpPr>
-          <p:cNvPr id="3" name="Content Placeholder 2">
+              <a:t> in </a:t>
+            </a:r>
+            <a:r>
+              <a:rPr lang="de-CH" dirty="0" err="1"/>
+              <a:t>Italian</a:t>
+            </a:r>
+            <a:r>
+              <a:rPr lang="de-CH" dirty="0"/>
+              <a:t> Dataset</a:t>
+            </a:r>
+          </a:p>
+        </p:txBody>
+      </p:sp>
+      <p:pic>
+        <p:nvPicPr>
+          <p:cNvPr id="4" name="Grafik 3">
             <a:extLst>
               <a:ext uri="{FF2B5EF4-FFF2-40B4-BE49-F238E27FC236}">
-                <a16:creationId xmlns:a16="http://schemas.microsoft.com/office/drawing/2014/main" id="{7DA777B3-D815-424E-A73C-C2D1CF60108D}"/>
+                <a16:creationId xmlns:a16="http://schemas.microsoft.com/office/drawing/2014/main" id="{2F772168-0485-CD1E-DAFB-FF3022070A22}"/>
               </a:ext>
             </a:extLst>
           </p:cNvPr>
-          <p:cNvSpPr>
-            <a:spLocks noGrp="1"/>
-          </p:cNvSpPr>
-          <p:nvPr>
-            <p:ph idx="1"/>
-          </p:nvPr>
-        </p:nvSpPr>
-        <p:spPr/>
-        <p:txBody>
-          <a:bodyPr/>
-          <a:lstStyle/>
-          <a:p>
-            <a:endParaRPr lang="en-US"/>
-          </a:p>
-        </p:txBody>
-      </p:sp>
+          <p:cNvPicPr>
+            <a:picLocks noChangeAspect="1"/>
+          </p:cNvPicPr>
+          <p:nvPr/>
+        </p:nvPicPr>
+        <p:blipFill>
+          <a:blip r:embed="rId3"/>
+          <a:stretch>
+            <a:fillRect/>
+          </a:stretch>
+        </p:blipFill>
+        <p:spPr>
+          <a:xfrm>
+            <a:off x="3015048" y="1272341"/>
+            <a:ext cx="7318060" cy="5199673"/>
+          </a:xfrm>
+          <a:prstGeom prst="rect">
+            <a:avLst/>
+          </a:prstGeom>
+        </p:spPr>
+      </p:pic>
     </p:spTree>
     <p:extLst>
       <p:ext uri="{BB962C8B-B14F-4D97-AF65-F5344CB8AC3E}">
-        <p14:creationId xmlns:p14="http://schemas.microsoft.com/office/powerpoint/2010/main" val="1608941473"/>
+        <p14:creationId xmlns:p14="http://schemas.microsoft.com/office/powerpoint/2010/main" val="1829364656"/>
       </p:ext>
     </p:extLst>
   </p:cSld>
@@ -8267,7 +8702,7 @@
           <p:cNvPr id="2" name="Title 1">
             <a:extLst>
               <a:ext uri="{FF2B5EF4-FFF2-40B4-BE49-F238E27FC236}">
-                <a16:creationId xmlns:a16="http://schemas.microsoft.com/office/drawing/2014/main" id="{9FBABDAD-57E8-41A2-B50B-0F0C1F4E6F60}"/>
+                <a16:creationId xmlns:a16="http://schemas.microsoft.com/office/drawing/2014/main" id="{7803CF83-9342-4E66-BFF9-52E1EB566D14}"/>
               </a:ext>
             </a:extLst>
           </p:cNvPr>
@@ -8284,8 +8719,32 @@
           <a:lstStyle/>
           <a:p>
             <a:r>
+              <a:rPr lang="de-CH" dirty="0"/>
+              <a:t>Train and </a:t>
+            </a:r>
+            <a:r>
               <a:rPr lang="de-CH" dirty="0" err="1"/>
-              <a:t>Learnings</a:t>
+              <a:t>test</a:t>
+            </a:r>
+            <a:r>
+              <a:rPr lang="de-CH" dirty="0"/>
+              <a:t> </a:t>
+            </a:r>
+            <a:r>
+              <a:rPr lang="de-CH" dirty="0" err="1"/>
+              <a:t>the</a:t>
+            </a:r>
+            <a:r>
+              <a:rPr lang="de-CH" dirty="0"/>
+              <a:t> </a:t>
+            </a:r>
+            <a:r>
+              <a:rPr lang="de-CH" dirty="0" err="1"/>
+              <a:t>model</a:t>
+            </a:r>
+            <a:r>
+              <a:rPr lang="de-CH" dirty="0"/>
+              <a:t> in EN</a:t>
             </a:r>
             <a:br>
               <a:rPr lang="de-CH" dirty="0"/>
@@ -8299,7 +8758,7 @@
           <p:cNvPr id="3" name="Content Placeholder 2">
             <a:extLst>
               <a:ext uri="{FF2B5EF4-FFF2-40B4-BE49-F238E27FC236}">
-                <a16:creationId xmlns:a16="http://schemas.microsoft.com/office/drawing/2014/main" id="{2E2948E8-3EAA-4651-ACEE-3A97178783D4}"/>
+                <a16:creationId xmlns:a16="http://schemas.microsoft.com/office/drawing/2014/main" id="{28C55253-7D10-4122-B0FE-BF40AD36505E}"/>
               </a:ext>
             </a:extLst>
           </p:cNvPr>
@@ -8315,14 +8774,301 @@
           <a:bodyPr/>
           <a:lstStyle/>
           <a:p>
-            <a:endParaRPr lang="en-US"/>
+            <a:r>
+              <a:rPr lang="de-CH" dirty="0"/>
+              <a:t>Monolingual vs. multilingual </a:t>
+            </a:r>
+            <a:r>
+              <a:rPr lang="de-CH" dirty="0" err="1"/>
+              <a:t>training</a:t>
+            </a:r>
+            <a:r>
+              <a:rPr lang="de-CH" dirty="0"/>
+              <a:t>:</a:t>
+            </a:r>
+          </a:p>
+          <a:p>
+            <a:pPr lvl="1"/>
+            <a:r>
+              <a:rPr lang="de-CH" dirty="0" err="1"/>
+              <a:t>Less</a:t>
+            </a:r>
+            <a:r>
+              <a:rPr lang="de-CH" dirty="0"/>
+              <a:t> </a:t>
+            </a:r>
+            <a:r>
+              <a:rPr lang="de-CH" dirty="0" err="1"/>
+              <a:t>computational</a:t>
+            </a:r>
+            <a:r>
+              <a:rPr lang="de-CH" dirty="0"/>
+              <a:t> power </a:t>
+            </a:r>
+            <a:r>
+              <a:rPr lang="de-CH" dirty="0" err="1"/>
+              <a:t>needed</a:t>
+            </a:r>
+            <a:endParaRPr lang="de-CH" dirty="0"/>
+          </a:p>
+          <a:p>
+            <a:pPr lvl="1"/>
+            <a:r>
+              <a:rPr lang="de-CH" dirty="0"/>
+              <a:t>Simpler </a:t>
+            </a:r>
+            <a:r>
+              <a:rPr lang="de-CH" dirty="0" err="1"/>
+              <a:t>setup</a:t>
+            </a:r>
+            <a:r>
+              <a:rPr lang="de-CH" dirty="0"/>
+              <a:t>, </a:t>
+            </a:r>
+            <a:r>
+              <a:rPr lang="de-CH" dirty="0" err="1"/>
+              <a:t>faster</a:t>
+            </a:r>
+            <a:r>
+              <a:rPr lang="de-CH" dirty="0"/>
+              <a:t> </a:t>
+            </a:r>
+            <a:r>
+              <a:rPr lang="de-CH" dirty="0" err="1"/>
+              <a:t>training</a:t>
+            </a:r>
+            <a:endParaRPr lang="de-CH" dirty="0"/>
+          </a:p>
+          <a:p>
+            <a:pPr lvl="1"/>
+            <a:r>
+              <a:rPr lang="de-CH" dirty="0"/>
+              <a:t>Zero-</a:t>
+            </a:r>
+            <a:r>
+              <a:rPr lang="de-CH" dirty="0" err="1"/>
+              <a:t>shot</a:t>
+            </a:r>
+            <a:r>
+              <a:rPr lang="de-CH" dirty="0"/>
+              <a:t>-cross-lingual </a:t>
+            </a:r>
+            <a:r>
+              <a:rPr lang="de-CH" dirty="0" err="1"/>
+              <a:t>capacities</a:t>
+            </a:r>
+            <a:r>
+              <a:rPr lang="de-CH" dirty="0"/>
+              <a:t> </a:t>
+            </a:r>
+            <a:r>
+              <a:rPr lang="de-CH" dirty="0" err="1"/>
+              <a:t>of</a:t>
+            </a:r>
+            <a:r>
+              <a:rPr lang="de-CH" dirty="0"/>
+              <a:t> </a:t>
+            </a:r>
+            <a:r>
+              <a:rPr lang="de-CH" dirty="0" err="1"/>
+              <a:t>the</a:t>
+            </a:r>
+            <a:r>
+              <a:rPr lang="de-CH" dirty="0"/>
+              <a:t> </a:t>
+            </a:r>
+            <a:r>
+              <a:rPr lang="de-CH" dirty="0" err="1"/>
+              <a:t>models</a:t>
+            </a:r>
+            <a:r>
+              <a:rPr lang="de-CH" dirty="0"/>
+              <a:t> </a:t>
+            </a:r>
+            <a:r>
+              <a:rPr lang="de-CH" dirty="0" err="1"/>
+              <a:t>can</a:t>
+            </a:r>
+            <a:r>
+              <a:rPr lang="de-CH" dirty="0"/>
+              <a:t> </a:t>
+            </a:r>
+            <a:r>
+              <a:rPr lang="de-CH" dirty="0" err="1"/>
+              <a:t>be</a:t>
+            </a:r>
+            <a:r>
+              <a:rPr lang="de-CH" dirty="0"/>
+              <a:t> </a:t>
+            </a:r>
+            <a:r>
+              <a:rPr lang="de-CH" dirty="0" err="1"/>
+              <a:t>used</a:t>
+            </a:r>
+            <a:endParaRPr lang="de-CH" dirty="0"/>
+          </a:p>
+          <a:p>
+            <a:pPr lvl="1"/>
+            <a:r>
+              <a:rPr lang="de-CH" dirty="0"/>
+              <a:t>Evaluation </a:t>
+            </a:r>
+            <a:r>
+              <a:rPr lang="de-CH" dirty="0" err="1"/>
+              <a:t>of</a:t>
+            </a:r>
+            <a:r>
+              <a:rPr lang="de-CH" dirty="0"/>
+              <a:t> </a:t>
+            </a:r>
+            <a:r>
+              <a:rPr lang="de-CH" dirty="0" err="1"/>
+              <a:t>cross</a:t>
+            </a:r>
+            <a:r>
+              <a:rPr lang="de-CH" dirty="0"/>
+              <a:t>-lingual </a:t>
+            </a:r>
+            <a:r>
+              <a:rPr lang="de-CH" dirty="0" err="1"/>
+              <a:t>transfer</a:t>
+            </a:r>
+            <a:r>
+              <a:rPr lang="de-CH" dirty="0"/>
+              <a:t> </a:t>
+            </a:r>
+            <a:r>
+              <a:rPr lang="de-CH" dirty="0" err="1"/>
+              <a:t>is</a:t>
+            </a:r>
+            <a:r>
+              <a:rPr lang="de-CH" dirty="0"/>
+              <a:t> </a:t>
+            </a:r>
+            <a:r>
+              <a:rPr lang="de-CH" dirty="0" err="1"/>
+              <a:t>easier</a:t>
+            </a:r>
+            <a:endParaRPr lang="de-CH" dirty="0"/>
+          </a:p>
+          <a:p>
+            <a:pPr lvl="1"/>
+            <a:r>
+              <a:rPr lang="de-CH" dirty="0" err="1"/>
+              <a:t>Less</a:t>
+            </a:r>
+            <a:r>
+              <a:rPr lang="de-CH" dirty="0"/>
+              <a:t> </a:t>
+            </a:r>
+            <a:r>
+              <a:rPr lang="de-CH" dirty="0" err="1"/>
+              <a:t>complicated</a:t>
+            </a:r>
+            <a:r>
+              <a:rPr lang="de-CH" dirty="0"/>
+              <a:t> </a:t>
+            </a:r>
+            <a:r>
+              <a:rPr lang="de-CH" dirty="0" err="1"/>
+              <a:t>because</a:t>
+            </a:r>
+            <a:r>
+              <a:rPr lang="de-CH" dirty="0"/>
+              <a:t> </a:t>
+            </a:r>
+            <a:r>
+              <a:rPr lang="de-CH" dirty="0" err="1"/>
+              <a:t>no</a:t>
+            </a:r>
+            <a:r>
+              <a:rPr lang="de-CH" dirty="0"/>
+              <a:t> </a:t>
+            </a:r>
+            <a:r>
+              <a:rPr lang="de-CH" dirty="0" err="1"/>
+              <a:t>data</a:t>
+            </a:r>
+            <a:r>
+              <a:rPr lang="de-CH" dirty="0"/>
+              <a:t> </a:t>
+            </a:r>
+            <a:r>
+              <a:rPr lang="de-CH" dirty="0" err="1"/>
+              <a:t>fusion</a:t>
+            </a:r>
+            <a:r>
+              <a:rPr lang="de-CH" dirty="0"/>
+              <a:t> </a:t>
+            </a:r>
+            <a:r>
+              <a:rPr lang="de-CH"/>
+              <a:t>necessary</a:t>
+            </a:r>
+            <a:endParaRPr lang="de-CH" dirty="0"/>
+          </a:p>
+          <a:p>
+            <a:pPr lvl="1"/>
+            <a:r>
+              <a:rPr lang="de-CH" dirty="0" err="1"/>
+              <a:t>Easier</a:t>
+            </a:r>
+            <a:r>
+              <a:rPr lang="de-CH" dirty="0"/>
+              <a:t> </a:t>
+            </a:r>
+            <a:r>
+              <a:rPr lang="de-CH" dirty="0" err="1"/>
+              <a:t>to</a:t>
+            </a:r>
+            <a:r>
+              <a:rPr lang="de-CH" dirty="0"/>
+              <a:t> </a:t>
+            </a:r>
+            <a:r>
+              <a:rPr lang="de-CH" dirty="0" err="1"/>
+              <a:t>recognize</a:t>
+            </a:r>
+            <a:r>
+              <a:rPr lang="de-CH" dirty="0"/>
+              <a:t> </a:t>
+            </a:r>
+            <a:r>
+              <a:rPr lang="de-CH" dirty="0" err="1"/>
+              <a:t>generalization</a:t>
+            </a:r>
+            <a:r>
+              <a:rPr lang="de-CH" dirty="0"/>
+              <a:t> and </a:t>
+            </a:r>
+            <a:r>
+              <a:rPr lang="de-CH" dirty="0" err="1"/>
+              <a:t>language</a:t>
+            </a:r>
+            <a:r>
+              <a:rPr lang="de-CH" dirty="0"/>
+              <a:t> </a:t>
+            </a:r>
+            <a:r>
+              <a:rPr lang="de-CH" dirty="0" err="1"/>
+              <a:t>specific</a:t>
+            </a:r>
+            <a:r>
+              <a:rPr lang="de-CH" dirty="0"/>
+              <a:t> </a:t>
+            </a:r>
+            <a:r>
+              <a:rPr lang="de-CH" dirty="0" err="1"/>
+              <a:t>challenges</a:t>
+            </a:r>
+            <a:endParaRPr lang="en-US" dirty="0"/>
           </a:p>
         </p:txBody>
       </p:sp>
     </p:spTree>
     <p:extLst>
       <p:ext uri="{BB962C8B-B14F-4D97-AF65-F5344CB8AC3E}">
-        <p14:creationId xmlns:p14="http://schemas.microsoft.com/office/powerpoint/2010/main" val="2800151962"/>
+        <p14:creationId xmlns:p14="http://schemas.microsoft.com/office/powerpoint/2010/main" val="758282281"/>
       </p:ext>
     </p:extLst>
   </p:cSld>
@@ -8354,6 +9100,378 @@
           <p:cNvPr id="2" name="Title 1">
             <a:extLst>
               <a:ext uri="{FF2B5EF4-FFF2-40B4-BE49-F238E27FC236}">
+                <a16:creationId xmlns:a16="http://schemas.microsoft.com/office/drawing/2014/main" id="{20AB11EB-9845-4ED2-AE25-552596FDA2CC}"/>
+              </a:ext>
+            </a:extLst>
+          </p:cNvPr>
+          <p:cNvSpPr>
+            <a:spLocks noGrp="1"/>
+          </p:cNvSpPr>
+          <p:nvPr>
+            <p:ph type="title"/>
+          </p:nvPr>
+        </p:nvSpPr>
+        <p:spPr/>
+        <p:txBody>
+          <a:bodyPr/>
+          <a:lstStyle/>
+          <a:p>
+            <a:r>
+              <a:rPr lang="de-CH" dirty="0"/>
+              <a:t>Test </a:t>
+            </a:r>
+            <a:r>
+              <a:rPr lang="de-CH" dirty="0" err="1"/>
+              <a:t>the</a:t>
+            </a:r>
+            <a:r>
+              <a:rPr lang="de-CH" dirty="0"/>
+              <a:t> </a:t>
+            </a:r>
+            <a:r>
+              <a:rPr lang="de-CH" dirty="0" err="1"/>
+              <a:t>model</a:t>
+            </a:r>
+            <a:r>
+              <a:rPr lang="de-CH" dirty="0"/>
+              <a:t> in DE, FR and IT</a:t>
+            </a:r>
+            <a:br>
+              <a:rPr lang="de-CH" dirty="0"/>
+            </a:br>
+            <a:endParaRPr lang="en-US" dirty="0"/>
+          </a:p>
+        </p:txBody>
+      </p:sp>
+      <p:sp>
+        <p:nvSpPr>
+          <p:cNvPr id="3" name="Content Placeholder 2">
+            <a:extLst>
+              <a:ext uri="{FF2B5EF4-FFF2-40B4-BE49-F238E27FC236}">
+                <a16:creationId xmlns:a16="http://schemas.microsoft.com/office/drawing/2014/main" id="{390FB31B-FE28-431F-9E4D-81A0F209F1AA}"/>
+              </a:ext>
+            </a:extLst>
+          </p:cNvPr>
+          <p:cNvSpPr>
+            <a:spLocks noGrp="1"/>
+          </p:cNvSpPr>
+          <p:nvPr>
+            <p:ph idx="1"/>
+          </p:nvPr>
+        </p:nvSpPr>
+        <p:spPr/>
+        <p:txBody>
+          <a:bodyPr/>
+          <a:lstStyle/>
+          <a:p>
+            <a:endParaRPr lang="en-US"/>
+          </a:p>
+        </p:txBody>
+      </p:sp>
+    </p:spTree>
+    <p:extLst>
+      <p:ext uri="{BB962C8B-B14F-4D97-AF65-F5344CB8AC3E}">
+        <p14:creationId xmlns:p14="http://schemas.microsoft.com/office/powerpoint/2010/main" val="846595895"/>
+      </p:ext>
+    </p:extLst>
+  </p:cSld>
+  <p:clrMapOvr>
+    <a:masterClrMapping/>
+  </p:clrMapOvr>
+</p:sld>
+</file>
+
+<file path=ppt/slides/slide13.xml><?xml version="1.0" encoding="utf-8"?>
+<p:sld xmlns:a="http://schemas.openxmlformats.org/drawingml/2006/main" xmlns:r="http://schemas.openxmlformats.org/officeDocument/2006/relationships" xmlns:p="http://schemas.openxmlformats.org/presentationml/2006/main">
+  <p:cSld>
+    <p:spTree>
+      <p:nvGrpSpPr>
+        <p:cNvPr id="1" name=""/>
+        <p:cNvGrpSpPr/>
+        <p:nvPr/>
+      </p:nvGrpSpPr>
+      <p:grpSpPr>
+        <a:xfrm>
+          <a:off x="0" y="0"/>
+          <a:ext cx="0" cy="0"/>
+          <a:chOff x="0" y="0"/>
+          <a:chExt cx="0" cy="0"/>
+        </a:xfrm>
+      </p:grpSpPr>
+      <p:sp>
+        <p:nvSpPr>
+          <p:cNvPr id="2" name="Title 1">
+            <a:extLst>
+              <a:ext uri="{FF2B5EF4-FFF2-40B4-BE49-F238E27FC236}">
+                <a16:creationId xmlns:a16="http://schemas.microsoft.com/office/drawing/2014/main" id="{0913BBCD-948C-44D6-9FAF-BA651248C8F9}"/>
+              </a:ext>
+            </a:extLst>
+          </p:cNvPr>
+          <p:cNvSpPr>
+            <a:spLocks noGrp="1"/>
+          </p:cNvSpPr>
+          <p:nvPr>
+            <p:ph type="title"/>
+          </p:nvPr>
+        </p:nvSpPr>
+        <p:spPr/>
+        <p:txBody>
+          <a:bodyPr/>
+          <a:lstStyle/>
+          <a:p>
+            <a:r>
+              <a:rPr lang="de-CH" dirty="0" err="1"/>
+              <a:t>Results</a:t>
+            </a:r>
+            <a:br>
+              <a:rPr lang="de-CH" dirty="0"/>
+            </a:br>
+            <a:endParaRPr lang="en-US" dirty="0"/>
+          </a:p>
+        </p:txBody>
+      </p:sp>
+      <p:sp>
+        <p:nvSpPr>
+          <p:cNvPr id="3" name="Content Placeholder 2">
+            <a:extLst>
+              <a:ext uri="{FF2B5EF4-FFF2-40B4-BE49-F238E27FC236}">
+                <a16:creationId xmlns:a16="http://schemas.microsoft.com/office/drawing/2014/main" id="{CD2C2720-0DE9-46D1-9C59-6F205CB75879}"/>
+              </a:ext>
+            </a:extLst>
+          </p:cNvPr>
+          <p:cNvSpPr>
+            <a:spLocks noGrp="1"/>
+          </p:cNvSpPr>
+          <p:nvPr>
+            <p:ph idx="1"/>
+          </p:nvPr>
+        </p:nvSpPr>
+        <p:spPr/>
+        <p:txBody>
+          <a:bodyPr/>
+          <a:lstStyle/>
+          <a:p>
+            <a:endParaRPr lang="en-US"/>
+          </a:p>
+        </p:txBody>
+      </p:sp>
+    </p:spTree>
+    <p:extLst>
+      <p:ext uri="{BB962C8B-B14F-4D97-AF65-F5344CB8AC3E}">
+        <p14:creationId xmlns:p14="http://schemas.microsoft.com/office/powerpoint/2010/main" val="4079610711"/>
+      </p:ext>
+    </p:extLst>
+  </p:cSld>
+  <p:clrMapOvr>
+    <a:masterClrMapping/>
+  </p:clrMapOvr>
+</p:sld>
+</file>
+
+<file path=ppt/slides/slide14.xml><?xml version="1.0" encoding="utf-8"?>
+<p:sld xmlns:a="http://schemas.openxmlformats.org/drawingml/2006/main" xmlns:r="http://schemas.openxmlformats.org/officeDocument/2006/relationships" xmlns:p="http://schemas.openxmlformats.org/presentationml/2006/main">
+  <p:cSld>
+    <p:spTree>
+      <p:nvGrpSpPr>
+        <p:cNvPr id="1" name=""/>
+        <p:cNvGrpSpPr/>
+        <p:nvPr/>
+      </p:nvGrpSpPr>
+      <p:grpSpPr>
+        <a:xfrm>
+          <a:off x="0" y="0"/>
+          <a:ext cx="0" cy="0"/>
+          <a:chOff x="0" y="0"/>
+          <a:chExt cx="0" cy="0"/>
+        </a:xfrm>
+      </p:grpSpPr>
+      <p:sp>
+        <p:nvSpPr>
+          <p:cNvPr id="2" name="Title 1">
+            <a:extLst>
+              <a:ext uri="{FF2B5EF4-FFF2-40B4-BE49-F238E27FC236}">
+                <a16:creationId xmlns:a16="http://schemas.microsoft.com/office/drawing/2014/main" id="{36262027-BF33-4B1C-9478-81791AD91589}"/>
+              </a:ext>
+            </a:extLst>
+          </p:cNvPr>
+          <p:cNvSpPr>
+            <a:spLocks noGrp="1"/>
+          </p:cNvSpPr>
+          <p:nvPr>
+            <p:ph type="title"/>
+          </p:nvPr>
+        </p:nvSpPr>
+        <p:spPr/>
+        <p:txBody>
+          <a:bodyPr/>
+          <a:lstStyle/>
+          <a:p>
+            <a:r>
+              <a:rPr lang="de-CH" dirty="0" err="1"/>
+              <a:t>Contrast</a:t>
+            </a:r>
+            <a:r>
+              <a:rPr lang="de-CH" dirty="0"/>
+              <a:t> </a:t>
+            </a:r>
+            <a:r>
+              <a:rPr lang="de-CH" dirty="0" err="1"/>
+              <a:t>approaches</a:t>
+            </a:r>
+            <a:br>
+              <a:rPr lang="de-CH" dirty="0"/>
+            </a:br>
+            <a:endParaRPr lang="en-US" dirty="0"/>
+          </a:p>
+        </p:txBody>
+      </p:sp>
+      <p:sp>
+        <p:nvSpPr>
+          <p:cNvPr id="3" name="Content Placeholder 2">
+            <a:extLst>
+              <a:ext uri="{FF2B5EF4-FFF2-40B4-BE49-F238E27FC236}">
+                <a16:creationId xmlns:a16="http://schemas.microsoft.com/office/drawing/2014/main" id="{7DA777B3-D815-424E-A73C-C2D1CF60108D}"/>
+              </a:ext>
+            </a:extLst>
+          </p:cNvPr>
+          <p:cNvSpPr>
+            <a:spLocks noGrp="1"/>
+          </p:cNvSpPr>
+          <p:nvPr>
+            <p:ph idx="1"/>
+          </p:nvPr>
+        </p:nvSpPr>
+        <p:spPr/>
+        <p:txBody>
+          <a:bodyPr/>
+          <a:lstStyle/>
+          <a:p>
+            <a:endParaRPr lang="en-US"/>
+          </a:p>
+        </p:txBody>
+      </p:sp>
+    </p:spTree>
+    <p:extLst>
+      <p:ext uri="{BB962C8B-B14F-4D97-AF65-F5344CB8AC3E}">
+        <p14:creationId xmlns:p14="http://schemas.microsoft.com/office/powerpoint/2010/main" val="1608941473"/>
+      </p:ext>
+    </p:extLst>
+  </p:cSld>
+  <p:clrMapOvr>
+    <a:masterClrMapping/>
+  </p:clrMapOvr>
+</p:sld>
+</file>
+
+<file path=ppt/slides/slide15.xml><?xml version="1.0" encoding="utf-8"?>
+<p:sld xmlns:a="http://schemas.openxmlformats.org/drawingml/2006/main" xmlns:r="http://schemas.openxmlformats.org/officeDocument/2006/relationships" xmlns:p="http://schemas.openxmlformats.org/presentationml/2006/main">
+  <p:cSld>
+    <p:spTree>
+      <p:nvGrpSpPr>
+        <p:cNvPr id="1" name=""/>
+        <p:cNvGrpSpPr/>
+        <p:nvPr/>
+      </p:nvGrpSpPr>
+      <p:grpSpPr>
+        <a:xfrm>
+          <a:off x="0" y="0"/>
+          <a:ext cx="0" cy="0"/>
+          <a:chOff x="0" y="0"/>
+          <a:chExt cx="0" cy="0"/>
+        </a:xfrm>
+      </p:grpSpPr>
+      <p:sp>
+        <p:nvSpPr>
+          <p:cNvPr id="2" name="Title 1">
+            <a:extLst>
+              <a:ext uri="{FF2B5EF4-FFF2-40B4-BE49-F238E27FC236}">
+                <a16:creationId xmlns:a16="http://schemas.microsoft.com/office/drawing/2014/main" id="{9FBABDAD-57E8-41A2-B50B-0F0C1F4E6F60}"/>
+              </a:ext>
+            </a:extLst>
+          </p:cNvPr>
+          <p:cNvSpPr>
+            <a:spLocks noGrp="1"/>
+          </p:cNvSpPr>
+          <p:nvPr>
+            <p:ph type="title"/>
+          </p:nvPr>
+        </p:nvSpPr>
+        <p:spPr/>
+        <p:txBody>
+          <a:bodyPr/>
+          <a:lstStyle/>
+          <a:p>
+            <a:r>
+              <a:rPr lang="de-CH" dirty="0" err="1"/>
+              <a:t>Learnings</a:t>
+            </a:r>
+            <a:br>
+              <a:rPr lang="de-CH" dirty="0"/>
+            </a:br>
+            <a:endParaRPr lang="en-US" dirty="0"/>
+          </a:p>
+        </p:txBody>
+      </p:sp>
+      <p:sp>
+        <p:nvSpPr>
+          <p:cNvPr id="3" name="Content Placeholder 2">
+            <a:extLst>
+              <a:ext uri="{FF2B5EF4-FFF2-40B4-BE49-F238E27FC236}">
+                <a16:creationId xmlns:a16="http://schemas.microsoft.com/office/drawing/2014/main" id="{2E2948E8-3EAA-4651-ACEE-3A97178783D4}"/>
+              </a:ext>
+            </a:extLst>
+          </p:cNvPr>
+          <p:cNvSpPr>
+            <a:spLocks noGrp="1"/>
+          </p:cNvSpPr>
+          <p:nvPr>
+            <p:ph idx="1"/>
+          </p:nvPr>
+        </p:nvSpPr>
+        <p:spPr/>
+        <p:txBody>
+          <a:bodyPr/>
+          <a:lstStyle/>
+          <a:p>
+            <a:endParaRPr lang="en-US"/>
+          </a:p>
+        </p:txBody>
+      </p:sp>
+    </p:spTree>
+    <p:extLst>
+      <p:ext uri="{BB962C8B-B14F-4D97-AF65-F5344CB8AC3E}">
+        <p14:creationId xmlns:p14="http://schemas.microsoft.com/office/powerpoint/2010/main" val="2800151962"/>
+      </p:ext>
+    </p:extLst>
+  </p:cSld>
+  <p:clrMapOvr>
+    <a:masterClrMapping/>
+  </p:clrMapOvr>
+</p:sld>
+</file>
+
+<file path=ppt/slides/slide16.xml><?xml version="1.0" encoding="utf-8"?>
+<p:sld xmlns:a="http://schemas.openxmlformats.org/drawingml/2006/main" xmlns:r="http://schemas.openxmlformats.org/officeDocument/2006/relationships" xmlns:p="http://schemas.openxmlformats.org/presentationml/2006/main">
+  <p:cSld>
+    <p:spTree>
+      <p:nvGrpSpPr>
+        <p:cNvPr id="1" name=""/>
+        <p:cNvGrpSpPr/>
+        <p:nvPr/>
+      </p:nvGrpSpPr>
+      <p:grpSpPr>
+        <a:xfrm>
+          <a:off x="0" y="0"/>
+          <a:ext cx="0" cy="0"/>
+          <a:chOff x="0" y="0"/>
+          <a:chExt cx="0" cy="0"/>
+        </a:xfrm>
+      </p:grpSpPr>
+      <p:sp>
+        <p:nvSpPr>
+          <p:cNvPr id="2" name="Title 1">
+            <a:extLst>
+              <a:ext uri="{FF2B5EF4-FFF2-40B4-BE49-F238E27FC236}">
                 <a16:creationId xmlns:a16="http://schemas.microsoft.com/office/drawing/2014/main" id="{2ED5ED2D-F749-4853-AC3A-C7183786CD9B}"/>
               </a:ext>
             </a:extLst>
@@ -8419,7 +9537,7 @@
 </p:sld>
 </file>
 
-<file path=ppt/slides/slide13.xml><?xml version="1.0" encoding="utf-8"?>
+<file path=ppt/slides/slide17.xml><?xml version="1.0" encoding="utf-8"?>
 <p:sld xmlns:a="http://schemas.openxmlformats.org/drawingml/2006/main" xmlns:r="http://schemas.openxmlformats.org/officeDocument/2006/relationships" xmlns:p="http://schemas.openxmlformats.org/presentationml/2006/main">
   <p:cSld>
     <p:spTree>
@@ -9924,10 +11042,10 @@
       </p:grpSpPr>
       <p:sp>
         <p:nvSpPr>
-          <p:cNvPr id="2" name="Title 1">
+          <p:cNvPr id="2" name="Titel 1">
             <a:extLst>
               <a:ext uri="{FF2B5EF4-FFF2-40B4-BE49-F238E27FC236}">
-                <a16:creationId xmlns:a16="http://schemas.microsoft.com/office/drawing/2014/main" id="{7803CF83-9342-4E66-BFF9-52E1EB566D14}"/>
+                <a16:creationId xmlns:a16="http://schemas.microsoft.com/office/drawing/2014/main" id="{72A83D03-239D-9B10-70F2-44EE9945E92B}"/>
               </a:ext>
             </a:extLst>
           </p:cNvPr>
@@ -9945,11 +11063,11 @@
           <a:p>
             <a:r>
               <a:rPr lang="de-CH" dirty="0"/>
-              <a:t>Train and </a:t>
+              <a:t>Distribution </a:t>
             </a:r>
             <a:r>
               <a:rPr lang="de-CH" dirty="0" err="1"/>
-              <a:t>test</a:t>
+              <a:t>of</a:t>
             </a:r>
             <a:r>
               <a:rPr lang="de-CH" dirty="0"/>
@@ -9957,343 +11075,49 @@
             </a:r>
             <a:r>
               <a:rPr lang="de-CH" dirty="0" err="1"/>
-              <a:t>the</a:t>
+              <a:t>entities</a:t>
             </a:r>
             <a:r>
               <a:rPr lang="de-CH" dirty="0"/>
-              <a:t> </a:t>
-            </a:r>
-            <a:r>
-              <a:rPr lang="de-CH" dirty="0" err="1"/>
-              <a:t>model</a:t>
-            </a:r>
-            <a:r>
-              <a:rPr lang="de-CH" dirty="0"/>
-              <a:t> in EN</a:t>
-            </a:r>
-            <a:br>
-              <a:rPr lang="de-CH" dirty="0"/>
-            </a:br>
-            <a:endParaRPr lang="en-US" dirty="0"/>
-          </a:p>
-        </p:txBody>
-      </p:sp>
-      <p:sp>
-        <p:nvSpPr>
-          <p:cNvPr id="3" name="Content Placeholder 2">
+              <a:t> in English Dataset</a:t>
+            </a:r>
+          </a:p>
+        </p:txBody>
+      </p:sp>
+      <p:pic>
+        <p:nvPicPr>
+          <p:cNvPr id="5" name="Grafik 4">
             <a:extLst>
               <a:ext uri="{FF2B5EF4-FFF2-40B4-BE49-F238E27FC236}">
-                <a16:creationId xmlns:a16="http://schemas.microsoft.com/office/drawing/2014/main" id="{28C55253-7D10-4122-B0FE-BF40AD36505E}"/>
+                <a16:creationId xmlns:a16="http://schemas.microsoft.com/office/drawing/2014/main" id="{DE9D98E0-9D2C-48F2-B605-4F9AB1386237}"/>
               </a:ext>
             </a:extLst>
           </p:cNvPr>
-          <p:cNvSpPr>
-            <a:spLocks noGrp="1"/>
-          </p:cNvSpPr>
-          <p:nvPr>
-            <p:ph idx="1"/>
-          </p:nvPr>
-        </p:nvSpPr>
-        <p:spPr/>
-        <p:txBody>
-          <a:bodyPr/>
-          <a:lstStyle/>
-          <a:p>
-            <a:r>
-              <a:rPr lang="de-CH" dirty="0"/>
-              <a:t>Monolingual vs. multilingual </a:t>
-            </a:r>
-            <a:r>
-              <a:rPr lang="de-CH" dirty="0" err="1"/>
-              <a:t>training</a:t>
-            </a:r>
-            <a:r>
-              <a:rPr lang="de-CH" dirty="0"/>
-              <a:t>:</a:t>
-            </a:r>
-          </a:p>
-          <a:p>
-            <a:pPr lvl="1"/>
-            <a:r>
-              <a:rPr lang="de-CH" dirty="0" err="1"/>
-              <a:t>Less</a:t>
-            </a:r>
-            <a:r>
-              <a:rPr lang="de-CH" dirty="0"/>
-              <a:t> </a:t>
-            </a:r>
-            <a:r>
-              <a:rPr lang="de-CH" dirty="0" err="1"/>
-              <a:t>computational</a:t>
-            </a:r>
-            <a:r>
-              <a:rPr lang="de-CH" dirty="0"/>
-              <a:t> power </a:t>
-            </a:r>
-            <a:r>
-              <a:rPr lang="de-CH" dirty="0" err="1"/>
-              <a:t>needed</a:t>
-            </a:r>
-            <a:endParaRPr lang="de-CH" dirty="0"/>
-          </a:p>
-          <a:p>
-            <a:pPr lvl="1"/>
-            <a:r>
-              <a:rPr lang="de-CH" dirty="0"/>
-              <a:t>Simpler </a:t>
-            </a:r>
-            <a:r>
-              <a:rPr lang="de-CH" dirty="0" err="1"/>
-              <a:t>setup</a:t>
-            </a:r>
-            <a:r>
-              <a:rPr lang="de-CH" dirty="0"/>
-              <a:t>, </a:t>
-            </a:r>
-            <a:r>
-              <a:rPr lang="de-CH" dirty="0" err="1"/>
-              <a:t>faster</a:t>
-            </a:r>
-            <a:r>
-              <a:rPr lang="de-CH" dirty="0"/>
-              <a:t> </a:t>
-            </a:r>
-            <a:r>
-              <a:rPr lang="de-CH" dirty="0" err="1"/>
-              <a:t>training</a:t>
-            </a:r>
-            <a:endParaRPr lang="de-CH" dirty="0"/>
-          </a:p>
-          <a:p>
-            <a:pPr lvl="1"/>
-            <a:r>
-              <a:rPr lang="de-CH" dirty="0"/>
-              <a:t>Zero-</a:t>
-            </a:r>
-            <a:r>
-              <a:rPr lang="de-CH" dirty="0" err="1"/>
-              <a:t>shot</a:t>
-            </a:r>
-            <a:r>
-              <a:rPr lang="de-CH" dirty="0"/>
-              <a:t>-cross-lingual </a:t>
-            </a:r>
-            <a:r>
-              <a:rPr lang="de-CH" dirty="0" err="1"/>
-              <a:t>capacities</a:t>
-            </a:r>
-            <a:r>
-              <a:rPr lang="de-CH" dirty="0"/>
-              <a:t> </a:t>
-            </a:r>
-            <a:r>
-              <a:rPr lang="de-CH" dirty="0" err="1"/>
-              <a:t>of</a:t>
-            </a:r>
-            <a:r>
-              <a:rPr lang="de-CH" dirty="0"/>
-              <a:t> </a:t>
-            </a:r>
-            <a:r>
-              <a:rPr lang="de-CH" dirty="0" err="1"/>
-              <a:t>the</a:t>
-            </a:r>
-            <a:r>
-              <a:rPr lang="de-CH" dirty="0"/>
-              <a:t> </a:t>
-            </a:r>
-            <a:r>
-              <a:rPr lang="de-CH" dirty="0" err="1"/>
-              <a:t>models</a:t>
-            </a:r>
-            <a:r>
-              <a:rPr lang="de-CH" dirty="0"/>
-              <a:t> </a:t>
-            </a:r>
-            <a:r>
-              <a:rPr lang="de-CH" dirty="0" err="1"/>
-              <a:t>can</a:t>
-            </a:r>
-            <a:r>
-              <a:rPr lang="de-CH" dirty="0"/>
-              <a:t> </a:t>
-            </a:r>
-            <a:r>
-              <a:rPr lang="de-CH" dirty="0" err="1"/>
-              <a:t>be</a:t>
-            </a:r>
-            <a:r>
-              <a:rPr lang="de-CH" dirty="0"/>
-              <a:t> </a:t>
-            </a:r>
-            <a:r>
-              <a:rPr lang="de-CH" dirty="0" err="1"/>
-              <a:t>used</a:t>
-            </a:r>
-            <a:endParaRPr lang="de-CH" dirty="0"/>
-          </a:p>
-          <a:p>
-            <a:pPr lvl="1"/>
-            <a:r>
-              <a:rPr lang="de-CH" dirty="0"/>
-              <a:t>Evaluation </a:t>
-            </a:r>
-            <a:r>
-              <a:rPr lang="de-CH" dirty="0" err="1"/>
-              <a:t>of</a:t>
-            </a:r>
-            <a:r>
-              <a:rPr lang="de-CH" dirty="0"/>
-              <a:t> </a:t>
-            </a:r>
-            <a:r>
-              <a:rPr lang="de-CH" dirty="0" err="1"/>
-              <a:t>cross</a:t>
-            </a:r>
-            <a:r>
-              <a:rPr lang="de-CH" dirty="0"/>
-              <a:t>-lingual </a:t>
-            </a:r>
-            <a:r>
-              <a:rPr lang="de-CH" dirty="0" err="1"/>
-              <a:t>transfer</a:t>
-            </a:r>
-            <a:r>
-              <a:rPr lang="de-CH" dirty="0"/>
-              <a:t> </a:t>
-            </a:r>
-            <a:r>
-              <a:rPr lang="de-CH" dirty="0" err="1"/>
-              <a:t>is</a:t>
-            </a:r>
-            <a:r>
-              <a:rPr lang="de-CH" dirty="0"/>
-              <a:t> </a:t>
-            </a:r>
-            <a:r>
-              <a:rPr lang="de-CH" dirty="0" err="1"/>
-              <a:t>easier</a:t>
-            </a:r>
-            <a:endParaRPr lang="de-CH" dirty="0"/>
-          </a:p>
-          <a:p>
-            <a:pPr lvl="1"/>
-            <a:r>
-              <a:rPr lang="de-CH" dirty="0" err="1"/>
-              <a:t>Less</a:t>
-            </a:r>
-            <a:r>
-              <a:rPr lang="de-CH" dirty="0"/>
-              <a:t> </a:t>
-            </a:r>
-            <a:r>
-              <a:rPr lang="de-CH" dirty="0" err="1"/>
-              <a:t>complicated</a:t>
-            </a:r>
-            <a:r>
-              <a:rPr lang="de-CH" dirty="0"/>
-              <a:t> </a:t>
-            </a:r>
-            <a:r>
-              <a:rPr lang="de-CH" dirty="0" err="1"/>
-              <a:t>because</a:t>
-            </a:r>
-            <a:r>
-              <a:rPr lang="de-CH" dirty="0"/>
-              <a:t> </a:t>
-            </a:r>
-            <a:r>
-              <a:rPr lang="de-CH" dirty="0" err="1"/>
-              <a:t>no</a:t>
-            </a:r>
-            <a:r>
-              <a:rPr lang="de-CH" dirty="0"/>
-              <a:t> </a:t>
-            </a:r>
-            <a:r>
-              <a:rPr lang="de-CH" dirty="0" err="1"/>
-              <a:t>data</a:t>
-            </a:r>
-            <a:r>
-              <a:rPr lang="de-CH" dirty="0"/>
-              <a:t> </a:t>
-            </a:r>
-            <a:r>
-              <a:rPr lang="de-CH" dirty="0" err="1"/>
-              <a:t>fusion</a:t>
-            </a:r>
-            <a:r>
-              <a:rPr lang="de-CH" dirty="0"/>
-              <a:t> </a:t>
-            </a:r>
-            <a:r>
-              <a:rPr lang="de-CH"/>
-              <a:t>necessary</a:t>
-            </a:r>
-            <a:endParaRPr lang="de-CH" dirty="0"/>
-          </a:p>
-          <a:p>
-            <a:pPr lvl="1"/>
-            <a:r>
-              <a:rPr lang="de-CH" dirty="0" err="1"/>
-              <a:t>Easier</a:t>
-            </a:r>
-            <a:r>
-              <a:rPr lang="de-CH" dirty="0"/>
-              <a:t> </a:t>
-            </a:r>
-            <a:r>
-              <a:rPr lang="de-CH" dirty="0" err="1"/>
-              <a:t>to</a:t>
-            </a:r>
-            <a:r>
-              <a:rPr lang="de-CH" dirty="0"/>
-              <a:t> </a:t>
-            </a:r>
-            <a:r>
-              <a:rPr lang="de-CH" dirty="0" err="1"/>
-              <a:t>recognize</a:t>
-            </a:r>
-            <a:r>
-              <a:rPr lang="de-CH" dirty="0"/>
-              <a:t> </a:t>
-            </a:r>
-            <a:r>
-              <a:rPr lang="de-CH" dirty="0" err="1"/>
-              <a:t>generalization</a:t>
-            </a:r>
-            <a:r>
-              <a:rPr lang="de-CH" dirty="0"/>
-              <a:t> and </a:t>
-            </a:r>
-            <a:r>
-              <a:rPr lang="de-CH" dirty="0" err="1"/>
-              <a:t>language</a:t>
-            </a:r>
-            <a:r>
-              <a:rPr lang="de-CH" dirty="0"/>
-              <a:t> </a:t>
-            </a:r>
-            <a:r>
-              <a:rPr lang="de-CH" dirty="0" err="1"/>
-              <a:t>specific</a:t>
-            </a:r>
-            <a:r>
-              <a:rPr lang="de-CH" dirty="0"/>
-              <a:t> </a:t>
-            </a:r>
-            <a:r>
-              <a:rPr lang="de-CH" dirty="0" err="1"/>
-              <a:t>challenges</a:t>
-            </a:r>
-            <a:endParaRPr lang="en-US" dirty="0"/>
-          </a:p>
-        </p:txBody>
-      </p:sp>
+          <p:cNvPicPr>
+            <a:picLocks noChangeAspect="1"/>
+          </p:cNvPicPr>
+          <p:nvPr/>
+        </p:nvPicPr>
+        <p:blipFill>
+          <a:blip r:embed="rId3"/>
+          <a:stretch>
+            <a:fillRect/>
+          </a:stretch>
+        </p:blipFill>
+        <p:spPr>
+          <a:xfrm>
+            <a:off x="3029565" y="1367481"/>
+            <a:ext cx="7352173" cy="5319567"/>
+          </a:xfrm>
+          <a:prstGeom prst="rect">
+            <a:avLst/>
+          </a:prstGeom>
+        </p:spPr>
+      </p:pic>
     </p:spTree>
     <p:extLst>
       <p:ext uri="{BB962C8B-B14F-4D97-AF65-F5344CB8AC3E}">
-        <p14:creationId xmlns:p14="http://schemas.microsoft.com/office/powerpoint/2010/main" val="758282281"/>
+        <p14:creationId xmlns:p14="http://schemas.microsoft.com/office/powerpoint/2010/main" val="2301987029"/>
       </p:ext>
     </p:extLst>
   </p:cSld>
@@ -10308,7 +11132,13 @@
   <p:cSld>
     <p:spTree>
       <p:nvGrpSpPr>
-        <p:cNvPr id="1" name=""/>
+        <p:cNvPr id="1" name="">
+          <a:extLst>
+            <a:ext uri="{FF2B5EF4-FFF2-40B4-BE49-F238E27FC236}">
+              <a16:creationId xmlns:a16="http://schemas.microsoft.com/office/drawing/2014/main" id="{76F753A7-71E9-7C0C-323A-96DF833E1823}"/>
+            </a:ext>
+          </a:extLst>
+        </p:cNvPr>
         <p:cNvGrpSpPr/>
         <p:nvPr/>
       </p:nvGrpSpPr>
@@ -10322,10 +11152,10 @@
       </p:grpSpPr>
       <p:sp>
         <p:nvSpPr>
-          <p:cNvPr id="2" name="Title 1">
+          <p:cNvPr id="2" name="Titel 1">
             <a:extLst>
               <a:ext uri="{FF2B5EF4-FFF2-40B4-BE49-F238E27FC236}">
-                <a16:creationId xmlns:a16="http://schemas.microsoft.com/office/drawing/2014/main" id="{20AB11EB-9845-4ED2-AE25-552596FDA2CC}"/>
+                <a16:creationId xmlns:a16="http://schemas.microsoft.com/office/drawing/2014/main" id="{D62D4727-1847-877F-3BBA-6AB11CF00E01}"/>
               </a:ext>
             </a:extLst>
           </p:cNvPr>
@@ -10343,11 +11173,11 @@
           <a:p>
             <a:r>
               <a:rPr lang="de-CH" dirty="0"/>
-              <a:t>Test </a:t>
+              <a:t>Distribution </a:t>
             </a:r>
             <a:r>
               <a:rPr lang="de-CH" dirty="0" err="1"/>
-              <a:t>the</a:t>
+              <a:t>of</a:t>
             </a:r>
             <a:r>
               <a:rPr lang="de-CH" dirty="0"/>
@@ -10355,48 +11185,49 @@
             </a:r>
             <a:r>
               <a:rPr lang="de-CH" dirty="0" err="1"/>
-              <a:t>model</a:t>
+              <a:t>entities</a:t>
             </a:r>
             <a:r>
               <a:rPr lang="de-CH" dirty="0"/>
-              <a:t> in DE, FR and IT</a:t>
-            </a:r>
-            <a:br>
-              <a:rPr lang="de-CH" dirty="0"/>
-            </a:br>
-            <a:endParaRPr lang="en-US" dirty="0"/>
-          </a:p>
-        </p:txBody>
-      </p:sp>
-      <p:sp>
-        <p:nvSpPr>
-          <p:cNvPr id="3" name="Content Placeholder 2">
+              <a:t> in German Dataset</a:t>
+            </a:r>
+          </a:p>
+        </p:txBody>
+      </p:sp>
+      <p:pic>
+        <p:nvPicPr>
+          <p:cNvPr id="4" name="Grafik 3">
             <a:extLst>
               <a:ext uri="{FF2B5EF4-FFF2-40B4-BE49-F238E27FC236}">
-                <a16:creationId xmlns:a16="http://schemas.microsoft.com/office/drawing/2014/main" id="{390FB31B-FE28-431F-9E4D-81A0F209F1AA}"/>
+                <a16:creationId xmlns:a16="http://schemas.microsoft.com/office/drawing/2014/main" id="{0D155C9C-59A5-DD0F-3739-C600F108619D}"/>
               </a:ext>
             </a:extLst>
           </p:cNvPr>
-          <p:cNvSpPr>
-            <a:spLocks noGrp="1"/>
-          </p:cNvSpPr>
-          <p:nvPr>
-            <p:ph idx="1"/>
-          </p:nvPr>
-        </p:nvSpPr>
-        <p:spPr/>
-        <p:txBody>
-          <a:bodyPr/>
-          <a:lstStyle/>
-          <a:p>
-            <a:endParaRPr lang="en-US"/>
-          </a:p>
-        </p:txBody>
-      </p:sp>
+          <p:cNvPicPr>
+            <a:picLocks noChangeAspect="1"/>
+          </p:cNvPicPr>
+          <p:nvPr/>
+        </p:nvPicPr>
+        <p:blipFill>
+          <a:blip r:embed="rId3"/>
+          <a:stretch>
+            <a:fillRect/>
+          </a:stretch>
+        </p:blipFill>
+        <p:spPr>
+          <a:xfrm>
+            <a:off x="2905648" y="1351006"/>
+            <a:ext cx="7436985" cy="5308148"/>
+          </a:xfrm>
+          <a:prstGeom prst="rect">
+            <a:avLst/>
+          </a:prstGeom>
+        </p:spPr>
+      </p:pic>
     </p:spTree>
     <p:extLst>
       <p:ext uri="{BB962C8B-B14F-4D97-AF65-F5344CB8AC3E}">
-        <p14:creationId xmlns:p14="http://schemas.microsoft.com/office/powerpoint/2010/main" val="846595895"/>
+        <p14:creationId xmlns:p14="http://schemas.microsoft.com/office/powerpoint/2010/main" val="2111729585"/>
       </p:ext>
     </p:extLst>
   </p:cSld>
@@ -10411,7 +11242,13 @@
   <p:cSld>
     <p:spTree>
       <p:nvGrpSpPr>
-        <p:cNvPr id="1" name=""/>
+        <p:cNvPr id="1" name="">
+          <a:extLst>
+            <a:ext uri="{FF2B5EF4-FFF2-40B4-BE49-F238E27FC236}">
+              <a16:creationId xmlns:a16="http://schemas.microsoft.com/office/drawing/2014/main" id="{5C4EA42F-0031-93C1-312A-D84730E234C4}"/>
+            </a:ext>
+          </a:extLst>
+        </p:cNvPr>
         <p:cNvGrpSpPr/>
         <p:nvPr/>
       </p:nvGrpSpPr>
@@ -10425,10 +11262,10 @@
       </p:grpSpPr>
       <p:sp>
         <p:nvSpPr>
-          <p:cNvPr id="2" name="Title 1">
+          <p:cNvPr id="2" name="Titel 1">
             <a:extLst>
               <a:ext uri="{FF2B5EF4-FFF2-40B4-BE49-F238E27FC236}">
-                <a16:creationId xmlns:a16="http://schemas.microsoft.com/office/drawing/2014/main" id="{0913BBCD-948C-44D6-9FAF-BA651248C8F9}"/>
+                <a16:creationId xmlns:a16="http://schemas.microsoft.com/office/drawing/2014/main" id="{EBEBDECA-FBD7-277F-16AF-090349F0FE10}"/>
               </a:ext>
             </a:extLst>
           </p:cNvPr>
@@ -10445,45 +11282,62 @@
           <a:lstStyle/>
           <a:p>
             <a:r>
+              <a:rPr lang="de-CH" dirty="0"/>
+              <a:t>Distribution </a:t>
+            </a:r>
+            <a:r>
               <a:rPr lang="de-CH" dirty="0" err="1"/>
-              <a:t>Results</a:t>
-            </a:r>
-            <a:br>
+              <a:t>of</a:t>
+            </a:r>
+            <a:r>
               <a:rPr lang="de-CH" dirty="0"/>
-            </a:br>
-            <a:endParaRPr lang="en-US" dirty="0"/>
-          </a:p>
-        </p:txBody>
-      </p:sp>
-      <p:sp>
-        <p:nvSpPr>
-          <p:cNvPr id="3" name="Content Placeholder 2">
+              <a:t> </a:t>
+            </a:r>
+            <a:r>
+              <a:rPr lang="de-CH" dirty="0" err="1"/>
+              <a:t>entities</a:t>
+            </a:r>
+            <a:r>
+              <a:rPr lang="de-CH" dirty="0"/>
+              <a:t> in French Dataset</a:t>
+            </a:r>
+          </a:p>
+        </p:txBody>
+      </p:sp>
+      <p:pic>
+        <p:nvPicPr>
+          <p:cNvPr id="4" name="Grafik 3">
             <a:extLst>
               <a:ext uri="{FF2B5EF4-FFF2-40B4-BE49-F238E27FC236}">
-                <a16:creationId xmlns:a16="http://schemas.microsoft.com/office/drawing/2014/main" id="{CD2C2720-0DE9-46D1-9C59-6F205CB75879}"/>
+                <a16:creationId xmlns:a16="http://schemas.microsoft.com/office/drawing/2014/main" id="{2C8CC483-E16E-8A09-DA9D-D147E541A76C}"/>
               </a:ext>
             </a:extLst>
           </p:cNvPr>
-          <p:cNvSpPr>
-            <a:spLocks noGrp="1"/>
-          </p:cNvSpPr>
-          <p:nvPr>
-            <p:ph idx="1"/>
-          </p:nvPr>
-        </p:nvSpPr>
-        <p:spPr/>
-        <p:txBody>
-          <a:bodyPr/>
-          <a:lstStyle/>
-          <a:p>
-            <a:endParaRPr lang="en-US"/>
-          </a:p>
-        </p:txBody>
-      </p:sp>
+          <p:cNvPicPr>
+            <a:picLocks noChangeAspect="1"/>
+          </p:cNvPicPr>
+          <p:nvPr/>
+        </p:nvPicPr>
+        <p:blipFill>
+          <a:blip r:embed="rId3"/>
+          <a:stretch>
+            <a:fillRect/>
+          </a:stretch>
+        </p:blipFill>
+        <p:spPr>
+          <a:xfrm>
+            <a:off x="3010130" y="1375718"/>
+            <a:ext cx="7343208" cy="5187155"/>
+          </a:xfrm>
+          <a:prstGeom prst="rect">
+            <a:avLst/>
+          </a:prstGeom>
+        </p:spPr>
+      </p:pic>
     </p:spTree>
     <p:extLst>
       <p:ext uri="{BB962C8B-B14F-4D97-AF65-F5344CB8AC3E}">
-        <p14:creationId xmlns:p14="http://schemas.microsoft.com/office/powerpoint/2010/main" val="4079610711"/>
+        <p14:creationId xmlns:p14="http://schemas.microsoft.com/office/powerpoint/2010/main" val="2347839881"/>
       </p:ext>
     </p:extLst>
   </p:cSld>

</xml_diff>

<commit_message>
Update CAS NLP Module 4_jd_bb.pptx
</commit_message>
<xml_diff>
--- a/CAS NLP Module 4_jd_bb.pptx
+++ b/CAS NLP Module 4_jd_bb.pptx
@@ -5,7 +5,7 @@
     <p:sldMasterId id="2147483660" r:id="rId1"/>
   </p:sldMasterIdLst>
   <p:notesMasterIdLst>
-    <p:notesMasterId r:id="rId28"/>
+    <p:notesMasterId r:id="rId29"/>
   </p:notesMasterIdLst>
   <p:sldIdLst>
     <p:sldId id="256" r:id="rId2"/>
@@ -27,13 +27,14 @@
     <p:sldId id="272" r:id="rId18"/>
     <p:sldId id="262" r:id="rId19"/>
     <p:sldId id="284" r:id="rId20"/>
-    <p:sldId id="263" r:id="rId21"/>
-    <p:sldId id="264" r:id="rId22"/>
-    <p:sldId id="265" r:id="rId23"/>
-    <p:sldId id="283" r:id="rId24"/>
-    <p:sldId id="266" r:id="rId25"/>
-    <p:sldId id="267" r:id="rId26"/>
-    <p:sldId id="268" r:id="rId27"/>
+    <p:sldId id="285" r:id="rId21"/>
+    <p:sldId id="263" r:id="rId22"/>
+    <p:sldId id="264" r:id="rId23"/>
+    <p:sldId id="265" r:id="rId24"/>
+    <p:sldId id="283" r:id="rId25"/>
+    <p:sldId id="266" r:id="rId26"/>
+    <p:sldId id="267" r:id="rId27"/>
+    <p:sldId id="268" r:id="rId28"/>
   </p:sldIdLst>
   <p:sldSz cx="12192000" cy="6858000"/>
   <p:notesSz cx="6858000" cy="9144000"/>
@@ -10729,10 +10730,10 @@
       </p:grpSpPr>
       <p:sp>
         <p:nvSpPr>
-          <p:cNvPr id="2" name="Title 1">
+          <p:cNvPr id="2" name="Titel 1">
             <a:extLst>
               <a:ext uri="{FF2B5EF4-FFF2-40B4-BE49-F238E27FC236}">
-                <a16:creationId xmlns:a16="http://schemas.microsoft.com/office/drawing/2014/main" id="{20AB11EB-9845-4ED2-AE25-552596FDA2CC}"/>
+                <a16:creationId xmlns:a16="http://schemas.microsoft.com/office/drawing/2014/main" id="{8441006C-17D4-7096-F36B-8BA6EE5FF8C0}"/>
               </a:ext>
             </a:extLst>
           </p:cNvPr>
@@ -10749,12 +10750,8 @@
           <a:lstStyle/>
           <a:p>
             <a:r>
-              <a:rPr lang="de-CH" dirty="0"/>
-              <a:t>Test </a:t>
-            </a:r>
-            <a:r>
-              <a:rPr lang="de-CH" dirty="0" err="1"/>
-              <a:t>the</a:t>
+              <a:rPr lang="de-CH" dirty="0" err="1"/>
+              <a:t>Evaluate</a:t>
             </a:r>
             <a:r>
               <a:rPr lang="de-CH" dirty="0"/>
@@ -10766,21 +10763,22 @@
             </a:r>
             <a:r>
               <a:rPr lang="de-CH" dirty="0"/>
-              <a:t> in DE, FR and IT</a:t>
-            </a:r>
-            <a:br>
-              <a:rPr lang="de-CH" dirty="0"/>
-            </a:br>
-            <a:endParaRPr lang="en-US" dirty="0"/>
-          </a:p>
-        </p:txBody>
-      </p:sp>
-      <p:sp>
-        <p:nvSpPr>
-          <p:cNvPr id="3" name="Content Placeholder 2">
+              <a:t> on EN </a:t>
+            </a:r>
+            <a:r>
+              <a:rPr lang="de-CH" dirty="0" err="1"/>
+              <a:t>dataset</a:t>
+            </a:r>
+            <a:endParaRPr lang="de-CH" dirty="0"/>
+          </a:p>
+        </p:txBody>
+      </p:sp>
+      <p:sp>
+        <p:nvSpPr>
+          <p:cNvPr id="10" name="Inhaltsplatzhalter 9">
             <a:extLst>
               <a:ext uri="{FF2B5EF4-FFF2-40B4-BE49-F238E27FC236}">
-                <a16:creationId xmlns:a16="http://schemas.microsoft.com/office/drawing/2014/main" id="{390FB31B-FE28-431F-9E4D-81A0F209F1AA}"/>
+                <a16:creationId xmlns:a16="http://schemas.microsoft.com/office/drawing/2014/main" id="{17823055-0905-7193-D2DB-5352CE212132}"/>
               </a:ext>
             </a:extLst>
           </p:cNvPr>
@@ -10796,14 +10794,73 @@
           <a:bodyPr/>
           <a:lstStyle/>
           <a:p>
-            <a:endParaRPr lang="en-US"/>
-          </a:p>
-        </p:txBody>
-      </p:sp>
+            <a:r>
+              <a:rPr lang="de-CH" dirty="0"/>
+              <a:t>Create </a:t>
+            </a:r>
+            <a:r>
+              <a:rPr lang="de-CH" dirty="0" err="1"/>
+              <a:t>data</a:t>
+            </a:r>
+            <a:r>
+              <a:rPr lang="de-CH" dirty="0"/>
+              <a:t> </a:t>
+            </a:r>
+            <a:r>
+              <a:rPr lang="de-CH" dirty="0" err="1"/>
+              <a:t>loader</a:t>
+            </a:r>
+            <a:endParaRPr lang="de-CH" dirty="0"/>
+          </a:p>
+          <a:p>
+            <a:r>
+              <a:rPr lang="en-US" dirty="0"/>
+              <a:t>Padding sequences to the maximum length in the batch</a:t>
+            </a:r>
+          </a:p>
+          <a:p>
+            <a:r>
+              <a:rPr lang="en-US" dirty="0"/>
+              <a:t>Classification report</a:t>
+            </a:r>
+            <a:endParaRPr lang="de-CH" dirty="0"/>
+          </a:p>
+        </p:txBody>
+      </p:sp>
+      <p:pic>
+        <p:nvPicPr>
+          <p:cNvPr id="11" name="Inhaltsplatzhalter 4">
+            <a:extLst>
+              <a:ext uri="{FF2B5EF4-FFF2-40B4-BE49-F238E27FC236}">
+                <a16:creationId xmlns:a16="http://schemas.microsoft.com/office/drawing/2014/main" id="{D7051BE4-3721-AA31-E3CC-ED3EFB0AC9AB}"/>
+              </a:ext>
+            </a:extLst>
+          </p:cNvPr>
+          <p:cNvPicPr>
+            <a:picLocks noChangeAspect="1"/>
+          </p:cNvPicPr>
+          <p:nvPr/>
+        </p:nvPicPr>
+        <p:blipFill>
+          <a:blip r:embed="rId2"/>
+          <a:stretch>
+            <a:fillRect/>
+          </a:stretch>
+        </p:blipFill>
+        <p:spPr>
+          <a:xfrm>
+            <a:off x="2564544" y="3738707"/>
+            <a:ext cx="4953036" cy="1733563"/>
+          </a:xfrm>
+          <a:prstGeom prst="rect">
+            <a:avLst/>
+          </a:prstGeom>
+        </p:spPr>
+      </p:pic>
     </p:spTree>
     <p:extLst>
       <p:ext uri="{BB962C8B-B14F-4D97-AF65-F5344CB8AC3E}">
-        <p14:creationId xmlns:p14="http://schemas.microsoft.com/office/powerpoint/2010/main" val="846595895"/>
+        <p14:creationId xmlns:p14="http://schemas.microsoft.com/office/powerpoint/2010/main" val="450881614"/>
       </p:ext>
     </p:extLst>
   </p:cSld>
@@ -10835,7 +10892,7 @@
           <p:cNvPr id="2" name="Title 1">
             <a:extLst>
               <a:ext uri="{FF2B5EF4-FFF2-40B4-BE49-F238E27FC236}">
-                <a16:creationId xmlns:a16="http://schemas.microsoft.com/office/drawing/2014/main" id="{0913BBCD-948C-44D6-9FAF-BA651248C8F9}"/>
+                <a16:creationId xmlns:a16="http://schemas.microsoft.com/office/drawing/2014/main" id="{20AB11EB-9845-4ED2-AE25-552596FDA2CC}"/>
               </a:ext>
             </a:extLst>
           </p:cNvPr>
@@ -10853,7 +10910,27 @@
           <a:p>
             <a:r>
               <a:rPr lang="de-CH" dirty="0" err="1"/>
-              <a:t>Results</a:t>
+              <a:t>Evaluate</a:t>
+            </a:r>
+            <a:r>
+              <a:rPr lang="de-CH" dirty="0"/>
+              <a:t> </a:t>
+            </a:r>
+            <a:r>
+              <a:rPr lang="de-CH" dirty="0" err="1"/>
+              <a:t>the</a:t>
+            </a:r>
+            <a:r>
+              <a:rPr lang="de-CH" dirty="0"/>
+              <a:t> </a:t>
+            </a:r>
+            <a:r>
+              <a:rPr lang="de-CH" dirty="0" err="1"/>
+              <a:t>model</a:t>
+            </a:r>
+            <a:r>
+              <a:rPr lang="de-CH" dirty="0"/>
+              <a:t> in DE, FR and IT</a:t>
             </a:r>
             <a:br>
               <a:rPr lang="de-CH" dirty="0"/>
@@ -10867,7 +10944,7 @@
           <p:cNvPr id="3" name="Content Placeholder 2">
             <a:extLst>
               <a:ext uri="{FF2B5EF4-FFF2-40B4-BE49-F238E27FC236}">
-                <a16:creationId xmlns:a16="http://schemas.microsoft.com/office/drawing/2014/main" id="{CD2C2720-0DE9-46D1-9C59-6F205CB75879}"/>
+                <a16:creationId xmlns:a16="http://schemas.microsoft.com/office/drawing/2014/main" id="{390FB31B-FE28-431F-9E4D-81A0F209F1AA}"/>
               </a:ext>
             </a:extLst>
           </p:cNvPr>
@@ -10883,14 +10960,140 @@
           <a:bodyPr/>
           <a:lstStyle/>
           <a:p>
-            <a:endParaRPr lang="en-US"/>
-          </a:p>
-        </p:txBody>
-      </p:sp>
+            <a:r>
+              <a:rPr lang="en-US" dirty="0"/>
+              <a:t>DE</a:t>
+            </a:r>
+          </a:p>
+          <a:p>
+            <a:pPr marL="0" indent="0">
+              <a:buNone/>
+            </a:pPr>
+            <a:endParaRPr lang="en-US" dirty="0"/>
+          </a:p>
+          <a:p>
+            <a:endParaRPr lang="en-US" dirty="0"/>
+          </a:p>
+          <a:p>
+            <a:r>
+              <a:rPr lang="en-US" dirty="0"/>
+              <a:t>FR</a:t>
+            </a:r>
+          </a:p>
+          <a:p>
+            <a:endParaRPr lang="en-US" dirty="0"/>
+          </a:p>
+          <a:p>
+            <a:pPr marL="0" indent="0">
+              <a:buNone/>
+            </a:pPr>
+            <a:endParaRPr lang="en-US" dirty="0"/>
+          </a:p>
+          <a:p>
+            <a:r>
+              <a:rPr lang="en-US" dirty="0"/>
+              <a:t>IT </a:t>
+            </a:r>
+          </a:p>
+          <a:p>
+            <a:endParaRPr lang="en-US" dirty="0"/>
+          </a:p>
+        </p:txBody>
+      </p:sp>
+      <p:pic>
+        <p:nvPicPr>
+          <p:cNvPr id="5" name="Grafik 4">
+            <a:extLst>
+              <a:ext uri="{FF2B5EF4-FFF2-40B4-BE49-F238E27FC236}">
+                <a16:creationId xmlns:a16="http://schemas.microsoft.com/office/drawing/2014/main" id="{4FB69655-7600-B38B-012E-3AE13D215556}"/>
+              </a:ext>
+            </a:extLst>
+          </p:cNvPr>
+          <p:cNvPicPr>
+            <a:picLocks noChangeAspect="1"/>
+          </p:cNvPicPr>
+          <p:nvPr/>
+        </p:nvPicPr>
+        <p:blipFill>
+          <a:blip r:embed="rId2"/>
+          <a:stretch>
+            <a:fillRect/>
+          </a:stretch>
+        </p:blipFill>
+        <p:spPr>
+          <a:xfrm>
+            <a:off x="4618827" y="1124402"/>
+            <a:ext cx="4287487" cy="1722246"/>
+          </a:xfrm>
+          <a:prstGeom prst="rect">
+            <a:avLst/>
+          </a:prstGeom>
+        </p:spPr>
+      </p:pic>
+      <p:pic>
+        <p:nvPicPr>
+          <p:cNvPr id="7" name="Grafik 6">
+            <a:extLst>
+              <a:ext uri="{FF2B5EF4-FFF2-40B4-BE49-F238E27FC236}">
+                <a16:creationId xmlns:a16="http://schemas.microsoft.com/office/drawing/2014/main" id="{1A8CBFB0-93D1-D43F-DF56-BF2CD0FE6685}"/>
+              </a:ext>
+            </a:extLst>
+          </p:cNvPr>
+          <p:cNvPicPr>
+            <a:picLocks noChangeAspect="1"/>
+          </p:cNvPicPr>
+          <p:nvPr/>
+        </p:nvPicPr>
+        <p:blipFill>
+          <a:blip r:embed="rId3"/>
+          <a:stretch>
+            <a:fillRect/>
+          </a:stretch>
+        </p:blipFill>
+        <p:spPr>
+          <a:xfrm>
+            <a:off x="4585489" y="2903718"/>
+            <a:ext cx="4372007" cy="1733563"/>
+          </a:xfrm>
+          <a:prstGeom prst="rect">
+            <a:avLst/>
+          </a:prstGeom>
+        </p:spPr>
+      </p:pic>
+      <p:pic>
+        <p:nvPicPr>
+          <p:cNvPr id="9" name="Grafik 8">
+            <a:extLst>
+              <a:ext uri="{FF2B5EF4-FFF2-40B4-BE49-F238E27FC236}">
+                <a16:creationId xmlns:a16="http://schemas.microsoft.com/office/drawing/2014/main" id="{92E1C881-04BE-D88F-BC19-69BF2223F652}"/>
+              </a:ext>
+            </a:extLst>
+          </p:cNvPr>
+          <p:cNvPicPr>
+            <a:picLocks noChangeAspect="1"/>
+          </p:cNvPicPr>
+          <p:nvPr/>
+        </p:nvPicPr>
+        <p:blipFill>
+          <a:blip r:embed="rId4"/>
+          <a:stretch>
+            <a:fillRect/>
+          </a:stretch>
+        </p:blipFill>
+        <p:spPr>
+          <a:xfrm>
+            <a:off x="4552152" y="4666881"/>
+            <a:ext cx="4438682" cy="1781188"/>
+          </a:xfrm>
+          <a:prstGeom prst="rect">
+            <a:avLst/>
+          </a:prstGeom>
+        </p:spPr>
+      </p:pic>
     </p:spTree>
     <p:extLst>
       <p:ext uri="{BB962C8B-B14F-4D97-AF65-F5344CB8AC3E}">
-        <p14:creationId xmlns:p14="http://schemas.microsoft.com/office/powerpoint/2010/main" val="4079610711"/>
+        <p14:creationId xmlns:p14="http://schemas.microsoft.com/office/powerpoint/2010/main" val="846595895"/>
       </p:ext>
     </p:extLst>
   </p:cSld>
@@ -10922,7 +11125,7 @@
           <p:cNvPr id="2" name="Title 1">
             <a:extLst>
               <a:ext uri="{FF2B5EF4-FFF2-40B4-BE49-F238E27FC236}">
-                <a16:creationId xmlns:a16="http://schemas.microsoft.com/office/drawing/2014/main" id="{36262027-BF33-4B1C-9478-81791AD91589}"/>
+                <a16:creationId xmlns:a16="http://schemas.microsoft.com/office/drawing/2014/main" id="{0913BBCD-948C-44D6-9FAF-BA651248C8F9}"/>
               </a:ext>
             </a:extLst>
           </p:cNvPr>
@@ -10940,15 +11143,19 @@
           <a:p>
             <a:r>
               <a:rPr lang="de-CH" dirty="0" err="1"/>
-              <a:t>Contrast</a:t>
-            </a:r>
-            <a:r>
-              <a:rPr lang="de-CH" dirty="0"/>
-              <a:t> </a:t>
-            </a:r>
-            <a:r>
-              <a:rPr lang="de-CH" dirty="0" err="1"/>
-              <a:t>approaches</a:t>
+              <a:t>Results</a:t>
+            </a:r>
+            <a:r>
+              <a:rPr lang="de-CH" dirty="0"/>
+              <a:t> (</a:t>
+            </a:r>
+            <a:r>
+              <a:rPr lang="de-CH" dirty="0" err="1"/>
+              <a:t>be</a:t>
+            </a:r>
+            <a:r>
+              <a:rPr lang="de-CH" dirty="0"/>
+              <a:t>)</a:t>
             </a:r>
             <a:br>
               <a:rPr lang="de-CH" dirty="0"/>
@@ -10959,10 +11166,10 @@
       </p:sp>
       <p:sp>
         <p:nvSpPr>
-          <p:cNvPr id="3" name="Content Placeholder 2">
+          <p:cNvPr id="7" name="Inhaltsplatzhalter 6">
             <a:extLst>
               <a:ext uri="{FF2B5EF4-FFF2-40B4-BE49-F238E27FC236}">
-                <a16:creationId xmlns:a16="http://schemas.microsoft.com/office/drawing/2014/main" id="{7DA777B3-D815-424E-A73C-C2D1CF60108D}"/>
+                <a16:creationId xmlns:a16="http://schemas.microsoft.com/office/drawing/2014/main" id="{639653A5-8A1D-9C8E-F2B7-D4447928D14E}"/>
               </a:ext>
             </a:extLst>
           </p:cNvPr>
@@ -10973,19 +11180,27 @@
             <p:ph idx="1"/>
           </p:nvPr>
         </p:nvSpPr>
-        <p:spPr/>
+        <p:spPr>
+          <a:xfrm>
+            <a:off x="1103312" y="2539353"/>
+            <a:ext cx="8946541" cy="3709046"/>
+          </a:xfrm>
+        </p:spPr>
         <p:txBody>
           <a:bodyPr/>
           <a:lstStyle/>
           <a:p>
-            <a:endParaRPr lang="en-US" dirty="0"/>
+            <a:pPr marL="0" indent="0">
+              <a:buNone/>
+            </a:pPr>
+            <a:endParaRPr lang="de-CH" dirty="0"/>
           </a:p>
         </p:txBody>
       </p:sp>
     </p:spTree>
     <p:extLst>
       <p:ext uri="{BB962C8B-B14F-4D97-AF65-F5344CB8AC3E}">
-        <p14:creationId xmlns:p14="http://schemas.microsoft.com/office/powerpoint/2010/main" val="1608941473"/>
+        <p14:creationId xmlns:p14="http://schemas.microsoft.com/office/powerpoint/2010/main" val="4079610711"/>
       </p:ext>
     </p:extLst>
   </p:cSld>
@@ -11014,10 +11229,10 @@
       </p:grpSpPr>
       <p:sp>
         <p:nvSpPr>
-          <p:cNvPr id="2" name="Titel 1">
+          <p:cNvPr id="2" name="Title 1">
             <a:extLst>
               <a:ext uri="{FF2B5EF4-FFF2-40B4-BE49-F238E27FC236}">
-                <a16:creationId xmlns:a16="http://schemas.microsoft.com/office/drawing/2014/main" id="{26D64721-2D18-1513-64DD-F728523A8896}"/>
+                <a16:creationId xmlns:a16="http://schemas.microsoft.com/office/drawing/2014/main" id="{36262027-BF33-4B1C-9478-81791AD91589}"/>
               </a:ext>
             </a:extLst>
           </p:cNvPr>
@@ -11035,34 +11250,41 @@
           <a:p>
             <a:r>
               <a:rPr lang="de-CH" dirty="0" err="1"/>
-              <a:t>Limitations</a:t>
-            </a:r>
-            <a:r>
-              <a:rPr lang="de-CH" dirty="0"/>
-              <a:t> </a:t>
-            </a:r>
-            <a:r>
-              <a:rPr lang="de-CH" dirty="0" err="1"/>
-              <a:t>of</a:t>
-            </a:r>
-            <a:r>
-              <a:rPr lang="de-CH" dirty="0"/>
-              <a:t> </a:t>
-            </a:r>
-            <a:r>
-              <a:rPr lang="de-CH" dirty="0" err="1"/>
-              <a:t>approach</a:t>
-            </a:r>
-            <a:endParaRPr lang="de-CH" dirty="0"/>
-          </a:p>
-        </p:txBody>
-      </p:sp>
-      <p:sp>
-        <p:nvSpPr>
-          <p:cNvPr id="3" name="Inhaltsplatzhalter 2">
+              <a:t>Contrast</a:t>
+            </a:r>
+            <a:r>
+              <a:rPr lang="de-CH" dirty="0"/>
+              <a:t> </a:t>
+            </a:r>
+            <a:r>
+              <a:rPr lang="de-CH" dirty="0" err="1"/>
+              <a:t>approaches</a:t>
+            </a:r>
+            <a:r>
+              <a:rPr lang="de-CH" dirty="0"/>
+              <a:t> (</a:t>
+            </a:r>
+            <a:r>
+              <a:rPr lang="de-CH" dirty="0" err="1"/>
+              <a:t>ju</a:t>
+            </a:r>
+            <a:r>
+              <a:rPr lang="de-CH" dirty="0"/>
+              <a:t>)</a:t>
+            </a:r>
+            <a:br>
+              <a:rPr lang="de-CH" dirty="0"/>
+            </a:br>
+            <a:endParaRPr lang="en-US" dirty="0"/>
+          </a:p>
+        </p:txBody>
+      </p:sp>
+      <p:sp>
+        <p:nvSpPr>
+          <p:cNvPr id="3" name="Content Placeholder 2">
             <a:extLst>
               <a:ext uri="{FF2B5EF4-FFF2-40B4-BE49-F238E27FC236}">
-                <a16:creationId xmlns:a16="http://schemas.microsoft.com/office/drawing/2014/main" id="{398B9ADA-9FB8-2F8B-5F36-AA300ED16F67}"/>
+                <a16:creationId xmlns:a16="http://schemas.microsoft.com/office/drawing/2014/main" id="{7DA777B3-D815-424E-A73C-C2D1CF60108D}"/>
               </a:ext>
             </a:extLst>
           </p:cNvPr>
@@ -11078,14 +11300,14 @@
           <a:bodyPr/>
           <a:lstStyle/>
           <a:p>
-            <a:endParaRPr lang="de-CH"/>
+            <a:endParaRPr lang="en-US" dirty="0"/>
           </a:p>
         </p:txBody>
       </p:sp>
     </p:spTree>
     <p:extLst>
       <p:ext uri="{BB962C8B-B14F-4D97-AF65-F5344CB8AC3E}">
-        <p14:creationId xmlns:p14="http://schemas.microsoft.com/office/powerpoint/2010/main" val="2671724893"/>
+        <p14:creationId xmlns:p14="http://schemas.microsoft.com/office/powerpoint/2010/main" val="1608941473"/>
       </p:ext>
     </p:extLst>
   </p:cSld>
@@ -11114,10 +11336,10 @@
       </p:grpSpPr>
       <p:sp>
         <p:nvSpPr>
-          <p:cNvPr id="2" name="Title 1">
+          <p:cNvPr id="2" name="Titel 1">
             <a:extLst>
               <a:ext uri="{FF2B5EF4-FFF2-40B4-BE49-F238E27FC236}">
-                <a16:creationId xmlns:a16="http://schemas.microsoft.com/office/drawing/2014/main" id="{9FBABDAD-57E8-41A2-B50B-0F0C1F4E6F60}"/>
+                <a16:creationId xmlns:a16="http://schemas.microsoft.com/office/drawing/2014/main" id="{26D64721-2D18-1513-64DD-F728523A8896}"/>
               </a:ext>
             </a:extLst>
           </p:cNvPr>
@@ -11135,21 +11357,53 @@
           <a:p>
             <a:r>
               <a:rPr lang="de-CH" dirty="0" err="1"/>
-              <a:t>Learnings</a:t>
-            </a:r>
-            <a:br>
-              <a:rPr lang="de-CH" dirty="0"/>
-            </a:br>
-            <a:endParaRPr lang="en-US" dirty="0"/>
-          </a:p>
-        </p:txBody>
-      </p:sp>
-      <p:sp>
-        <p:nvSpPr>
-          <p:cNvPr id="3" name="Content Placeholder 2">
+              <a:t>Limitations</a:t>
+            </a:r>
+            <a:r>
+              <a:rPr lang="de-CH" dirty="0"/>
+              <a:t> </a:t>
+            </a:r>
+            <a:r>
+              <a:rPr lang="de-CH" dirty="0" err="1"/>
+              <a:t>of</a:t>
+            </a:r>
+            <a:r>
+              <a:rPr lang="de-CH" dirty="0"/>
+              <a:t> </a:t>
+            </a:r>
+            <a:r>
+              <a:rPr lang="de-CH" dirty="0" err="1"/>
+              <a:t>approach</a:t>
+            </a:r>
+            <a:r>
+              <a:rPr lang="de-CH" dirty="0"/>
+              <a:t> (</a:t>
+            </a:r>
+            <a:r>
+              <a:rPr lang="de-CH" dirty="0" err="1"/>
+              <a:t>be</a:t>
+            </a:r>
+            <a:r>
+              <a:rPr lang="de-CH" dirty="0"/>
+              <a:t>, </a:t>
+            </a:r>
+            <a:r>
+              <a:rPr lang="de-CH" dirty="0" err="1"/>
+              <a:t>ju</a:t>
+            </a:r>
+            <a:r>
+              <a:rPr lang="de-CH" dirty="0"/>
+              <a:t>)</a:t>
+            </a:r>
+          </a:p>
+        </p:txBody>
+      </p:sp>
+      <p:sp>
+        <p:nvSpPr>
+          <p:cNvPr id="3" name="Inhaltsplatzhalter 2">
             <a:extLst>
               <a:ext uri="{FF2B5EF4-FFF2-40B4-BE49-F238E27FC236}">
-                <a16:creationId xmlns:a16="http://schemas.microsoft.com/office/drawing/2014/main" id="{2E2948E8-3EAA-4651-ACEE-3A97178783D4}"/>
+                <a16:creationId xmlns:a16="http://schemas.microsoft.com/office/drawing/2014/main" id="{398B9ADA-9FB8-2F8B-5F36-AA300ED16F67}"/>
               </a:ext>
             </a:extLst>
           </p:cNvPr>
@@ -11165,14 +11419,14 @@
           <a:bodyPr/>
           <a:lstStyle/>
           <a:p>
-            <a:endParaRPr lang="en-US"/>
+            <a:endParaRPr lang="de-CH"/>
           </a:p>
         </p:txBody>
       </p:sp>
     </p:spTree>
     <p:extLst>
       <p:ext uri="{BB962C8B-B14F-4D97-AF65-F5344CB8AC3E}">
-        <p14:creationId xmlns:p14="http://schemas.microsoft.com/office/powerpoint/2010/main" val="2800151962"/>
+        <p14:creationId xmlns:p14="http://schemas.microsoft.com/office/powerpoint/2010/main" val="2671724893"/>
       </p:ext>
     </p:extLst>
   </p:cSld>
@@ -11204,6 +11458,113 @@
           <p:cNvPr id="2" name="Title 1">
             <a:extLst>
               <a:ext uri="{FF2B5EF4-FFF2-40B4-BE49-F238E27FC236}">
+                <a16:creationId xmlns:a16="http://schemas.microsoft.com/office/drawing/2014/main" id="{9FBABDAD-57E8-41A2-B50B-0F0C1F4E6F60}"/>
+              </a:ext>
+            </a:extLst>
+          </p:cNvPr>
+          <p:cNvSpPr>
+            <a:spLocks noGrp="1"/>
+          </p:cNvSpPr>
+          <p:nvPr>
+            <p:ph type="title"/>
+          </p:nvPr>
+        </p:nvSpPr>
+        <p:spPr/>
+        <p:txBody>
+          <a:bodyPr/>
+          <a:lstStyle/>
+          <a:p>
+            <a:r>
+              <a:rPr lang="de-CH" dirty="0" err="1"/>
+              <a:t>Learnings</a:t>
+            </a:r>
+            <a:r>
+              <a:rPr lang="de-CH" dirty="0"/>
+              <a:t> (</a:t>
+            </a:r>
+            <a:r>
+              <a:rPr lang="de-CH" dirty="0" err="1"/>
+              <a:t>be</a:t>
+            </a:r>
+            <a:r>
+              <a:rPr lang="de-CH" dirty="0"/>
+              <a:t>, </a:t>
+            </a:r>
+            <a:r>
+              <a:rPr lang="de-CH" dirty="0" err="1"/>
+              <a:t>ju</a:t>
+            </a:r>
+            <a:r>
+              <a:rPr lang="de-CH" dirty="0"/>
+              <a:t>)</a:t>
+            </a:r>
+            <a:br>
+              <a:rPr lang="de-CH" dirty="0"/>
+            </a:br>
+            <a:endParaRPr lang="en-US" dirty="0"/>
+          </a:p>
+        </p:txBody>
+      </p:sp>
+      <p:sp>
+        <p:nvSpPr>
+          <p:cNvPr id="3" name="Content Placeholder 2">
+            <a:extLst>
+              <a:ext uri="{FF2B5EF4-FFF2-40B4-BE49-F238E27FC236}">
+                <a16:creationId xmlns:a16="http://schemas.microsoft.com/office/drawing/2014/main" id="{2E2948E8-3EAA-4651-ACEE-3A97178783D4}"/>
+              </a:ext>
+            </a:extLst>
+          </p:cNvPr>
+          <p:cNvSpPr>
+            <a:spLocks noGrp="1"/>
+          </p:cNvSpPr>
+          <p:nvPr>
+            <p:ph idx="1"/>
+          </p:nvPr>
+        </p:nvSpPr>
+        <p:spPr/>
+        <p:txBody>
+          <a:bodyPr/>
+          <a:lstStyle/>
+          <a:p>
+            <a:endParaRPr lang="en-US"/>
+          </a:p>
+        </p:txBody>
+      </p:sp>
+    </p:spTree>
+    <p:extLst>
+      <p:ext uri="{BB962C8B-B14F-4D97-AF65-F5344CB8AC3E}">
+        <p14:creationId xmlns:p14="http://schemas.microsoft.com/office/powerpoint/2010/main" val="2800151962"/>
+      </p:ext>
+    </p:extLst>
+  </p:cSld>
+  <p:clrMapOvr>
+    <a:masterClrMapping/>
+  </p:clrMapOvr>
+</p:sld>
+</file>
+
+<file path=ppt/slides/slide26.xml><?xml version="1.0" encoding="utf-8"?>
+<p:sld xmlns:a="http://schemas.openxmlformats.org/drawingml/2006/main" xmlns:r="http://schemas.openxmlformats.org/officeDocument/2006/relationships" xmlns:p="http://schemas.openxmlformats.org/presentationml/2006/main">
+  <p:cSld>
+    <p:spTree>
+      <p:nvGrpSpPr>
+        <p:cNvPr id="1" name=""/>
+        <p:cNvGrpSpPr/>
+        <p:nvPr/>
+      </p:nvGrpSpPr>
+      <p:grpSpPr>
+        <a:xfrm>
+          <a:off x="0" y="0"/>
+          <a:ext cx="0" cy="0"/>
+          <a:chOff x="0" y="0"/>
+          <a:chExt cx="0" cy="0"/>
+        </a:xfrm>
+      </p:grpSpPr>
+      <p:sp>
+        <p:nvSpPr>
+          <p:cNvPr id="2" name="Title 1">
+            <a:extLst>
+              <a:ext uri="{FF2B5EF4-FFF2-40B4-BE49-F238E27FC236}">
                 <a16:creationId xmlns:a16="http://schemas.microsoft.com/office/drawing/2014/main" id="{2ED5ED2D-F749-4853-AC3A-C7183786CD9B}"/>
               </a:ext>
             </a:extLst>
@@ -11269,7 +11630,7 @@
 </p:sld>
 </file>
 
-<file path=ppt/slides/slide26.xml><?xml version="1.0" encoding="utf-8"?>
+<file path=ppt/slides/slide27.xml><?xml version="1.0" encoding="utf-8"?>
 <p:sld xmlns:a="http://schemas.openxmlformats.org/drawingml/2006/main" xmlns:r="http://schemas.openxmlformats.org/officeDocument/2006/relationships" xmlns:p="http://schemas.openxmlformats.org/presentationml/2006/main">
   <p:cSld>
     <p:spTree>

</xml_diff>

<commit_message>
update ppp, cleaning comments in code
</commit_message>
<xml_diff>
--- a/CAS NLP Module 4_jd_bb.pptx
+++ b/CAS NLP Module 4_jd_bb.pptx
@@ -229,7 +229,7 @@
           <a:p>
             <a:fld id="{E51474CE-351A-4402-BD16-5C3CE3808280}" type="datetimeFigureOut">
               <a:rPr lang="en-US" smtClean="0"/>
-              <a:t>1/22/2025</a:t>
+              <a:t>1/23/2025</a:t>
             </a:fld>
             <a:endParaRPr lang="en-US"/>
           </a:p>
@@ -927,7 +927,70 @@
           <a:bodyPr/>
           <a:lstStyle/>
           <a:p>
-            <a:endParaRPr lang="de-CH" dirty="0"/>
+            <a:r>
+              <a:rPr lang="de-CH" dirty="0" err="1"/>
+              <a:t>There</a:t>
+            </a:r>
+            <a:r>
+              <a:rPr lang="de-CH" dirty="0"/>
+              <a:t> </a:t>
+            </a:r>
+            <a:r>
+              <a:rPr lang="de-CH" dirty="0" err="1"/>
+              <a:t>are</a:t>
+            </a:r>
+            <a:r>
+              <a:rPr lang="de-CH" dirty="0"/>
+              <a:t> </a:t>
+            </a:r>
+            <a:r>
+              <a:rPr lang="de-CH" dirty="0" err="1"/>
+              <a:t>more</a:t>
+            </a:r>
+            <a:r>
+              <a:rPr lang="de-CH" dirty="0"/>
+              <a:t> I </a:t>
+            </a:r>
+            <a:r>
+              <a:rPr lang="de-CH" dirty="0" err="1"/>
+              <a:t>than</a:t>
+            </a:r>
+            <a:r>
+              <a:rPr lang="de-CH" dirty="0"/>
+              <a:t> B </a:t>
+            </a:r>
+            <a:r>
+              <a:rPr lang="de-CH" dirty="0" err="1"/>
+              <a:t>tagged</a:t>
+            </a:r>
+            <a:r>
+              <a:rPr lang="de-CH" dirty="0"/>
+              <a:t> </a:t>
+            </a:r>
+            <a:r>
+              <a:rPr lang="de-CH" dirty="0" err="1"/>
+              <a:t>entities</a:t>
+            </a:r>
+            <a:r>
+              <a:rPr lang="de-CH" dirty="0"/>
+              <a:t> in all </a:t>
+            </a:r>
+            <a:r>
+              <a:rPr lang="de-CH" dirty="0" err="1"/>
+              <a:t>entity</a:t>
+            </a:r>
+            <a:r>
+              <a:rPr lang="de-CH" dirty="0"/>
+              <a:t> </a:t>
+            </a:r>
+            <a:r>
+              <a:rPr lang="de-CH" dirty="0" err="1"/>
+              <a:t>types</a:t>
+            </a:r>
+            <a:r>
+              <a:rPr lang="de-CH" dirty="0"/>
+              <a:t>. </a:t>
+            </a:r>
           </a:p>
         </p:txBody>
       </p:sp>
@@ -1029,7 +1092,50 @@
           <a:bodyPr/>
           <a:lstStyle/>
           <a:p>
-            <a:endParaRPr lang="de-CH" dirty="0"/>
+            <a:r>
+              <a:rPr lang="de-CH" dirty="0"/>
+              <a:t>More B </a:t>
+            </a:r>
+            <a:r>
+              <a:rPr lang="de-CH" dirty="0" err="1"/>
+              <a:t>tagged</a:t>
+            </a:r>
+            <a:r>
+              <a:rPr lang="de-CH" dirty="0"/>
+              <a:t> </a:t>
+            </a:r>
+            <a:r>
+              <a:rPr lang="de-CH" dirty="0" err="1"/>
+              <a:t>entities</a:t>
+            </a:r>
+            <a:r>
+              <a:rPr lang="de-CH" dirty="0"/>
+              <a:t> in </a:t>
+            </a:r>
+            <a:r>
+              <a:rPr lang="de-CH" dirty="0" err="1"/>
+              <a:t>the</a:t>
+            </a:r>
+            <a:r>
+              <a:rPr lang="de-CH" dirty="0"/>
+              <a:t> </a:t>
+            </a:r>
+            <a:r>
+              <a:rPr lang="de-CH" dirty="0" err="1"/>
+              <a:t>location</a:t>
+            </a:r>
+            <a:r>
+              <a:rPr lang="de-CH" dirty="0"/>
+              <a:t> </a:t>
+            </a:r>
+            <a:r>
+              <a:rPr lang="de-CH" dirty="0" err="1"/>
+              <a:t>entities</a:t>
+            </a:r>
+            <a:r>
+              <a:rPr lang="de-CH" dirty="0"/>
+              <a:t>. </a:t>
+            </a:r>
           </a:p>
         </p:txBody>
       </p:sp>
@@ -1137,6 +1243,89 @@
           <a:bodyPr/>
           <a:lstStyle/>
           <a:p>
+            <a:pPr marL="0" marR="0" lvl="0" indent="0" algn="l" defTabSz="914400" rtl="0" eaLnBrk="1" fontAlgn="auto" latinLnBrk="0" hangingPunct="1">
+              <a:lnSpc>
+                <a:spcPct val="100000"/>
+              </a:lnSpc>
+              <a:spcBef>
+                <a:spcPts val="0"/>
+              </a:spcBef>
+              <a:spcAft>
+                <a:spcPts val="0"/>
+              </a:spcAft>
+              <a:buClrTx/>
+              <a:buSzTx/>
+              <a:buFontTx/>
+              <a:buNone/>
+              <a:tabLst/>
+              <a:defRPr/>
+            </a:pPr>
+            <a:r>
+              <a:rPr lang="de-CH" dirty="0" err="1"/>
+              <a:t>There</a:t>
+            </a:r>
+            <a:r>
+              <a:rPr lang="de-CH" dirty="0"/>
+              <a:t> </a:t>
+            </a:r>
+            <a:r>
+              <a:rPr lang="de-CH" dirty="0" err="1"/>
+              <a:t>are</a:t>
+            </a:r>
+            <a:r>
+              <a:rPr lang="de-CH" dirty="0"/>
+              <a:t> </a:t>
+            </a:r>
+            <a:r>
+              <a:rPr lang="de-CH" dirty="0" err="1"/>
+              <a:t>more</a:t>
+            </a:r>
+            <a:r>
+              <a:rPr lang="de-CH" dirty="0"/>
+              <a:t> I </a:t>
+            </a:r>
+            <a:r>
+              <a:rPr lang="de-CH" dirty="0" err="1"/>
+              <a:t>than</a:t>
+            </a:r>
+            <a:r>
+              <a:rPr lang="de-CH" dirty="0"/>
+              <a:t> B </a:t>
+            </a:r>
+            <a:r>
+              <a:rPr lang="de-CH" dirty="0" err="1"/>
+              <a:t>tagged</a:t>
+            </a:r>
+            <a:r>
+              <a:rPr lang="de-CH" dirty="0"/>
+              <a:t> </a:t>
+            </a:r>
+            <a:r>
+              <a:rPr lang="de-CH" dirty="0" err="1"/>
+              <a:t>entities</a:t>
+            </a:r>
+            <a:r>
+              <a:rPr lang="de-CH" dirty="0"/>
+              <a:t> in all </a:t>
+            </a:r>
+            <a:r>
+              <a:rPr lang="de-CH" dirty="0" err="1"/>
+              <a:t>entity</a:t>
+            </a:r>
+            <a:r>
+              <a:rPr lang="de-CH" dirty="0"/>
+              <a:t> </a:t>
+            </a:r>
+            <a:r>
+              <a:rPr lang="de-CH" dirty="0" err="1"/>
+              <a:t>types</a:t>
+            </a:r>
+            <a:r>
+              <a:rPr lang="de-CH" dirty="0"/>
+              <a:t>. </a:t>
+            </a:r>
+          </a:p>
+          <a:p>
             <a:endParaRPr lang="de-CH" dirty="0"/>
           </a:p>
         </p:txBody>
@@ -1245,6 +1434,73 @@
           <a:bodyPr/>
           <a:lstStyle/>
           <a:p>
+            <a:pPr marL="0" marR="0" lvl="0" indent="0" algn="l" defTabSz="914400" rtl="0" eaLnBrk="1" fontAlgn="auto" latinLnBrk="0" hangingPunct="1">
+              <a:lnSpc>
+                <a:spcPct val="100000"/>
+              </a:lnSpc>
+              <a:spcBef>
+                <a:spcPts val="0"/>
+              </a:spcBef>
+              <a:spcAft>
+                <a:spcPts val="0"/>
+              </a:spcAft>
+              <a:buClrTx/>
+              <a:buSzTx/>
+              <a:buFontTx/>
+              <a:buNone/>
+              <a:tabLst/>
+              <a:defRPr/>
+            </a:pPr>
+            <a:r>
+              <a:rPr lang="de-CH" dirty="0"/>
+              <a:t>More B </a:t>
+            </a:r>
+            <a:r>
+              <a:rPr lang="de-CH" dirty="0" err="1"/>
+              <a:t>tagged</a:t>
+            </a:r>
+            <a:r>
+              <a:rPr lang="de-CH" dirty="0"/>
+              <a:t> </a:t>
+            </a:r>
+            <a:r>
+              <a:rPr lang="de-CH" dirty="0" err="1"/>
+              <a:t>entities</a:t>
+            </a:r>
+            <a:r>
+              <a:rPr lang="de-CH" dirty="0"/>
+              <a:t> in </a:t>
+            </a:r>
+            <a:r>
+              <a:rPr lang="de-CH" dirty="0" err="1"/>
+              <a:t>the</a:t>
+            </a:r>
+            <a:r>
+              <a:rPr lang="de-CH" dirty="0"/>
+              <a:t> </a:t>
+            </a:r>
+            <a:r>
+              <a:rPr lang="de-CH" dirty="0" err="1"/>
+              <a:t>location</a:t>
+            </a:r>
+            <a:r>
+              <a:rPr lang="de-CH" dirty="0"/>
+              <a:t> </a:t>
+            </a:r>
+            <a:r>
+              <a:rPr lang="de-CH" dirty="0" err="1"/>
+              <a:t>entities</a:t>
+            </a:r>
+            <a:r>
+              <a:rPr lang="de-CH" dirty="0"/>
+              <a:t>. </a:t>
+            </a:r>
+          </a:p>
+          <a:p>
+            <a:r>
+              <a:rPr lang="en-US" dirty="0"/>
+              <a:t>The differences between the languages could stem from different annotation styles. With persons and organizations, on the other hand, it is clear: as these often consist of several tokens, there are more I tagged entities here in all languages. The fact that there are more B tagged entities in LOC in German and Italian could be due to the fact that German and Italian place names increasingly consist of only one word. But that is just a hypothesis. </a:t>
+            </a:r>
             <a:endParaRPr lang="de-CH" dirty="0"/>
           </a:p>
         </p:txBody>
@@ -7883,7 +8139,7 @@
           <a:p>
             <a:fld id="{69F73540-DFB5-4816-8066-5D194A0B149D}" type="datetimeFigureOut">
               <a:rPr lang="de-CH" smtClean="0"/>
-              <a:t>22.01.2025</a:t>
+              <a:t>23.01.2025</a:t>
             </a:fld>
             <a:endParaRPr lang="de-CH"/>
           </a:p>
@@ -8158,7 +8414,7 @@
           <a:p>
             <a:fld id="{69F73540-DFB5-4816-8066-5D194A0B149D}" type="datetimeFigureOut">
               <a:rPr lang="de-CH" smtClean="0"/>
-              <a:t>22.01.2025</a:t>
+              <a:t>23.01.2025</a:t>
             </a:fld>
             <a:endParaRPr lang="de-CH"/>
           </a:p>
@@ -8352,7 +8608,7 @@
           <a:p>
             <a:fld id="{69F73540-DFB5-4816-8066-5D194A0B149D}" type="datetimeFigureOut">
               <a:rPr lang="de-CH" smtClean="0"/>
-              <a:t>22.01.2025</a:t>
+              <a:t>23.01.2025</a:t>
             </a:fld>
             <a:endParaRPr lang="de-CH"/>
           </a:p>
@@ -8625,7 +8881,7 @@
           <a:p>
             <a:fld id="{69F73540-DFB5-4816-8066-5D194A0B149D}" type="datetimeFigureOut">
               <a:rPr lang="de-CH" smtClean="0"/>
-              <a:t>22.01.2025</a:t>
+              <a:t>23.01.2025</a:t>
             </a:fld>
             <a:endParaRPr lang="de-CH"/>
           </a:p>
@@ -8966,7 +9222,7 @@
           <a:p>
             <a:fld id="{69F73540-DFB5-4816-8066-5D194A0B149D}" type="datetimeFigureOut">
               <a:rPr lang="de-CH" smtClean="0"/>
-              <a:t>22.01.2025</a:t>
+              <a:t>23.01.2025</a:t>
             </a:fld>
             <a:endParaRPr lang="de-CH"/>
           </a:p>
@@ -9589,7 +9845,7 @@
           <a:p>
             <a:fld id="{69F73540-DFB5-4816-8066-5D194A0B149D}" type="datetimeFigureOut">
               <a:rPr lang="de-CH" smtClean="0"/>
-              <a:t>22.01.2025</a:t>
+              <a:t>23.01.2025</a:t>
             </a:fld>
             <a:endParaRPr lang="de-CH"/>
           </a:p>
@@ -10449,7 +10705,7 @@
           <a:p>
             <a:fld id="{69F73540-DFB5-4816-8066-5D194A0B149D}" type="datetimeFigureOut">
               <a:rPr lang="de-CH" smtClean="0"/>
-              <a:t>22.01.2025</a:t>
+              <a:t>23.01.2025</a:t>
             </a:fld>
             <a:endParaRPr lang="de-CH"/>
           </a:p>
@@ -10619,7 +10875,7 @@
           <a:p>
             <a:fld id="{69F73540-DFB5-4816-8066-5D194A0B149D}" type="datetimeFigureOut">
               <a:rPr lang="de-CH" smtClean="0"/>
-              <a:t>22.01.2025</a:t>
+              <a:t>23.01.2025</a:t>
             </a:fld>
             <a:endParaRPr lang="de-CH"/>
           </a:p>
@@ -10799,7 +11055,7 @@
           <a:p>
             <a:fld id="{69F73540-DFB5-4816-8066-5D194A0B149D}" type="datetimeFigureOut">
               <a:rPr lang="de-CH" smtClean="0"/>
-              <a:t>22.01.2025</a:t>
+              <a:t>23.01.2025</a:t>
             </a:fld>
             <a:endParaRPr lang="de-CH"/>
           </a:p>
@@ -10969,7 +11225,7 @@
           <a:p>
             <a:fld id="{69F73540-DFB5-4816-8066-5D194A0B149D}" type="datetimeFigureOut">
               <a:rPr lang="de-CH" smtClean="0"/>
-              <a:t>22.01.2025</a:t>
+              <a:t>23.01.2025</a:t>
             </a:fld>
             <a:endParaRPr lang="de-CH"/>
           </a:p>
@@ -11216,7 +11472,7 @@
           <a:p>
             <a:fld id="{69F73540-DFB5-4816-8066-5D194A0B149D}" type="datetimeFigureOut">
               <a:rPr lang="de-CH" smtClean="0"/>
-              <a:t>22.01.2025</a:t>
+              <a:t>23.01.2025</a:t>
             </a:fld>
             <a:endParaRPr lang="de-CH"/>
           </a:p>
@@ -11508,7 +11764,7 @@
           <a:p>
             <a:fld id="{69F73540-DFB5-4816-8066-5D194A0B149D}" type="datetimeFigureOut">
               <a:rPr lang="de-CH" smtClean="0"/>
-              <a:t>22.01.2025</a:t>
+              <a:t>23.01.2025</a:t>
             </a:fld>
             <a:endParaRPr lang="de-CH"/>
           </a:p>
@@ -11952,7 +12208,7 @@
           <a:p>
             <a:fld id="{69F73540-DFB5-4816-8066-5D194A0B149D}" type="datetimeFigureOut">
               <a:rPr lang="de-CH" smtClean="0"/>
-              <a:t>22.01.2025</a:t>
+              <a:t>23.01.2025</a:t>
             </a:fld>
             <a:endParaRPr lang="de-CH"/>
           </a:p>
@@ -12070,7 +12326,7 @@
           <a:p>
             <a:fld id="{69F73540-DFB5-4816-8066-5D194A0B149D}" type="datetimeFigureOut">
               <a:rPr lang="de-CH" smtClean="0"/>
-              <a:t>22.01.2025</a:t>
+              <a:t>23.01.2025</a:t>
             </a:fld>
             <a:endParaRPr lang="de-CH"/>
           </a:p>
@@ -12165,7 +12421,7 @@
           <a:p>
             <a:fld id="{69F73540-DFB5-4816-8066-5D194A0B149D}" type="datetimeFigureOut">
               <a:rPr lang="de-CH" smtClean="0"/>
-              <a:t>22.01.2025</a:t>
+              <a:t>23.01.2025</a:t>
             </a:fld>
             <a:endParaRPr lang="de-CH"/>
           </a:p>
@@ -12444,7 +12700,7 @@
           <a:p>
             <a:fld id="{69F73540-DFB5-4816-8066-5D194A0B149D}" type="datetimeFigureOut">
               <a:rPr lang="de-CH" smtClean="0"/>
-              <a:t>22.01.2025</a:t>
+              <a:t>23.01.2025</a:t>
             </a:fld>
             <a:endParaRPr lang="de-CH"/>
           </a:p>
@@ -12719,7 +12975,7 @@
           <a:p>
             <a:fld id="{69F73540-DFB5-4816-8066-5D194A0B149D}" type="datetimeFigureOut">
               <a:rPr lang="de-CH" smtClean="0"/>
-              <a:t>22.01.2025</a:t>
+              <a:t>23.01.2025</a:t>
             </a:fld>
             <a:endParaRPr lang="de-CH"/>
           </a:p>
@@ -13148,7 +13404,7 @@
           <a:p>
             <a:fld id="{69F73540-DFB5-4816-8066-5D194A0B149D}" type="datetimeFigureOut">
               <a:rPr lang="de-CH" smtClean="0"/>
-              <a:t>22.01.2025</a:t>
+              <a:t>23.01.2025</a:t>
             </a:fld>
             <a:endParaRPr lang="de-CH"/>
           </a:p>
@@ -14430,10 +14686,10 @@
       </p:sp>
       <p:pic>
         <p:nvPicPr>
-          <p:cNvPr id="5" name="Grafik 4">
+          <p:cNvPr id="7" name="Grafik 6">
             <a:extLst>
               <a:ext uri="{FF2B5EF4-FFF2-40B4-BE49-F238E27FC236}">
-                <a16:creationId xmlns:a16="http://schemas.microsoft.com/office/drawing/2014/main" id="{DE9D98E0-9D2C-48F2-B605-4F9AB1386237}"/>
+                <a16:creationId xmlns:a16="http://schemas.microsoft.com/office/drawing/2014/main" id="{367BD055-FF8C-E40A-2686-0E7AFAC71D0F}"/>
               </a:ext>
             </a:extLst>
           </p:cNvPr>
@@ -14450,8 +14706,8 @@
         </p:blipFill>
         <p:spPr>
           <a:xfrm>
-            <a:off x="1864724" y="1326711"/>
-            <a:ext cx="7352173" cy="5319567"/>
+            <a:off x="2219297" y="1152983"/>
+            <a:ext cx="7639106" cy="5448340"/>
           </a:xfrm>
           <a:prstGeom prst="rect">
             <a:avLst/>
@@ -14540,10 +14796,10 @@
       </p:sp>
       <p:pic>
         <p:nvPicPr>
-          <p:cNvPr id="4" name="Grafik 3">
+          <p:cNvPr id="5" name="Grafik 4">
             <a:extLst>
               <a:ext uri="{FF2B5EF4-FFF2-40B4-BE49-F238E27FC236}">
-                <a16:creationId xmlns:a16="http://schemas.microsoft.com/office/drawing/2014/main" id="{0D155C9C-59A5-DD0F-3739-C600F108619D}"/>
+                <a16:creationId xmlns:a16="http://schemas.microsoft.com/office/drawing/2014/main" id="{DE0B368D-12F6-CEE0-F002-913707F1C195}"/>
               </a:ext>
             </a:extLst>
           </p:cNvPr>
@@ -14560,8 +14816,8 @@
         </p:blipFill>
         <p:spPr>
           <a:xfrm>
-            <a:off x="2141166" y="1292764"/>
-            <a:ext cx="7436985" cy="5308148"/>
+            <a:off x="2387574" y="1252517"/>
+            <a:ext cx="7048552" cy="5457865"/>
           </a:xfrm>
           <a:prstGeom prst="rect">
             <a:avLst/>
@@ -14650,10 +14906,10 @@
       </p:sp>
       <p:pic>
         <p:nvPicPr>
-          <p:cNvPr id="4" name="Grafik 3">
+          <p:cNvPr id="5" name="Grafik 4">
             <a:extLst>
               <a:ext uri="{FF2B5EF4-FFF2-40B4-BE49-F238E27FC236}">
-                <a16:creationId xmlns:a16="http://schemas.microsoft.com/office/drawing/2014/main" id="{2C8CC483-E16E-8A09-DA9D-D147E541A76C}"/>
+                <a16:creationId xmlns:a16="http://schemas.microsoft.com/office/drawing/2014/main" id="{549311B1-BBB3-3A64-8B78-DFAD1C984696}"/>
               </a:ext>
             </a:extLst>
           </p:cNvPr>
@@ -14670,8 +14926,8 @@
         </p:blipFill>
         <p:spPr>
           <a:xfrm>
-            <a:off x="1921004" y="1317476"/>
-            <a:ext cx="7343208" cy="5187155"/>
+            <a:off x="2449487" y="1152983"/>
+            <a:ext cx="6924726" cy="5429290"/>
           </a:xfrm>
           <a:prstGeom prst="rect">
             <a:avLst/>
@@ -14760,10 +15016,10 @@
       </p:sp>
       <p:pic>
         <p:nvPicPr>
-          <p:cNvPr id="4" name="Grafik 3">
+          <p:cNvPr id="5" name="Grafik 4">
             <a:extLst>
               <a:ext uri="{FF2B5EF4-FFF2-40B4-BE49-F238E27FC236}">
-                <a16:creationId xmlns:a16="http://schemas.microsoft.com/office/drawing/2014/main" id="{2F772168-0485-CD1E-DAFB-FF3022070A22}"/>
+                <a16:creationId xmlns:a16="http://schemas.microsoft.com/office/drawing/2014/main" id="{AA5CAD63-ACD4-E3CC-04BA-D80268C0603F}"/>
               </a:ext>
             </a:extLst>
           </p:cNvPr>
@@ -14780,8 +15036,8 @@
         </p:blipFill>
         <p:spPr>
           <a:xfrm>
-            <a:off x="2141166" y="1295638"/>
-            <a:ext cx="7318060" cy="5199673"/>
+            <a:off x="2500287" y="1152983"/>
+            <a:ext cx="6924726" cy="5410240"/>
           </a:xfrm>
           <a:prstGeom prst="rect">
             <a:avLst/>

</xml_diff>